<commit_message>
building up the 1:n picture
</commit_message>
<xml_diff>
--- a/getting-apis-to-work-2021/img/RBAC.pptx
+++ b/getting-apis-to-work-2021/img/RBAC.pptx
@@ -7,7 +7,9 @@
   <p:sldIdLst>
     <p:sldId id="256" r:id="rId2"/>
     <p:sldId id="257" r:id="rId3"/>
-    <p:sldId id="260" r:id="rId4"/>
+    <p:sldId id="261" r:id="rId4"/>
+    <p:sldId id="263" r:id="rId5"/>
+    <p:sldId id="262" r:id="rId6"/>
   </p:sldIdLst>
   <p:sldSz cx="12192000" cy="6858000"/>
   <p:notesSz cx="6858000" cy="9144000"/>
@@ -4725,10 +4727,10 @@
       </p:sp>
       <p:sp>
         <p:nvSpPr>
-          <p:cNvPr id="16" name="Rectangle 15">
-            <a:extLst>
-              <a:ext uri="{FF2B5EF4-FFF2-40B4-BE49-F238E27FC236}">
-                <a16:creationId xmlns:a16="http://schemas.microsoft.com/office/drawing/2014/main" id="{A5CA0DB8-57EB-C840-9FDD-2EBAFE84633F}"/>
+          <p:cNvPr id="6" name="Rectangle 5">
+            <a:extLst>
+              <a:ext uri="{FF2B5EF4-FFF2-40B4-BE49-F238E27FC236}">
+                <a16:creationId xmlns:a16="http://schemas.microsoft.com/office/drawing/2014/main" id="{292A8187-D086-6241-BD43-8F4A54EACBD1}"/>
               </a:ext>
             </a:extLst>
           </p:cNvPr>
@@ -4737,7 +4739,7 @@
         </p:nvSpPr>
         <p:spPr>
           <a:xfrm>
-            <a:off x="1752173" y="3879857"/>
+            <a:off x="1510142" y="3616039"/>
             <a:ext cx="1524001" cy="665018"/>
           </a:xfrm>
           <a:prstGeom prst="rect">
@@ -4794,10 +4796,10 @@
       </p:sp>
       <p:sp>
         <p:nvSpPr>
-          <p:cNvPr id="19" name="Down Arrow 18">
-            <a:extLst>
-              <a:ext uri="{FF2B5EF4-FFF2-40B4-BE49-F238E27FC236}">
-                <a16:creationId xmlns:a16="http://schemas.microsoft.com/office/drawing/2014/main" id="{F937787E-F591-AB4A-AA83-E0EA75AB4B38}"/>
+          <p:cNvPr id="18" name="Down Arrow 17">
+            <a:extLst>
+              <a:ext uri="{FF2B5EF4-FFF2-40B4-BE49-F238E27FC236}">
+                <a16:creationId xmlns:a16="http://schemas.microsoft.com/office/drawing/2014/main" id="{A8DAD2EC-3E9B-E942-96A2-159C54469EE2}"/>
               </a:ext>
             </a:extLst>
           </p:cNvPr>
@@ -4805,9 +4807,9 @@
           <p:nvPr/>
         </p:nvSpPr>
         <p:spPr>
-          <a:xfrm rot="20675198">
-            <a:off x="2302959" y="3011075"/>
-            <a:ext cx="161365" cy="888316"/>
+          <a:xfrm>
+            <a:off x="2191459" y="3029199"/>
+            <a:ext cx="161365" cy="581892"/>
           </a:xfrm>
           <a:prstGeom prst="downArrow">
             <a:avLst>
@@ -4856,10 +4858,10 @@
       </p:sp>
       <p:sp>
         <p:nvSpPr>
-          <p:cNvPr id="20" name="Rectangle 19">
-            <a:extLst>
-              <a:ext uri="{FF2B5EF4-FFF2-40B4-BE49-F238E27FC236}">
-                <a16:creationId xmlns:a16="http://schemas.microsoft.com/office/drawing/2014/main" id="{6BAE310D-B37C-A241-920E-315A7306B033}"/>
+          <p:cNvPr id="7" name="Rectangle 6">
+            <a:extLst>
+              <a:ext uri="{FF2B5EF4-FFF2-40B4-BE49-F238E27FC236}">
+                <a16:creationId xmlns:a16="http://schemas.microsoft.com/office/drawing/2014/main" id="{084195EB-CEC7-3642-9E4F-07763E9EF4CC}"/>
               </a:ext>
             </a:extLst>
           </p:cNvPr>
@@ -4868,7 +4870,761 @@
         </p:nvSpPr>
         <p:spPr>
           <a:xfrm>
-            <a:off x="1671496" y="3791917"/>
+            <a:off x="1510142" y="4862949"/>
+            <a:ext cx="1524001" cy="665018"/>
+          </a:xfrm>
+          <a:prstGeom prst="rect">
+            <a:avLst/>
+          </a:prstGeom>
+          <a:solidFill>
+            <a:schemeClr val="bg1">
+              <a:lumMod val="95000"/>
+              <a:alpha val="79584"/>
+            </a:schemeClr>
+          </a:solidFill>
+          <a:ln w="38100">
+            <a:solidFill>
+              <a:schemeClr val="bg2">
+                <a:lumMod val="50000"/>
+              </a:schemeClr>
+            </a:solidFill>
+          </a:ln>
+        </p:spPr>
+        <p:style>
+          <a:lnRef idx="2">
+            <a:schemeClr val="accent1">
+              <a:shade val="50000"/>
+            </a:schemeClr>
+          </a:lnRef>
+          <a:fillRef idx="1">
+            <a:schemeClr val="accent1"/>
+          </a:fillRef>
+          <a:effectRef idx="0">
+            <a:schemeClr val="accent1"/>
+          </a:effectRef>
+          <a:fontRef idx="minor">
+            <a:schemeClr val="lt1"/>
+          </a:fontRef>
+        </p:style>
+        <p:txBody>
+          <a:bodyPr rtlCol="0" anchor="ctr"/>
+          <a:lstStyle/>
+          <a:p>
+            <a:pPr algn="ctr"/>
+            <a:r>
+              <a:rPr lang="en-US" sz="2000" dirty="0">
+                <a:solidFill>
+                  <a:schemeClr val="tx1">
+                    <a:lumMod val="85000"/>
+                    <a:lumOff val="15000"/>
+                  </a:schemeClr>
+                </a:solidFill>
+              </a:rPr>
+              <a:t>Capability</a:t>
+            </a:r>
+          </a:p>
+        </p:txBody>
+      </p:sp>
+      <p:sp>
+        <p:nvSpPr>
+          <p:cNvPr id="17" name="Down Arrow 16">
+            <a:extLst>
+              <a:ext uri="{FF2B5EF4-FFF2-40B4-BE49-F238E27FC236}">
+                <a16:creationId xmlns:a16="http://schemas.microsoft.com/office/drawing/2014/main" id="{79138125-78FD-2843-9EDB-DB6D8C3820EA}"/>
+              </a:ext>
+            </a:extLst>
+          </p:cNvPr>
+          <p:cNvSpPr/>
+          <p:nvPr/>
+        </p:nvSpPr>
+        <p:spPr>
+          <a:xfrm>
+            <a:off x="2191458" y="4281057"/>
+            <a:ext cx="161365" cy="581892"/>
+          </a:xfrm>
+          <a:prstGeom prst="downArrow">
+            <a:avLst>
+              <a:gd name="adj1" fmla="val 50000"/>
+              <a:gd name="adj2" fmla="val 129998"/>
+            </a:avLst>
+          </a:prstGeom>
+          <a:solidFill>
+            <a:schemeClr val="bg1">
+              <a:lumMod val="95000"/>
+              <a:alpha val="79584"/>
+            </a:schemeClr>
+          </a:solidFill>
+          <a:ln>
+            <a:solidFill>
+              <a:schemeClr val="bg2">
+                <a:lumMod val="50000"/>
+              </a:schemeClr>
+            </a:solidFill>
+          </a:ln>
+        </p:spPr>
+        <p:style>
+          <a:lnRef idx="2">
+            <a:schemeClr val="accent1">
+              <a:shade val="50000"/>
+            </a:schemeClr>
+          </a:lnRef>
+          <a:fillRef idx="1">
+            <a:schemeClr val="accent1"/>
+          </a:fillRef>
+          <a:effectRef idx="0">
+            <a:schemeClr val="accent1"/>
+          </a:effectRef>
+          <a:fontRef idx="minor">
+            <a:schemeClr val="lt1"/>
+          </a:fontRef>
+        </p:style>
+        <p:txBody>
+          <a:bodyPr rtlCol="0" anchor="ctr"/>
+          <a:lstStyle/>
+          <a:p>
+            <a:pPr algn="ctr"/>
+            <a:endParaRPr lang="en-US"/>
+          </a:p>
+        </p:txBody>
+      </p:sp>
+    </p:spTree>
+    <p:extLst>
+      <p:ext uri="{BB962C8B-B14F-4D97-AF65-F5344CB8AC3E}">
+        <p14:creationId xmlns:p14="http://schemas.microsoft.com/office/powerpoint/2010/main" val="3840253160"/>
+      </p:ext>
+    </p:extLst>
+  </p:cSld>
+  <p:clrMapOvr>
+    <a:masterClrMapping/>
+  </p:clrMapOvr>
+</p:sld>
+</file>
+
+<file path=ppt/slides/slide4.xml><?xml version="1.0" encoding="utf-8"?>
+<p:sld xmlns:a="http://schemas.openxmlformats.org/drawingml/2006/main" xmlns:r="http://schemas.openxmlformats.org/officeDocument/2006/relationships" xmlns:p="http://schemas.openxmlformats.org/presentationml/2006/main">
+  <p:cSld>
+    <p:spTree>
+      <p:nvGrpSpPr>
+        <p:cNvPr id="1" name=""/>
+        <p:cNvGrpSpPr/>
+        <p:nvPr/>
+      </p:nvGrpSpPr>
+      <p:grpSpPr>
+        <a:xfrm>
+          <a:off x="0" y="0"/>
+          <a:ext cx="0" cy="0"/>
+          <a:chOff x="0" y="0"/>
+          <a:chExt cx="0" cy="0"/>
+        </a:xfrm>
+      </p:grpSpPr>
+      <p:sp>
+        <p:nvSpPr>
+          <p:cNvPr id="11" name="Rectangle 10">
+            <a:extLst>
+              <a:ext uri="{FF2B5EF4-FFF2-40B4-BE49-F238E27FC236}">
+                <a16:creationId xmlns:a16="http://schemas.microsoft.com/office/drawing/2014/main" id="{F5DFF4CB-98E1-FF48-A069-97B4154B328B}"/>
+              </a:ext>
+            </a:extLst>
+          </p:cNvPr>
+          <p:cNvSpPr/>
+          <p:nvPr/>
+        </p:nvSpPr>
+        <p:spPr>
+          <a:xfrm>
+            <a:off x="1752176" y="2632947"/>
+            <a:ext cx="1524001" cy="665018"/>
+          </a:xfrm>
+          <a:prstGeom prst="rect">
+            <a:avLst/>
+          </a:prstGeom>
+          <a:solidFill>
+            <a:schemeClr val="bg1">
+              <a:lumMod val="95000"/>
+              <a:alpha val="79584"/>
+            </a:schemeClr>
+          </a:solidFill>
+          <a:ln w="38100">
+            <a:solidFill>
+              <a:schemeClr val="bg2">
+                <a:lumMod val="50000"/>
+              </a:schemeClr>
+            </a:solidFill>
+          </a:ln>
+        </p:spPr>
+        <p:style>
+          <a:lnRef idx="2">
+            <a:schemeClr val="accent1">
+              <a:shade val="50000"/>
+            </a:schemeClr>
+          </a:lnRef>
+          <a:fillRef idx="1">
+            <a:schemeClr val="accent1"/>
+          </a:fillRef>
+          <a:effectRef idx="0">
+            <a:schemeClr val="accent1"/>
+          </a:effectRef>
+          <a:fontRef idx="minor">
+            <a:schemeClr val="lt1"/>
+          </a:fontRef>
+        </p:style>
+        <p:txBody>
+          <a:bodyPr rtlCol="0" anchor="ctr"/>
+          <a:lstStyle/>
+          <a:p>
+            <a:pPr algn="ctr"/>
+            <a:r>
+              <a:rPr lang="en-US" sz="2000" dirty="0">
+                <a:solidFill>
+                  <a:schemeClr val="tx1">
+                    <a:lumMod val="85000"/>
+                    <a:lumOff val="15000"/>
+                  </a:schemeClr>
+                </a:solidFill>
+              </a:rPr>
+              <a:t>Role</a:t>
+            </a:r>
+          </a:p>
+        </p:txBody>
+      </p:sp>
+      <p:sp>
+        <p:nvSpPr>
+          <p:cNvPr id="14" name="Down Arrow 13">
+            <a:extLst>
+              <a:ext uri="{FF2B5EF4-FFF2-40B4-BE49-F238E27FC236}">
+                <a16:creationId xmlns:a16="http://schemas.microsoft.com/office/drawing/2014/main" id="{7401979E-EFD4-3B4A-B5AE-34BF68CA615C}"/>
+              </a:ext>
+            </a:extLst>
+          </p:cNvPr>
+          <p:cNvSpPr/>
+          <p:nvPr/>
+        </p:nvSpPr>
+        <p:spPr>
+          <a:xfrm rot="20675198">
+            <a:off x="2302962" y="1764165"/>
+            <a:ext cx="161365" cy="888316"/>
+          </a:xfrm>
+          <a:prstGeom prst="downArrow">
+            <a:avLst>
+              <a:gd name="adj1" fmla="val 50000"/>
+              <a:gd name="adj2" fmla="val 129998"/>
+            </a:avLst>
+          </a:prstGeom>
+          <a:solidFill>
+            <a:schemeClr val="bg1">
+              <a:lumMod val="95000"/>
+              <a:alpha val="79584"/>
+            </a:schemeClr>
+          </a:solidFill>
+          <a:ln>
+            <a:solidFill>
+              <a:schemeClr val="bg2">
+                <a:lumMod val="50000"/>
+              </a:schemeClr>
+            </a:solidFill>
+          </a:ln>
+        </p:spPr>
+        <p:style>
+          <a:lnRef idx="2">
+            <a:schemeClr val="accent1">
+              <a:shade val="50000"/>
+            </a:schemeClr>
+          </a:lnRef>
+          <a:fillRef idx="1">
+            <a:schemeClr val="accent1"/>
+          </a:fillRef>
+          <a:effectRef idx="0">
+            <a:schemeClr val="accent1"/>
+          </a:effectRef>
+          <a:fontRef idx="minor">
+            <a:schemeClr val="lt1"/>
+          </a:fontRef>
+        </p:style>
+        <p:txBody>
+          <a:bodyPr rtlCol="0" anchor="ctr"/>
+          <a:lstStyle/>
+          <a:p>
+            <a:pPr algn="ctr"/>
+            <a:endParaRPr lang="en-US"/>
+          </a:p>
+        </p:txBody>
+      </p:sp>
+      <p:sp>
+        <p:nvSpPr>
+          <p:cNvPr id="10" name="Rectangle 9">
+            <a:extLst>
+              <a:ext uri="{FF2B5EF4-FFF2-40B4-BE49-F238E27FC236}">
+                <a16:creationId xmlns:a16="http://schemas.microsoft.com/office/drawing/2014/main" id="{B7F1EEC2-724B-1848-91A6-1DFD50EBDEE6}"/>
+              </a:ext>
+            </a:extLst>
+          </p:cNvPr>
+          <p:cNvSpPr/>
+          <p:nvPr/>
+        </p:nvSpPr>
+        <p:spPr>
+          <a:xfrm>
+            <a:off x="1671499" y="2545007"/>
+            <a:ext cx="1524001" cy="665018"/>
+          </a:xfrm>
+          <a:prstGeom prst="rect">
+            <a:avLst/>
+          </a:prstGeom>
+          <a:solidFill>
+            <a:schemeClr val="bg1">
+              <a:lumMod val="95000"/>
+              <a:alpha val="79584"/>
+            </a:schemeClr>
+          </a:solidFill>
+          <a:ln w="38100">
+            <a:solidFill>
+              <a:schemeClr val="bg2">
+                <a:lumMod val="50000"/>
+              </a:schemeClr>
+            </a:solidFill>
+          </a:ln>
+        </p:spPr>
+        <p:style>
+          <a:lnRef idx="2">
+            <a:schemeClr val="accent1">
+              <a:shade val="50000"/>
+            </a:schemeClr>
+          </a:lnRef>
+          <a:fillRef idx="1">
+            <a:schemeClr val="accent1"/>
+          </a:fillRef>
+          <a:effectRef idx="0">
+            <a:schemeClr val="accent1"/>
+          </a:effectRef>
+          <a:fontRef idx="minor">
+            <a:schemeClr val="lt1"/>
+          </a:fontRef>
+        </p:style>
+        <p:txBody>
+          <a:bodyPr rtlCol="0" anchor="ctr"/>
+          <a:lstStyle/>
+          <a:p>
+            <a:pPr algn="ctr"/>
+            <a:r>
+              <a:rPr lang="en-US" sz="2000" dirty="0">
+                <a:solidFill>
+                  <a:schemeClr val="tx1">
+                    <a:lumMod val="85000"/>
+                    <a:lumOff val="15000"/>
+                  </a:schemeClr>
+                </a:solidFill>
+              </a:rPr>
+              <a:t>Role</a:t>
+            </a:r>
+          </a:p>
+        </p:txBody>
+      </p:sp>
+      <p:sp>
+        <p:nvSpPr>
+          <p:cNvPr id="13" name="Down Arrow 12">
+            <a:extLst>
+              <a:ext uri="{FF2B5EF4-FFF2-40B4-BE49-F238E27FC236}">
+                <a16:creationId xmlns:a16="http://schemas.microsoft.com/office/drawing/2014/main" id="{B4CDB232-AE9B-3D4F-B146-8B666553560E}"/>
+              </a:ext>
+            </a:extLst>
+          </p:cNvPr>
+          <p:cNvSpPr/>
+          <p:nvPr/>
+        </p:nvSpPr>
+        <p:spPr>
+          <a:xfrm rot="21000000">
+            <a:off x="2264270" y="1772155"/>
+            <a:ext cx="161365" cy="772627"/>
+          </a:xfrm>
+          <a:prstGeom prst="downArrow">
+            <a:avLst>
+              <a:gd name="adj1" fmla="val 50000"/>
+              <a:gd name="adj2" fmla="val 129998"/>
+            </a:avLst>
+          </a:prstGeom>
+          <a:solidFill>
+            <a:schemeClr val="bg1">
+              <a:lumMod val="95000"/>
+              <a:alpha val="79584"/>
+            </a:schemeClr>
+          </a:solidFill>
+          <a:ln>
+            <a:solidFill>
+              <a:schemeClr val="bg2">
+                <a:lumMod val="50000"/>
+              </a:schemeClr>
+            </a:solidFill>
+          </a:ln>
+        </p:spPr>
+        <p:style>
+          <a:lnRef idx="2">
+            <a:schemeClr val="accent1">
+              <a:shade val="50000"/>
+            </a:schemeClr>
+          </a:lnRef>
+          <a:fillRef idx="1">
+            <a:schemeClr val="accent1"/>
+          </a:fillRef>
+          <a:effectRef idx="0">
+            <a:schemeClr val="accent1"/>
+          </a:effectRef>
+          <a:fontRef idx="minor">
+            <a:schemeClr val="lt1"/>
+          </a:fontRef>
+        </p:style>
+        <p:txBody>
+          <a:bodyPr rtlCol="0" anchor="ctr"/>
+          <a:lstStyle/>
+          <a:p>
+            <a:pPr algn="ctr"/>
+            <a:endParaRPr lang="en-US"/>
+          </a:p>
+        </p:txBody>
+      </p:sp>
+      <p:sp>
+        <p:nvSpPr>
+          <p:cNvPr id="9" name="Rectangle 8">
+            <a:extLst>
+              <a:ext uri="{FF2B5EF4-FFF2-40B4-BE49-F238E27FC236}">
+                <a16:creationId xmlns:a16="http://schemas.microsoft.com/office/drawing/2014/main" id="{6F7D0253-8737-834F-8F03-1696179FCA7C}"/>
+              </a:ext>
+            </a:extLst>
+          </p:cNvPr>
+          <p:cNvSpPr/>
+          <p:nvPr/>
+        </p:nvSpPr>
+        <p:spPr>
+          <a:xfrm>
+            <a:off x="1590822" y="2457068"/>
+            <a:ext cx="1524001" cy="665018"/>
+          </a:xfrm>
+          <a:prstGeom prst="rect">
+            <a:avLst/>
+          </a:prstGeom>
+          <a:solidFill>
+            <a:schemeClr val="bg1">
+              <a:lumMod val="95000"/>
+              <a:alpha val="79584"/>
+            </a:schemeClr>
+          </a:solidFill>
+          <a:ln w="38100">
+            <a:solidFill>
+              <a:schemeClr val="bg2">
+                <a:lumMod val="50000"/>
+              </a:schemeClr>
+            </a:solidFill>
+          </a:ln>
+        </p:spPr>
+        <p:style>
+          <a:lnRef idx="2">
+            <a:schemeClr val="accent1">
+              <a:shade val="50000"/>
+            </a:schemeClr>
+          </a:lnRef>
+          <a:fillRef idx="1">
+            <a:schemeClr val="accent1"/>
+          </a:fillRef>
+          <a:effectRef idx="0">
+            <a:schemeClr val="accent1"/>
+          </a:effectRef>
+          <a:fontRef idx="minor">
+            <a:schemeClr val="lt1"/>
+          </a:fontRef>
+        </p:style>
+        <p:txBody>
+          <a:bodyPr rtlCol="0" anchor="ctr"/>
+          <a:lstStyle/>
+          <a:p>
+            <a:pPr algn="ctr"/>
+            <a:r>
+              <a:rPr lang="en-US" sz="2000" dirty="0">
+                <a:solidFill>
+                  <a:schemeClr val="tx1">
+                    <a:lumMod val="85000"/>
+                    <a:lumOff val="15000"/>
+                  </a:schemeClr>
+                </a:solidFill>
+              </a:rPr>
+              <a:t>Role</a:t>
+            </a:r>
+          </a:p>
+        </p:txBody>
+      </p:sp>
+      <p:sp>
+        <p:nvSpPr>
+          <p:cNvPr id="12" name="Down Arrow 11">
+            <a:extLst>
+              <a:ext uri="{FF2B5EF4-FFF2-40B4-BE49-F238E27FC236}">
+                <a16:creationId xmlns:a16="http://schemas.microsoft.com/office/drawing/2014/main" id="{6CFDBBEA-1C60-B94C-BA5B-0530357207B3}"/>
+              </a:ext>
+            </a:extLst>
+          </p:cNvPr>
+          <p:cNvSpPr/>
+          <p:nvPr/>
+        </p:nvSpPr>
+        <p:spPr>
+          <a:xfrm rot="21300000">
+            <a:off x="2216826" y="1778094"/>
+            <a:ext cx="161365" cy="672768"/>
+          </a:xfrm>
+          <a:prstGeom prst="downArrow">
+            <a:avLst>
+              <a:gd name="adj1" fmla="val 50000"/>
+              <a:gd name="adj2" fmla="val 129998"/>
+            </a:avLst>
+          </a:prstGeom>
+          <a:solidFill>
+            <a:schemeClr val="bg1">
+              <a:lumMod val="95000"/>
+              <a:alpha val="79584"/>
+            </a:schemeClr>
+          </a:solidFill>
+          <a:ln>
+            <a:solidFill>
+              <a:schemeClr val="bg2">
+                <a:lumMod val="50000"/>
+              </a:schemeClr>
+            </a:solidFill>
+          </a:ln>
+        </p:spPr>
+        <p:style>
+          <a:lnRef idx="2">
+            <a:schemeClr val="accent1">
+              <a:shade val="50000"/>
+            </a:schemeClr>
+          </a:lnRef>
+          <a:fillRef idx="1">
+            <a:schemeClr val="accent1"/>
+          </a:fillRef>
+          <a:effectRef idx="0">
+            <a:schemeClr val="accent1"/>
+          </a:effectRef>
+          <a:fontRef idx="minor">
+            <a:schemeClr val="lt1"/>
+          </a:fontRef>
+        </p:style>
+        <p:txBody>
+          <a:bodyPr rtlCol="0" anchor="ctr"/>
+          <a:lstStyle/>
+          <a:p>
+            <a:pPr algn="ctr"/>
+            <a:endParaRPr lang="en-US"/>
+          </a:p>
+        </p:txBody>
+      </p:sp>
+      <p:sp>
+        <p:nvSpPr>
+          <p:cNvPr id="2" name="Rectangle 1">
+            <a:extLst>
+              <a:ext uri="{FF2B5EF4-FFF2-40B4-BE49-F238E27FC236}">
+                <a16:creationId xmlns:a16="http://schemas.microsoft.com/office/drawing/2014/main" id="{9B7387F5-ACA9-7141-97D3-A62F3221BA74}"/>
+              </a:ext>
+            </a:extLst>
+          </p:cNvPr>
+          <p:cNvSpPr/>
+          <p:nvPr/>
+        </p:nvSpPr>
+        <p:spPr>
+          <a:xfrm>
+            <a:off x="1510145" y="1122219"/>
+            <a:ext cx="1524001" cy="665018"/>
+          </a:xfrm>
+          <a:prstGeom prst="rect">
+            <a:avLst/>
+          </a:prstGeom>
+          <a:solidFill>
+            <a:schemeClr val="bg1">
+              <a:lumMod val="95000"/>
+              <a:alpha val="79584"/>
+            </a:schemeClr>
+          </a:solidFill>
+          <a:ln w="38100">
+            <a:solidFill>
+              <a:schemeClr val="bg2">
+                <a:lumMod val="50000"/>
+              </a:schemeClr>
+            </a:solidFill>
+          </a:ln>
+        </p:spPr>
+        <p:style>
+          <a:lnRef idx="2">
+            <a:schemeClr val="accent1">
+              <a:shade val="50000"/>
+            </a:schemeClr>
+          </a:lnRef>
+          <a:fillRef idx="1">
+            <a:schemeClr val="accent1"/>
+          </a:fillRef>
+          <a:effectRef idx="0">
+            <a:schemeClr val="accent1"/>
+          </a:effectRef>
+          <a:fontRef idx="minor">
+            <a:schemeClr val="lt1"/>
+          </a:fontRef>
+        </p:style>
+        <p:txBody>
+          <a:bodyPr rtlCol="0" anchor="ctr"/>
+          <a:lstStyle/>
+          <a:p>
+            <a:pPr algn="ctr"/>
+            <a:r>
+              <a:rPr lang="en-US" sz="2000" dirty="0">
+                <a:solidFill>
+                  <a:schemeClr val="tx1">
+                    <a:lumMod val="85000"/>
+                    <a:lumOff val="15000"/>
+                  </a:schemeClr>
+                </a:solidFill>
+              </a:rPr>
+              <a:t>User</a:t>
+            </a:r>
+          </a:p>
+        </p:txBody>
+      </p:sp>
+      <p:sp>
+        <p:nvSpPr>
+          <p:cNvPr id="5" name="Rectangle 4">
+            <a:extLst>
+              <a:ext uri="{FF2B5EF4-FFF2-40B4-BE49-F238E27FC236}">
+                <a16:creationId xmlns:a16="http://schemas.microsoft.com/office/drawing/2014/main" id="{D1CCEEB6-0FB9-4C4E-A7F2-C6729B9FC8EA}"/>
+              </a:ext>
+            </a:extLst>
+          </p:cNvPr>
+          <p:cNvSpPr/>
+          <p:nvPr/>
+        </p:nvSpPr>
+        <p:spPr>
+          <a:xfrm>
+            <a:off x="1510145" y="2369129"/>
+            <a:ext cx="1524001" cy="665018"/>
+          </a:xfrm>
+          <a:prstGeom prst="rect">
+            <a:avLst/>
+          </a:prstGeom>
+          <a:solidFill>
+            <a:schemeClr val="bg1">
+              <a:lumMod val="95000"/>
+              <a:alpha val="79584"/>
+            </a:schemeClr>
+          </a:solidFill>
+          <a:ln w="38100">
+            <a:solidFill>
+              <a:schemeClr val="bg2">
+                <a:lumMod val="50000"/>
+              </a:schemeClr>
+            </a:solidFill>
+          </a:ln>
+        </p:spPr>
+        <p:style>
+          <a:lnRef idx="2">
+            <a:schemeClr val="accent1">
+              <a:shade val="50000"/>
+            </a:schemeClr>
+          </a:lnRef>
+          <a:fillRef idx="1">
+            <a:schemeClr val="accent1"/>
+          </a:fillRef>
+          <a:effectRef idx="0">
+            <a:schemeClr val="accent1"/>
+          </a:effectRef>
+          <a:fontRef idx="minor">
+            <a:schemeClr val="lt1"/>
+          </a:fontRef>
+        </p:style>
+        <p:txBody>
+          <a:bodyPr rtlCol="0" anchor="ctr"/>
+          <a:lstStyle/>
+          <a:p>
+            <a:pPr algn="ctr"/>
+            <a:r>
+              <a:rPr lang="en-US" sz="2000" dirty="0">
+                <a:solidFill>
+                  <a:schemeClr val="tx1">
+                    <a:lumMod val="85000"/>
+                    <a:lumOff val="15000"/>
+                  </a:schemeClr>
+                </a:solidFill>
+              </a:rPr>
+              <a:t>Role</a:t>
+            </a:r>
+          </a:p>
+        </p:txBody>
+      </p:sp>
+      <p:sp>
+        <p:nvSpPr>
+          <p:cNvPr id="15" name="Down Arrow 14">
+            <a:extLst>
+              <a:ext uri="{FF2B5EF4-FFF2-40B4-BE49-F238E27FC236}">
+                <a16:creationId xmlns:a16="http://schemas.microsoft.com/office/drawing/2014/main" id="{03FE2F9B-D768-9846-AF7E-C97F162AF435}"/>
+              </a:ext>
+            </a:extLst>
+          </p:cNvPr>
+          <p:cNvSpPr/>
+          <p:nvPr/>
+        </p:nvSpPr>
+        <p:spPr>
+          <a:xfrm>
+            <a:off x="2191459" y="1787237"/>
+            <a:ext cx="161365" cy="581892"/>
+          </a:xfrm>
+          <a:prstGeom prst="downArrow">
+            <a:avLst>
+              <a:gd name="adj1" fmla="val 50000"/>
+              <a:gd name="adj2" fmla="val 129998"/>
+            </a:avLst>
+          </a:prstGeom>
+          <a:solidFill>
+            <a:schemeClr val="bg1">
+              <a:lumMod val="95000"/>
+              <a:alpha val="79584"/>
+            </a:schemeClr>
+          </a:solidFill>
+          <a:ln>
+            <a:solidFill>
+              <a:schemeClr val="bg2">
+                <a:lumMod val="50000"/>
+              </a:schemeClr>
+            </a:solidFill>
+          </a:ln>
+        </p:spPr>
+        <p:style>
+          <a:lnRef idx="2">
+            <a:schemeClr val="accent1">
+              <a:shade val="50000"/>
+            </a:schemeClr>
+          </a:lnRef>
+          <a:fillRef idx="1">
+            <a:schemeClr val="accent1"/>
+          </a:fillRef>
+          <a:effectRef idx="0">
+            <a:schemeClr val="accent1"/>
+          </a:effectRef>
+          <a:fontRef idx="minor">
+            <a:schemeClr val="lt1"/>
+          </a:fontRef>
+        </p:style>
+        <p:txBody>
+          <a:bodyPr rtlCol="0" anchor="ctr"/>
+          <a:lstStyle/>
+          <a:p>
+            <a:pPr algn="ctr"/>
+            <a:endParaRPr lang="en-US"/>
+          </a:p>
+        </p:txBody>
+      </p:sp>
+      <p:sp>
+        <p:nvSpPr>
+          <p:cNvPr id="16" name="Rectangle 15">
+            <a:extLst>
+              <a:ext uri="{FF2B5EF4-FFF2-40B4-BE49-F238E27FC236}">
+                <a16:creationId xmlns:a16="http://schemas.microsoft.com/office/drawing/2014/main" id="{A5CA0DB8-57EB-C840-9FDD-2EBAFE84633F}"/>
+              </a:ext>
+            </a:extLst>
+          </p:cNvPr>
+          <p:cNvSpPr/>
+          <p:nvPr/>
+        </p:nvSpPr>
+        <p:spPr>
+          <a:xfrm>
+            <a:off x="1752173" y="3879857"/>
             <a:ext cx="1524001" cy="665018"/>
           </a:xfrm>
           <a:prstGeom prst="rect">
@@ -4925,10 +5681,10 @@
       </p:sp>
       <p:sp>
         <p:nvSpPr>
-          <p:cNvPr id="21" name="Down Arrow 20">
-            <a:extLst>
-              <a:ext uri="{FF2B5EF4-FFF2-40B4-BE49-F238E27FC236}">
-                <a16:creationId xmlns:a16="http://schemas.microsoft.com/office/drawing/2014/main" id="{675138C8-4353-E442-A21C-738EAB141FBE}"/>
+          <p:cNvPr id="19" name="Down Arrow 18">
+            <a:extLst>
+              <a:ext uri="{FF2B5EF4-FFF2-40B4-BE49-F238E27FC236}">
+                <a16:creationId xmlns:a16="http://schemas.microsoft.com/office/drawing/2014/main" id="{F937787E-F591-AB4A-AA83-E0EA75AB4B38}"/>
               </a:ext>
             </a:extLst>
           </p:cNvPr>
@@ -4936,9 +5692,9 @@
           <p:nvPr/>
         </p:nvSpPr>
         <p:spPr>
-          <a:xfrm rot="21000000">
-            <a:off x="2264267" y="3019065"/>
-            <a:ext cx="161365" cy="772627"/>
+          <a:xfrm rot="20675198">
+            <a:off x="2302959" y="3011075"/>
+            <a:ext cx="161365" cy="888316"/>
           </a:xfrm>
           <a:prstGeom prst="downArrow">
             <a:avLst>
@@ -4987,10 +5743,10 @@
       </p:sp>
       <p:sp>
         <p:nvSpPr>
-          <p:cNvPr id="22" name="Rectangle 21">
-            <a:extLst>
-              <a:ext uri="{FF2B5EF4-FFF2-40B4-BE49-F238E27FC236}">
-                <a16:creationId xmlns:a16="http://schemas.microsoft.com/office/drawing/2014/main" id="{90B2ED0E-B620-C64A-8FFB-6879542442F6}"/>
+          <p:cNvPr id="20" name="Rectangle 19">
+            <a:extLst>
+              <a:ext uri="{FF2B5EF4-FFF2-40B4-BE49-F238E27FC236}">
+                <a16:creationId xmlns:a16="http://schemas.microsoft.com/office/drawing/2014/main" id="{6BAE310D-B37C-A241-920E-315A7306B033}"/>
               </a:ext>
             </a:extLst>
           </p:cNvPr>
@@ -4999,7 +5755,7 @@
         </p:nvSpPr>
         <p:spPr>
           <a:xfrm>
-            <a:off x="1590819" y="3703978"/>
+            <a:off x="1671496" y="3791917"/>
             <a:ext cx="1524001" cy="665018"/>
           </a:xfrm>
           <a:prstGeom prst="rect">
@@ -5056,10 +5812,10 @@
       </p:sp>
       <p:sp>
         <p:nvSpPr>
-          <p:cNvPr id="23" name="Down Arrow 22">
-            <a:extLst>
-              <a:ext uri="{FF2B5EF4-FFF2-40B4-BE49-F238E27FC236}">
-                <a16:creationId xmlns:a16="http://schemas.microsoft.com/office/drawing/2014/main" id="{09C43943-FB10-2F4E-A6DD-A0608F650847}"/>
+          <p:cNvPr id="21" name="Down Arrow 20">
+            <a:extLst>
+              <a:ext uri="{FF2B5EF4-FFF2-40B4-BE49-F238E27FC236}">
+                <a16:creationId xmlns:a16="http://schemas.microsoft.com/office/drawing/2014/main" id="{675138C8-4353-E442-A21C-738EAB141FBE}"/>
               </a:ext>
             </a:extLst>
           </p:cNvPr>
@@ -5067,9 +5823,9 @@
           <p:nvPr/>
         </p:nvSpPr>
         <p:spPr>
-          <a:xfrm rot="21300000">
-            <a:off x="2216823" y="3025004"/>
-            <a:ext cx="161365" cy="672768"/>
+          <a:xfrm rot="21000000">
+            <a:off x="2264267" y="3019065"/>
+            <a:ext cx="161365" cy="772627"/>
           </a:xfrm>
           <a:prstGeom prst="downArrow">
             <a:avLst>
@@ -5118,10 +5874,10 @@
       </p:sp>
       <p:sp>
         <p:nvSpPr>
-          <p:cNvPr id="6" name="Rectangle 5">
-            <a:extLst>
-              <a:ext uri="{FF2B5EF4-FFF2-40B4-BE49-F238E27FC236}">
-                <a16:creationId xmlns:a16="http://schemas.microsoft.com/office/drawing/2014/main" id="{292A8187-D086-6241-BD43-8F4A54EACBD1}"/>
+          <p:cNvPr id="22" name="Rectangle 21">
+            <a:extLst>
+              <a:ext uri="{FF2B5EF4-FFF2-40B4-BE49-F238E27FC236}">
+                <a16:creationId xmlns:a16="http://schemas.microsoft.com/office/drawing/2014/main" id="{90B2ED0E-B620-C64A-8FFB-6879542442F6}"/>
               </a:ext>
             </a:extLst>
           </p:cNvPr>
@@ -5130,7 +5886,7 @@
         </p:nvSpPr>
         <p:spPr>
           <a:xfrm>
-            <a:off x="1510142" y="3616039"/>
+            <a:off x="1590819" y="3703978"/>
             <a:ext cx="1524001" cy="665018"/>
           </a:xfrm>
           <a:prstGeom prst="rect">
@@ -5187,10 +5943,10 @@
       </p:sp>
       <p:sp>
         <p:nvSpPr>
-          <p:cNvPr id="18" name="Down Arrow 17">
-            <a:extLst>
-              <a:ext uri="{FF2B5EF4-FFF2-40B4-BE49-F238E27FC236}">
-                <a16:creationId xmlns:a16="http://schemas.microsoft.com/office/drawing/2014/main" id="{A8DAD2EC-3E9B-E942-96A2-159C54469EE2}"/>
+          <p:cNvPr id="23" name="Down Arrow 22">
+            <a:extLst>
+              <a:ext uri="{FF2B5EF4-FFF2-40B4-BE49-F238E27FC236}">
+                <a16:creationId xmlns:a16="http://schemas.microsoft.com/office/drawing/2014/main" id="{09C43943-FB10-2F4E-A6DD-A0608F650847}"/>
               </a:ext>
             </a:extLst>
           </p:cNvPr>
@@ -5198,9 +5954,9 @@
           <p:nvPr/>
         </p:nvSpPr>
         <p:spPr>
-          <a:xfrm>
-            <a:off x="2191459" y="3029199"/>
-            <a:ext cx="161365" cy="581892"/>
+          <a:xfrm rot="21300000">
+            <a:off x="2216823" y="3025004"/>
+            <a:ext cx="161365" cy="672768"/>
           </a:xfrm>
           <a:prstGeom prst="downArrow">
             <a:avLst>
@@ -5249,10 +6005,10 @@
       </p:sp>
       <p:sp>
         <p:nvSpPr>
-          <p:cNvPr id="24" name="Rectangle 23">
-            <a:extLst>
-              <a:ext uri="{FF2B5EF4-FFF2-40B4-BE49-F238E27FC236}">
-                <a16:creationId xmlns:a16="http://schemas.microsoft.com/office/drawing/2014/main" id="{4D48405B-FC50-FE48-9864-E65F44D6BEA9}"/>
+          <p:cNvPr id="6" name="Rectangle 5">
+            <a:extLst>
+              <a:ext uri="{FF2B5EF4-FFF2-40B4-BE49-F238E27FC236}">
+                <a16:creationId xmlns:a16="http://schemas.microsoft.com/office/drawing/2014/main" id="{292A8187-D086-6241-BD43-8F4A54EACBD1}"/>
               </a:ext>
             </a:extLst>
           </p:cNvPr>
@@ -5261,7 +6017,138 @@
         </p:nvSpPr>
         <p:spPr>
           <a:xfrm>
-            <a:off x="1748889" y="5126767"/>
+            <a:off x="1510142" y="3616039"/>
+            <a:ext cx="1524001" cy="665018"/>
+          </a:xfrm>
+          <a:prstGeom prst="rect">
+            <a:avLst/>
+          </a:prstGeom>
+          <a:solidFill>
+            <a:schemeClr val="bg1">
+              <a:lumMod val="95000"/>
+              <a:alpha val="79584"/>
+            </a:schemeClr>
+          </a:solidFill>
+          <a:ln w="38100">
+            <a:solidFill>
+              <a:schemeClr val="bg2">
+                <a:lumMod val="50000"/>
+              </a:schemeClr>
+            </a:solidFill>
+          </a:ln>
+        </p:spPr>
+        <p:style>
+          <a:lnRef idx="2">
+            <a:schemeClr val="accent1">
+              <a:shade val="50000"/>
+            </a:schemeClr>
+          </a:lnRef>
+          <a:fillRef idx="1">
+            <a:schemeClr val="accent1"/>
+          </a:fillRef>
+          <a:effectRef idx="0">
+            <a:schemeClr val="accent1"/>
+          </a:effectRef>
+          <a:fontRef idx="minor">
+            <a:schemeClr val="lt1"/>
+          </a:fontRef>
+        </p:style>
+        <p:txBody>
+          <a:bodyPr rtlCol="0" anchor="ctr"/>
+          <a:lstStyle/>
+          <a:p>
+            <a:pPr algn="ctr"/>
+            <a:r>
+              <a:rPr lang="en-US" sz="2000" dirty="0">
+                <a:solidFill>
+                  <a:schemeClr val="tx1">
+                    <a:lumMod val="85000"/>
+                    <a:lumOff val="15000"/>
+                  </a:schemeClr>
+                </a:solidFill>
+              </a:rPr>
+              <a:t>Permission</a:t>
+            </a:r>
+          </a:p>
+        </p:txBody>
+      </p:sp>
+      <p:sp>
+        <p:nvSpPr>
+          <p:cNvPr id="18" name="Down Arrow 17">
+            <a:extLst>
+              <a:ext uri="{FF2B5EF4-FFF2-40B4-BE49-F238E27FC236}">
+                <a16:creationId xmlns:a16="http://schemas.microsoft.com/office/drawing/2014/main" id="{A8DAD2EC-3E9B-E942-96A2-159C54469EE2}"/>
+              </a:ext>
+            </a:extLst>
+          </p:cNvPr>
+          <p:cNvSpPr/>
+          <p:nvPr/>
+        </p:nvSpPr>
+        <p:spPr>
+          <a:xfrm>
+            <a:off x="2191459" y="3029199"/>
+            <a:ext cx="161365" cy="581892"/>
+          </a:xfrm>
+          <a:prstGeom prst="downArrow">
+            <a:avLst>
+              <a:gd name="adj1" fmla="val 50000"/>
+              <a:gd name="adj2" fmla="val 129998"/>
+            </a:avLst>
+          </a:prstGeom>
+          <a:solidFill>
+            <a:schemeClr val="bg1">
+              <a:lumMod val="95000"/>
+              <a:alpha val="79584"/>
+            </a:schemeClr>
+          </a:solidFill>
+          <a:ln>
+            <a:solidFill>
+              <a:schemeClr val="bg2">
+                <a:lumMod val="50000"/>
+              </a:schemeClr>
+            </a:solidFill>
+          </a:ln>
+        </p:spPr>
+        <p:style>
+          <a:lnRef idx="2">
+            <a:schemeClr val="accent1">
+              <a:shade val="50000"/>
+            </a:schemeClr>
+          </a:lnRef>
+          <a:fillRef idx="1">
+            <a:schemeClr val="accent1"/>
+          </a:fillRef>
+          <a:effectRef idx="0">
+            <a:schemeClr val="accent1"/>
+          </a:effectRef>
+          <a:fontRef idx="minor">
+            <a:schemeClr val="lt1"/>
+          </a:fontRef>
+        </p:style>
+        <p:txBody>
+          <a:bodyPr rtlCol="0" anchor="ctr"/>
+          <a:lstStyle/>
+          <a:p>
+            <a:pPr algn="ctr"/>
+            <a:endParaRPr lang="en-US"/>
+          </a:p>
+        </p:txBody>
+      </p:sp>
+      <p:sp>
+        <p:nvSpPr>
+          <p:cNvPr id="7" name="Rectangle 6">
+            <a:extLst>
+              <a:ext uri="{FF2B5EF4-FFF2-40B4-BE49-F238E27FC236}">
+                <a16:creationId xmlns:a16="http://schemas.microsoft.com/office/drawing/2014/main" id="{084195EB-CEC7-3642-9E4F-07763E9EF4CC}"/>
+              </a:ext>
+            </a:extLst>
+          </p:cNvPr>
+          <p:cNvSpPr/>
+          <p:nvPr/>
+        </p:nvSpPr>
+        <p:spPr>
+          <a:xfrm>
+            <a:off x="1510142" y="4862949"/>
             <a:ext cx="1524001" cy="665018"/>
           </a:xfrm>
           <a:prstGeom prst="rect">
@@ -5318,10 +6205,10 @@
       </p:sp>
       <p:sp>
         <p:nvSpPr>
-          <p:cNvPr id="25" name="Down Arrow 24">
-            <a:extLst>
-              <a:ext uri="{FF2B5EF4-FFF2-40B4-BE49-F238E27FC236}">
-                <a16:creationId xmlns:a16="http://schemas.microsoft.com/office/drawing/2014/main" id="{C38E727F-4FE9-4943-9A29-A68D7FE9CB45}"/>
+          <p:cNvPr id="17" name="Down Arrow 16">
+            <a:extLst>
+              <a:ext uri="{FF2B5EF4-FFF2-40B4-BE49-F238E27FC236}">
+                <a16:creationId xmlns:a16="http://schemas.microsoft.com/office/drawing/2014/main" id="{79138125-78FD-2843-9EDB-DB6D8C3820EA}"/>
               </a:ext>
             </a:extLst>
           </p:cNvPr>
@@ -5329,9 +6216,9 @@
           <p:nvPr/>
         </p:nvSpPr>
         <p:spPr>
-          <a:xfrm rot="20675198">
-            <a:off x="2299675" y="4257985"/>
-            <a:ext cx="161365" cy="888316"/>
+          <a:xfrm>
+            <a:off x="2191458" y="4281057"/>
+            <a:ext cx="161365" cy="581892"/>
           </a:xfrm>
           <a:prstGeom prst="downArrow">
             <a:avLst>
@@ -5378,12 +6265,42 @@
           </a:p>
         </p:txBody>
       </p:sp>
-      <p:sp>
-        <p:nvSpPr>
-          <p:cNvPr id="26" name="Rectangle 25">
-            <a:extLst>
-              <a:ext uri="{FF2B5EF4-FFF2-40B4-BE49-F238E27FC236}">
-                <a16:creationId xmlns:a16="http://schemas.microsoft.com/office/drawing/2014/main" id="{6A8C3861-7AA5-7B4D-8171-C7F0BA70A786}"/>
+    </p:spTree>
+    <p:extLst>
+      <p:ext uri="{BB962C8B-B14F-4D97-AF65-F5344CB8AC3E}">
+        <p14:creationId xmlns:p14="http://schemas.microsoft.com/office/powerpoint/2010/main" val="1793701406"/>
+      </p:ext>
+    </p:extLst>
+  </p:cSld>
+  <p:clrMapOvr>
+    <a:masterClrMapping/>
+  </p:clrMapOvr>
+</p:sld>
+</file>
+
+<file path=ppt/slides/slide5.xml><?xml version="1.0" encoding="utf-8"?>
+<p:sld xmlns:a="http://schemas.openxmlformats.org/drawingml/2006/main" xmlns:r="http://schemas.openxmlformats.org/officeDocument/2006/relationships" xmlns:p="http://schemas.openxmlformats.org/presentationml/2006/main">
+  <p:cSld>
+    <p:spTree>
+      <p:nvGrpSpPr>
+        <p:cNvPr id="1" name=""/>
+        <p:cNvGrpSpPr/>
+        <p:nvPr/>
+      </p:nvGrpSpPr>
+      <p:grpSpPr>
+        <a:xfrm>
+          <a:off x="0" y="0"/>
+          <a:ext cx="0" cy="0"/>
+          <a:chOff x="0" y="0"/>
+          <a:chExt cx="0" cy="0"/>
+        </a:xfrm>
+      </p:grpSpPr>
+      <p:sp>
+        <p:nvSpPr>
+          <p:cNvPr id="11" name="Rectangle 10">
+            <a:extLst>
+              <a:ext uri="{FF2B5EF4-FFF2-40B4-BE49-F238E27FC236}">
+                <a16:creationId xmlns:a16="http://schemas.microsoft.com/office/drawing/2014/main" id="{F5DFF4CB-98E1-FF48-A069-97B4154B328B}"/>
               </a:ext>
             </a:extLst>
           </p:cNvPr>
@@ -5392,7 +6309,1124 @@
         </p:nvSpPr>
         <p:spPr>
           <a:xfrm>
-            <a:off x="1669306" y="5038827"/>
+            <a:off x="1752176" y="2632947"/>
+            <a:ext cx="1524001" cy="665018"/>
+          </a:xfrm>
+          <a:prstGeom prst="rect">
+            <a:avLst/>
+          </a:prstGeom>
+          <a:solidFill>
+            <a:schemeClr val="bg1">
+              <a:lumMod val="95000"/>
+              <a:alpha val="79584"/>
+            </a:schemeClr>
+          </a:solidFill>
+          <a:ln w="38100">
+            <a:solidFill>
+              <a:schemeClr val="bg2">
+                <a:lumMod val="50000"/>
+              </a:schemeClr>
+            </a:solidFill>
+          </a:ln>
+        </p:spPr>
+        <p:style>
+          <a:lnRef idx="2">
+            <a:schemeClr val="accent1">
+              <a:shade val="50000"/>
+            </a:schemeClr>
+          </a:lnRef>
+          <a:fillRef idx="1">
+            <a:schemeClr val="accent1"/>
+          </a:fillRef>
+          <a:effectRef idx="0">
+            <a:schemeClr val="accent1"/>
+          </a:effectRef>
+          <a:fontRef idx="minor">
+            <a:schemeClr val="lt1"/>
+          </a:fontRef>
+        </p:style>
+        <p:txBody>
+          <a:bodyPr rtlCol="0" anchor="ctr"/>
+          <a:lstStyle/>
+          <a:p>
+            <a:pPr algn="ctr"/>
+            <a:r>
+              <a:rPr lang="en-US" sz="2000" dirty="0">
+                <a:solidFill>
+                  <a:schemeClr val="tx1">
+                    <a:lumMod val="85000"/>
+                    <a:lumOff val="15000"/>
+                  </a:schemeClr>
+                </a:solidFill>
+              </a:rPr>
+              <a:t>Role</a:t>
+            </a:r>
+          </a:p>
+        </p:txBody>
+      </p:sp>
+      <p:sp>
+        <p:nvSpPr>
+          <p:cNvPr id="14" name="Down Arrow 13">
+            <a:extLst>
+              <a:ext uri="{FF2B5EF4-FFF2-40B4-BE49-F238E27FC236}">
+                <a16:creationId xmlns:a16="http://schemas.microsoft.com/office/drawing/2014/main" id="{7401979E-EFD4-3B4A-B5AE-34BF68CA615C}"/>
+              </a:ext>
+            </a:extLst>
+          </p:cNvPr>
+          <p:cNvSpPr/>
+          <p:nvPr/>
+        </p:nvSpPr>
+        <p:spPr>
+          <a:xfrm rot="20675198">
+            <a:off x="2302962" y="1764165"/>
+            <a:ext cx="161365" cy="888316"/>
+          </a:xfrm>
+          <a:prstGeom prst="downArrow">
+            <a:avLst>
+              <a:gd name="adj1" fmla="val 50000"/>
+              <a:gd name="adj2" fmla="val 129998"/>
+            </a:avLst>
+          </a:prstGeom>
+          <a:solidFill>
+            <a:schemeClr val="bg1">
+              <a:lumMod val="95000"/>
+              <a:alpha val="79584"/>
+            </a:schemeClr>
+          </a:solidFill>
+          <a:ln>
+            <a:solidFill>
+              <a:schemeClr val="bg2">
+                <a:lumMod val="50000"/>
+              </a:schemeClr>
+            </a:solidFill>
+          </a:ln>
+        </p:spPr>
+        <p:style>
+          <a:lnRef idx="2">
+            <a:schemeClr val="accent1">
+              <a:shade val="50000"/>
+            </a:schemeClr>
+          </a:lnRef>
+          <a:fillRef idx="1">
+            <a:schemeClr val="accent1"/>
+          </a:fillRef>
+          <a:effectRef idx="0">
+            <a:schemeClr val="accent1"/>
+          </a:effectRef>
+          <a:fontRef idx="minor">
+            <a:schemeClr val="lt1"/>
+          </a:fontRef>
+        </p:style>
+        <p:txBody>
+          <a:bodyPr rtlCol="0" anchor="ctr"/>
+          <a:lstStyle/>
+          <a:p>
+            <a:pPr algn="ctr"/>
+            <a:endParaRPr lang="en-US"/>
+          </a:p>
+        </p:txBody>
+      </p:sp>
+      <p:sp>
+        <p:nvSpPr>
+          <p:cNvPr id="10" name="Rectangle 9">
+            <a:extLst>
+              <a:ext uri="{FF2B5EF4-FFF2-40B4-BE49-F238E27FC236}">
+                <a16:creationId xmlns:a16="http://schemas.microsoft.com/office/drawing/2014/main" id="{B7F1EEC2-724B-1848-91A6-1DFD50EBDEE6}"/>
+              </a:ext>
+            </a:extLst>
+          </p:cNvPr>
+          <p:cNvSpPr/>
+          <p:nvPr/>
+        </p:nvSpPr>
+        <p:spPr>
+          <a:xfrm>
+            <a:off x="1671499" y="2545007"/>
+            <a:ext cx="1524001" cy="665018"/>
+          </a:xfrm>
+          <a:prstGeom prst="rect">
+            <a:avLst/>
+          </a:prstGeom>
+          <a:solidFill>
+            <a:schemeClr val="bg1">
+              <a:lumMod val="95000"/>
+              <a:alpha val="79584"/>
+            </a:schemeClr>
+          </a:solidFill>
+          <a:ln w="38100">
+            <a:solidFill>
+              <a:schemeClr val="bg2">
+                <a:lumMod val="50000"/>
+              </a:schemeClr>
+            </a:solidFill>
+          </a:ln>
+        </p:spPr>
+        <p:style>
+          <a:lnRef idx="2">
+            <a:schemeClr val="accent1">
+              <a:shade val="50000"/>
+            </a:schemeClr>
+          </a:lnRef>
+          <a:fillRef idx="1">
+            <a:schemeClr val="accent1"/>
+          </a:fillRef>
+          <a:effectRef idx="0">
+            <a:schemeClr val="accent1"/>
+          </a:effectRef>
+          <a:fontRef idx="minor">
+            <a:schemeClr val="lt1"/>
+          </a:fontRef>
+        </p:style>
+        <p:txBody>
+          <a:bodyPr rtlCol="0" anchor="ctr"/>
+          <a:lstStyle/>
+          <a:p>
+            <a:pPr algn="ctr"/>
+            <a:r>
+              <a:rPr lang="en-US" sz="2000" dirty="0">
+                <a:solidFill>
+                  <a:schemeClr val="tx1">
+                    <a:lumMod val="85000"/>
+                    <a:lumOff val="15000"/>
+                  </a:schemeClr>
+                </a:solidFill>
+              </a:rPr>
+              <a:t>Role</a:t>
+            </a:r>
+          </a:p>
+        </p:txBody>
+      </p:sp>
+      <p:sp>
+        <p:nvSpPr>
+          <p:cNvPr id="13" name="Down Arrow 12">
+            <a:extLst>
+              <a:ext uri="{FF2B5EF4-FFF2-40B4-BE49-F238E27FC236}">
+                <a16:creationId xmlns:a16="http://schemas.microsoft.com/office/drawing/2014/main" id="{B4CDB232-AE9B-3D4F-B146-8B666553560E}"/>
+              </a:ext>
+            </a:extLst>
+          </p:cNvPr>
+          <p:cNvSpPr/>
+          <p:nvPr/>
+        </p:nvSpPr>
+        <p:spPr>
+          <a:xfrm rot="21000000">
+            <a:off x="2264270" y="1772155"/>
+            <a:ext cx="161365" cy="772627"/>
+          </a:xfrm>
+          <a:prstGeom prst="downArrow">
+            <a:avLst>
+              <a:gd name="adj1" fmla="val 50000"/>
+              <a:gd name="adj2" fmla="val 129998"/>
+            </a:avLst>
+          </a:prstGeom>
+          <a:solidFill>
+            <a:schemeClr val="bg1">
+              <a:lumMod val="95000"/>
+              <a:alpha val="79584"/>
+            </a:schemeClr>
+          </a:solidFill>
+          <a:ln>
+            <a:solidFill>
+              <a:schemeClr val="bg2">
+                <a:lumMod val="50000"/>
+              </a:schemeClr>
+            </a:solidFill>
+          </a:ln>
+        </p:spPr>
+        <p:style>
+          <a:lnRef idx="2">
+            <a:schemeClr val="accent1">
+              <a:shade val="50000"/>
+            </a:schemeClr>
+          </a:lnRef>
+          <a:fillRef idx="1">
+            <a:schemeClr val="accent1"/>
+          </a:fillRef>
+          <a:effectRef idx="0">
+            <a:schemeClr val="accent1"/>
+          </a:effectRef>
+          <a:fontRef idx="minor">
+            <a:schemeClr val="lt1"/>
+          </a:fontRef>
+        </p:style>
+        <p:txBody>
+          <a:bodyPr rtlCol="0" anchor="ctr"/>
+          <a:lstStyle/>
+          <a:p>
+            <a:pPr algn="ctr"/>
+            <a:endParaRPr lang="en-US"/>
+          </a:p>
+        </p:txBody>
+      </p:sp>
+      <p:sp>
+        <p:nvSpPr>
+          <p:cNvPr id="9" name="Rectangle 8">
+            <a:extLst>
+              <a:ext uri="{FF2B5EF4-FFF2-40B4-BE49-F238E27FC236}">
+                <a16:creationId xmlns:a16="http://schemas.microsoft.com/office/drawing/2014/main" id="{6F7D0253-8737-834F-8F03-1696179FCA7C}"/>
+              </a:ext>
+            </a:extLst>
+          </p:cNvPr>
+          <p:cNvSpPr/>
+          <p:nvPr/>
+        </p:nvSpPr>
+        <p:spPr>
+          <a:xfrm>
+            <a:off x="1590822" y="2457068"/>
+            <a:ext cx="1524001" cy="665018"/>
+          </a:xfrm>
+          <a:prstGeom prst="rect">
+            <a:avLst/>
+          </a:prstGeom>
+          <a:solidFill>
+            <a:schemeClr val="bg1">
+              <a:lumMod val="95000"/>
+              <a:alpha val="79584"/>
+            </a:schemeClr>
+          </a:solidFill>
+          <a:ln w="38100">
+            <a:solidFill>
+              <a:schemeClr val="bg2">
+                <a:lumMod val="50000"/>
+              </a:schemeClr>
+            </a:solidFill>
+          </a:ln>
+        </p:spPr>
+        <p:style>
+          <a:lnRef idx="2">
+            <a:schemeClr val="accent1">
+              <a:shade val="50000"/>
+            </a:schemeClr>
+          </a:lnRef>
+          <a:fillRef idx="1">
+            <a:schemeClr val="accent1"/>
+          </a:fillRef>
+          <a:effectRef idx="0">
+            <a:schemeClr val="accent1"/>
+          </a:effectRef>
+          <a:fontRef idx="minor">
+            <a:schemeClr val="lt1"/>
+          </a:fontRef>
+        </p:style>
+        <p:txBody>
+          <a:bodyPr rtlCol="0" anchor="ctr"/>
+          <a:lstStyle/>
+          <a:p>
+            <a:pPr algn="ctr"/>
+            <a:r>
+              <a:rPr lang="en-US" sz="2000" dirty="0">
+                <a:solidFill>
+                  <a:schemeClr val="tx1">
+                    <a:lumMod val="85000"/>
+                    <a:lumOff val="15000"/>
+                  </a:schemeClr>
+                </a:solidFill>
+              </a:rPr>
+              <a:t>Role</a:t>
+            </a:r>
+          </a:p>
+        </p:txBody>
+      </p:sp>
+      <p:sp>
+        <p:nvSpPr>
+          <p:cNvPr id="12" name="Down Arrow 11">
+            <a:extLst>
+              <a:ext uri="{FF2B5EF4-FFF2-40B4-BE49-F238E27FC236}">
+                <a16:creationId xmlns:a16="http://schemas.microsoft.com/office/drawing/2014/main" id="{6CFDBBEA-1C60-B94C-BA5B-0530357207B3}"/>
+              </a:ext>
+            </a:extLst>
+          </p:cNvPr>
+          <p:cNvSpPr/>
+          <p:nvPr/>
+        </p:nvSpPr>
+        <p:spPr>
+          <a:xfrm rot="21300000">
+            <a:off x="2216826" y="1778094"/>
+            <a:ext cx="161365" cy="672768"/>
+          </a:xfrm>
+          <a:prstGeom prst="downArrow">
+            <a:avLst>
+              <a:gd name="adj1" fmla="val 50000"/>
+              <a:gd name="adj2" fmla="val 129998"/>
+            </a:avLst>
+          </a:prstGeom>
+          <a:solidFill>
+            <a:schemeClr val="bg1">
+              <a:lumMod val="95000"/>
+              <a:alpha val="79584"/>
+            </a:schemeClr>
+          </a:solidFill>
+          <a:ln>
+            <a:solidFill>
+              <a:schemeClr val="bg2">
+                <a:lumMod val="50000"/>
+              </a:schemeClr>
+            </a:solidFill>
+          </a:ln>
+        </p:spPr>
+        <p:style>
+          <a:lnRef idx="2">
+            <a:schemeClr val="accent1">
+              <a:shade val="50000"/>
+            </a:schemeClr>
+          </a:lnRef>
+          <a:fillRef idx="1">
+            <a:schemeClr val="accent1"/>
+          </a:fillRef>
+          <a:effectRef idx="0">
+            <a:schemeClr val="accent1"/>
+          </a:effectRef>
+          <a:fontRef idx="minor">
+            <a:schemeClr val="lt1"/>
+          </a:fontRef>
+        </p:style>
+        <p:txBody>
+          <a:bodyPr rtlCol="0" anchor="ctr"/>
+          <a:lstStyle/>
+          <a:p>
+            <a:pPr algn="ctr"/>
+            <a:endParaRPr lang="en-US"/>
+          </a:p>
+        </p:txBody>
+      </p:sp>
+      <p:sp>
+        <p:nvSpPr>
+          <p:cNvPr id="2" name="Rectangle 1">
+            <a:extLst>
+              <a:ext uri="{FF2B5EF4-FFF2-40B4-BE49-F238E27FC236}">
+                <a16:creationId xmlns:a16="http://schemas.microsoft.com/office/drawing/2014/main" id="{9B7387F5-ACA9-7141-97D3-A62F3221BA74}"/>
+              </a:ext>
+            </a:extLst>
+          </p:cNvPr>
+          <p:cNvSpPr/>
+          <p:nvPr/>
+        </p:nvSpPr>
+        <p:spPr>
+          <a:xfrm>
+            <a:off x="1510145" y="1122219"/>
+            <a:ext cx="1524001" cy="665018"/>
+          </a:xfrm>
+          <a:prstGeom prst="rect">
+            <a:avLst/>
+          </a:prstGeom>
+          <a:solidFill>
+            <a:schemeClr val="bg1">
+              <a:lumMod val="95000"/>
+              <a:alpha val="79584"/>
+            </a:schemeClr>
+          </a:solidFill>
+          <a:ln w="38100">
+            <a:solidFill>
+              <a:schemeClr val="bg2">
+                <a:lumMod val="50000"/>
+              </a:schemeClr>
+            </a:solidFill>
+          </a:ln>
+        </p:spPr>
+        <p:style>
+          <a:lnRef idx="2">
+            <a:schemeClr val="accent1">
+              <a:shade val="50000"/>
+            </a:schemeClr>
+          </a:lnRef>
+          <a:fillRef idx="1">
+            <a:schemeClr val="accent1"/>
+          </a:fillRef>
+          <a:effectRef idx="0">
+            <a:schemeClr val="accent1"/>
+          </a:effectRef>
+          <a:fontRef idx="minor">
+            <a:schemeClr val="lt1"/>
+          </a:fontRef>
+        </p:style>
+        <p:txBody>
+          <a:bodyPr rtlCol="0" anchor="ctr"/>
+          <a:lstStyle/>
+          <a:p>
+            <a:pPr algn="ctr"/>
+            <a:r>
+              <a:rPr lang="en-US" sz="2000" dirty="0">
+                <a:solidFill>
+                  <a:schemeClr val="tx1">
+                    <a:lumMod val="85000"/>
+                    <a:lumOff val="15000"/>
+                  </a:schemeClr>
+                </a:solidFill>
+              </a:rPr>
+              <a:t>User</a:t>
+            </a:r>
+          </a:p>
+        </p:txBody>
+      </p:sp>
+      <p:sp>
+        <p:nvSpPr>
+          <p:cNvPr id="5" name="Rectangle 4">
+            <a:extLst>
+              <a:ext uri="{FF2B5EF4-FFF2-40B4-BE49-F238E27FC236}">
+                <a16:creationId xmlns:a16="http://schemas.microsoft.com/office/drawing/2014/main" id="{D1CCEEB6-0FB9-4C4E-A7F2-C6729B9FC8EA}"/>
+              </a:ext>
+            </a:extLst>
+          </p:cNvPr>
+          <p:cNvSpPr/>
+          <p:nvPr/>
+        </p:nvSpPr>
+        <p:spPr>
+          <a:xfrm>
+            <a:off x="1510145" y="2369129"/>
+            <a:ext cx="1524001" cy="665018"/>
+          </a:xfrm>
+          <a:prstGeom prst="rect">
+            <a:avLst/>
+          </a:prstGeom>
+          <a:solidFill>
+            <a:schemeClr val="bg1">
+              <a:lumMod val="95000"/>
+              <a:alpha val="79584"/>
+            </a:schemeClr>
+          </a:solidFill>
+          <a:ln w="38100">
+            <a:solidFill>
+              <a:schemeClr val="bg2">
+                <a:lumMod val="50000"/>
+              </a:schemeClr>
+            </a:solidFill>
+          </a:ln>
+        </p:spPr>
+        <p:style>
+          <a:lnRef idx="2">
+            <a:schemeClr val="accent1">
+              <a:shade val="50000"/>
+            </a:schemeClr>
+          </a:lnRef>
+          <a:fillRef idx="1">
+            <a:schemeClr val="accent1"/>
+          </a:fillRef>
+          <a:effectRef idx="0">
+            <a:schemeClr val="accent1"/>
+          </a:effectRef>
+          <a:fontRef idx="minor">
+            <a:schemeClr val="lt1"/>
+          </a:fontRef>
+        </p:style>
+        <p:txBody>
+          <a:bodyPr rtlCol="0" anchor="ctr"/>
+          <a:lstStyle/>
+          <a:p>
+            <a:pPr algn="ctr"/>
+            <a:r>
+              <a:rPr lang="en-US" sz="2000" dirty="0">
+                <a:solidFill>
+                  <a:schemeClr val="tx1">
+                    <a:lumMod val="85000"/>
+                    <a:lumOff val="15000"/>
+                  </a:schemeClr>
+                </a:solidFill>
+              </a:rPr>
+              <a:t>Role</a:t>
+            </a:r>
+          </a:p>
+        </p:txBody>
+      </p:sp>
+      <p:sp>
+        <p:nvSpPr>
+          <p:cNvPr id="15" name="Down Arrow 14">
+            <a:extLst>
+              <a:ext uri="{FF2B5EF4-FFF2-40B4-BE49-F238E27FC236}">
+                <a16:creationId xmlns:a16="http://schemas.microsoft.com/office/drawing/2014/main" id="{03FE2F9B-D768-9846-AF7E-C97F162AF435}"/>
+              </a:ext>
+            </a:extLst>
+          </p:cNvPr>
+          <p:cNvSpPr/>
+          <p:nvPr/>
+        </p:nvSpPr>
+        <p:spPr>
+          <a:xfrm>
+            <a:off x="2191459" y="1787237"/>
+            <a:ext cx="161365" cy="581892"/>
+          </a:xfrm>
+          <a:prstGeom prst="downArrow">
+            <a:avLst>
+              <a:gd name="adj1" fmla="val 50000"/>
+              <a:gd name="adj2" fmla="val 129998"/>
+            </a:avLst>
+          </a:prstGeom>
+          <a:solidFill>
+            <a:schemeClr val="bg1">
+              <a:lumMod val="95000"/>
+              <a:alpha val="79584"/>
+            </a:schemeClr>
+          </a:solidFill>
+          <a:ln>
+            <a:solidFill>
+              <a:schemeClr val="bg2">
+                <a:lumMod val="50000"/>
+              </a:schemeClr>
+            </a:solidFill>
+          </a:ln>
+        </p:spPr>
+        <p:style>
+          <a:lnRef idx="2">
+            <a:schemeClr val="accent1">
+              <a:shade val="50000"/>
+            </a:schemeClr>
+          </a:lnRef>
+          <a:fillRef idx="1">
+            <a:schemeClr val="accent1"/>
+          </a:fillRef>
+          <a:effectRef idx="0">
+            <a:schemeClr val="accent1"/>
+          </a:effectRef>
+          <a:fontRef idx="minor">
+            <a:schemeClr val="lt1"/>
+          </a:fontRef>
+        </p:style>
+        <p:txBody>
+          <a:bodyPr rtlCol="0" anchor="ctr"/>
+          <a:lstStyle/>
+          <a:p>
+            <a:pPr algn="ctr"/>
+            <a:endParaRPr lang="en-US"/>
+          </a:p>
+        </p:txBody>
+      </p:sp>
+      <p:sp>
+        <p:nvSpPr>
+          <p:cNvPr id="16" name="Rectangle 15">
+            <a:extLst>
+              <a:ext uri="{FF2B5EF4-FFF2-40B4-BE49-F238E27FC236}">
+                <a16:creationId xmlns:a16="http://schemas.microsoft.com/office/drawing/2014/main" id="{A5CA0DB8-57EB-C840-9FDD-2EBAFE84633F}"/>
+              </a:ext>
+            </a:extLst>
+          </p:cNvPr>
+          <p:cNvSpPr/>
+          <p:nvPr/>
+        </p:nvSpPr>
+        <p:spPr>
+          <a:xfrm>
+            <a:off x="1752173" y="3879857"/>
+            <a:ext cx="1524001" cy="665018"/>
+          </a:xfrm>
+          <a:prstGeom prst="rect">
+            <a:avLst/>
+          </a:prstGeom>
+          <a:solidFill>
+            <a:schemeClr val="bg1">
+              <a:lumMod val="95000"/>
+              <a:alpha val="79584"/>
+            </a:schemeClr>
+          </a:solidFill>
+          <a:ln w="38100">
+            <a:solidFill>
+              <a:schemeClr val="bg2">
+                <a:lumMod val="50000"/>
+              </a:schemeClr>
+            </a:solidFill>
+          </a:ln>
+        </p:spPr>
+        <p:style>
+          <a:lnRef idx="2">
+            <a:schemeClr val="accent1">
+              <a:shade val="50000"/>
+            </a:schemeClr>
+          </a:lnRef>
+          <a:fillRef idx="1">
+            <a:schemeClr val="accent1"/>
+          </a:fillRef>
+          <a:effectRef idx="0">
+            <a:schemeClr val="accent1"/>
+          </a:effectRef>
+          <a:fontRef idx="minor">
+            <a:schemeClr val="lt1"/>
+          </a:fontRef>
+        </p:style>
+        <p:txBody>
+          <a:bodyPr rtlCol="0" anchor="ctr"/>
+          <a:lstStyle/>
+          <a:p>
+            <a:pPr algn="ctr"/>
+            <a:r>
+              <a:rPr lang="en-US" sz="2000" dirty="0">
+                <a:solidFill>
+                  <a:schemeClr val="tx1">
+                    <a:lumMod val="85000"/>
+                    <a:lumOff val="15000"/>
+                  </a:schemeClr>
+                </a:solidFill>
+              </a:rPr>
+              <a:t>Permission</a:t>
+            </a:r>
+          </a:p>
+        </p:txBody>
+      </p:sp>
+      <p:sp>
+        <p:nvSpPr>
+          <p:cNvPr id="19" name="Down Arrow 18">
+            <a:extLst>
+              <a:ext uri="{FF2B5EF4-FFF2-40B4-BE49-F238E27FC236}">
+                <a16:creationId xmlns:a16="http://schemas.microsoft.com/office/drawing/2014/main" id="{F937787E-F591-AB4A-AA83-E0EA75AB4B38}"/>
+              </a:ext>
+            </a:extLst>
+          </p:cNvPr>
+          <p:cNvSpPr/>
+          <p:nvPr/>
+        </p:nvSpPr>
+        <p:spPr>
+          <a:xfrm rot="20675198">
+            <a:off x="2302959" y="3011075"/>
+            <a:ext cx="161365" cy="888316"/>
+          </a:xfrm>
+          <a:prstGeom prst="downArrow">
+            <a:avLst>
+              <a:gd name="adj1" fmla="val 50000"/>
+              <a:gd name="adj2" fmla="val 129998"/>
+            </a:avLst>
+          </a:prstGeom>
+          <a:solidFill>
+            <a:schemeClr val="bg1">
+              <a:lumMod val="95000"/>
+              <a:alpha val="79584"/>
+            </a:schemeClr>
+          </a:solidFill>
+          <a:ln>
+            <a:solidFill>
+              <a:schemeClr val="bg2">
+                <a:lumMod val="50000"/>
+              </a:schemeClr>
+            </a:solidFill>
+          </a:ln>
+        </p:spPr>
+        <p:style>
+          <a:lnRef idx="2">
+            <a:schemeClr val="accent1">
+              <a:shade val="50000"/>
+            </a:schemeClr>
+          </a:lnRef>
+          <a:fillRef idx="1">
+            <a:schemeClr val="accent1"/>
+          </a:fillRef>
+          <a:effectRef idx="0">
+            <a:schemeClr val="accent1"/>
+          </a:effectRef>
+          <a:fontRef idx="minor">
+            <a:schemeClr val="lt1"/>
+          </a:fontRef>
+        </p:style>
+        <p:txBody>
+          <a:bodyPr rtlCol="0" anchor="ctr"/>
+          <a:lstStyle/>
+          <a:p>
+            <a:pPr algn="ctr"/>
+            <a:endParaRPr lang="en-US"/>
+          </a:p>
+        </p:txBody>
+      </p:sp>
+      <p:sp>
+        <p:nvSpPr>
+          <p:cNvPr id="20" name="Rectangle 19">
+            <a:extLst>
+              <a:ext uri="{FF2B5EF4-FFF2-40B4-BE49-F238E27FC236}">
+                <a16:creationId xmlns:a16="http://schemas.microsoft.com/office/drawing/2014/main" id="{6BAE310D-B37C-A241-920E-315A7306B033}"/>
+              </a:ext>
+            </a:extLst>
+          </p:cNvPr>
+          <p:cNvSpPr/>
+          <p:nvPr/>
+        </p:nvSpPr>
+        <p:spPr>
+          <a:xfrm>
+            <a:off x="1671496" y="3791917"/>
+            <a:ext cx="1524001" cy="665018"/>
+          </a:xfrm>
+          <a:prstGeom prst="rect">
+            <a:avLst/>
+          </a:prstGeom>
+          <a:solidFill>
+            <a:schemeClr val="bg1">
+              <a:lumMod val="95000"/>
+              <a:alpha val="79584"/>
+            </a:schemeClr>
+          </a:solidFill>
+          <a:ln w="38100">
+            <a:solidFill>
+              <a:schemeClr val="bg2">
+                <a:lumMod val="50000"/>
+              </a:schemeClr>
+            </a:solidFill>
+          </a:ln>
+        </p:spPr>
+        <p:style>
+          <a:lnRef idx="2">
+            <a:schemeClr val="accent1">
+              <a:shade val="50000"/>
+            </a:schemeClr>
+          </a:lnRef>
+          <a:fillRef idx="1">
+            <a:schemeClr val="accent1"/>
+          </a:fillRef>
+          <a:effectRef idx="0">
+            <a:schemeClr val="accent1"/>
+          </a:effectRef>
+          <a:fontRef idx="minor">
+            <a:schemeClr val="lt1"/>
+          </a:fontRef>
+        </p:style>
+        <p:txBody>
+          <a:bodyPr rtlCol="0" anchor="ctr"/>
+          <a:lstStyle/>
+          <a:p>
+            <a:pPr algn="ctr"/>
+            <a:r>
+              <a:rPr lang="en-US" sz="2000" dirty="0">
+                <a:solidFill>
+                  <a:schemeClr val="tx1">
+                    <a:lumMod val="85000"/>
+                    <a:lumOff val="15000"/>
+                  </a:schemeClr>
+                </a:solidFill>
+              </a:rPr>
+              <a:t>Permission</a:t>
+            </a:r>
+          </a:p>
+        </p:txBody>
+      </p:sp>
+      <p:sp>
+        <p:nvSpPr>
+          <p:cNvPr id="21" name="Down Arrow 20">
+            <a:extLst>
+              <a:ext uri="{FF2B5EF4-FFF2-40B4-BE49-F238E27FC236}">
+                <a16:creationId xmlns:a16="http://schemas.microsoft.com/office/drawing/2014/main" id="{675138C8-4353-E442-A21C-738EAB141FBE}"/>
+              </a:ext>
+            </a:extLst>
+          </p:cNvPr>
+          <p:cNvSpPr/>
+          <p:nvPr/>
+        </p:nvSpPr>
+        <p:spPr>
+          <a:xfrm rot="21000000">
+            <a:off x="2264267" y="3019065"/>
+            <a:ext cx="161365" cy="772627"/>
+          </a:xfrm>
+          <a:prstGeom prst="downArrow">
+            <a:avLst>
+              <a:gd name="adj1" fmla="val 50000"/>
+              <a:gd name="adj2" fmla="val 129998"/>
+            </a:avLst>
+          </a:prstGeom>
+          <a:solidFill>
+            <a:schemeClr val="bg1">
+              <a:lumMod val="95000"/>
+              <a:alpha val="79584"/>
+            </a:schemeClr>
+          </a:solidFill>
+          <a:ln>
+            <a:solidFill>
+              <a:schemeClr val="bg2">
+                <a:lumMod val="50000"/>
+              </a:schemeClr>
+            </a:solidFill>
+          </a:ln>
+        </p:spPr>
+        <p:style>
+          <a:lnRef idx="2">
+            <a:schemeClr val="accent1">
+              <a:shade val="50000"/>
+            </a:schemeClr>
+          </a:lnRef>
+          <a:fillRef idx="1">
+            <a:schemeClr val="accent1"/>
+          </a:fillRef>
+          <a:effectRef idx="0">
+            <a:schemeClr val="accent1"/>
+          </a:effectRef>
+          <a:fontRef idx="minor">
+            <a:schemeClr val="lt1"/>
+          </a:fontRef>
+        </p:style>
+        <p:txBody>
+          <a:bodyPr rtlCol="0" anchor="ctr"/>
+          <a:lstStyle/>
+          <a:p>
+            <a:pPr algn="ctr"/>
+            <a:endParaRPr lang="en-US"/>
+          </a:p>
+        </p:txBody>
+      </p:sp>
+      <p:sp>
+        <p:nvSpPr>
+          <p:cNvPr id="22" name="Rectangle 21">
+            <a:extLst>
+              <a:ext uri="{FF2B5EF4-FFF2-40B4-BE49-F238E27FC236}">
+                <a16:creationId xmlns:a16="http://schemas.microsoft.com/office/drawing/2014/main" id="{90B2ED0E-B620-C64A-8FFB-6879542442F6}"/>
+              </a:ext>
+            </a:extLst>
+          </p:cNvPr>
+          <p:cNvSpPr/>
+          <p:nvPr/>
+        </p:nvSpPr>
+        <p:spPr>
+          <a:xfrm>
+            <a:off x="1590819" y="3703978"/>
+            <a:ext cx="1524001" cy="665018"/>
+          </a:xfrm>
+          <a:prstGeom prst="rect">
+            <a:avLst/>
+          </a:prstGeom>
+          <a:solidFill>
+            <a:schemeClr val="bg1">
+              <a:lumMod val="95000"/>
+              <a:alpha val="79584"/>
+            </a:schemeClr>
+          </a:solidFill>
+          <a:ln w="38100">
+            <a:solidFill>
+              <a:schemeClr val="bg2">
+                <a:lumMod val="50000"/>
+              </a:schemeClr>
+            </a:solidFill>
+          </a:ln>
+        </p:spPr>
+        <p:style>
+          <a:lnRef idx="2">
+            <a:schemeClr val="accent1">
+              <a:shade val="50000"/>
+            </a:schemeClr>
+          </a:lnRef>
+          <a:fillRef idx="1">
+            <a:schemeClr val="accent1"/>
+          </a:fillRef>
+          <a:effectRef idx="0">
+            <a:schemeClr val="accent1"/>
+          </a:effectRef>
+          <a:fontRef idx="minor">
+            <a:schemeClr val="lt1"/>
+          </a:fontRef>
+        </p:style>
+        <p:txBody>
+          <a:bodyPr rtlCol="0" anchor="ctr"/>
+          <a:lstStyle/>
+          <a:p>
+            <a:pPr algn="ctr"/>
+            <a:r>
+              <a:rPr lang="en-US" sz="2000" dirty="0">
+                <a:solidFill>
+                  <a:schemeClr val="tx1">
+                    <a:lumMod val="85000"/>
+                    <a:lumOff val="15000"/>
+                  </a:schemeClr>
+                </a:solidFill>
+              </a:rPr>
+              <a:t>Permission</a:t>
+            </a:r>
+          </a:p>
+        </p:txBody>
+      </p:sp>
+      <p:sp>
+        <p:nvSpPr>
+          <p:cNvPr id="23" name="Down Arrow 22">
+            <a:extLst>
+              <a:ext uri="{FF2B5EF4-FFF2-40B4-BE49-F238E27FC236}">
+                <a16:creationId xmlns:a16="http://schemas.microsoft.com/office/drawing/2014/main" id="{09C43943-FB10-2F4E-A6DD-A0608F650847}"/>
+              </a:ext>
+            </a:extLst>
+          </p:cNvPr>
+          <p:cNvSpPr/>
+          <p:nvPr/>
+        </p:nvSpPr>
+        <p:spPr>
+          <a:xfrm rot="21300000">
+            <a:off x="2216823" y="3025004"/>
+            <a:ext cx="161365" cy="672768"/>
+          </a:xfrm>
+          <a:prstGeom prst="downArrow">
+            <a:avLst>
+              <a:gd name="adj1" fmla="val 50000"/>
+              <a:gd name="adj2" fmla="val 129998"/>
+            </a:avLst>
+          </a:prstGeom>
+          <a:solidFill>
+            <a:schemeClr val="bg1">
+              <a:lumMod val="95000"/>
+              <a:alpha val="79584"/>
+            </a:schemeClr>
+          </a:solidFill>
+          <a:ln>
+            <a:solidFill>
+              <a:schemeClr val="bg2">
+                <a:lumMod val="50000"/>
+              </a:schemeClr>
+            </a:solidFill>
+          </a:ln>
+        </p:spPr>
+        <p:style>
+          <a:lnRef idx="2">
+            <a:schemeClr val="accent1">
+              <a:shade val="50000"/>
+            </a:schemeClr>
+          </a:lnRef>
+          <a:fillRef idx="1">
+            <a:schemeClr val="accent1"/>
+          </a:fillRef>
+          <a:effectRef idx="0">
+            <a:schemeClr val="accent1"/>
+          </a:effectRef>
+          <a:fontRef idx="minor">
+            <a:schemeClr val="lt1"/>
+          </a:fontRef>
+        </p:style>
+        <p:txBody>
+          <a:bodyPr rtlCol="0" anchor="ctr"/>
+          <a:lstStyle/>
+          <a:p>
+            <a:pPr algn="ctr"/>
+            <a:endParaRPr lang="en-US"/>
+          </a:p>
+        </p:txBody>
+      </p:sp>
+      <p:sp>
+        <p:nvSpPr>
+          <p:cNvPr id="6" name="Rectangle 5">
+            <a:extLst>
+              <a:ext uri="{FF2B5EF4-FFF2-40B4-BE49-F238E27FC236}">
+                <a16:creationId xmlns:a16="http://schemas.microsoft.com/office/drawing/2014/main" id="{292A8187-D086-6241-BD43-8F4A54EACBD1}"/>
+              </a:ext>
+            </a:extLst>
+          </p:cNvPr>
+          <p:cNvSpPr/>
+          <p:nvPr/>
+        </p:nvSpPr>
+        <p:spPr>
+          <a:xfrm>
+            <a:off x="1510142" y="3616039"/>
+            <a:ext cx="1524001" cy="665018"/>
+          </a:xfrm>
+          <a:prstGeom prst="rect">
+            <a:avLst/>
+          </a:prstGeom>
+          <a:solidFill>
+            <a:schemeClr val="bg1">
+              <a:lumMod val="95000"/>
+              <a:alpha val="79584"/>
+            </a:schemeClr>
+          </a:solidFill>
+          <a:ln w="38100">
+            <a:solidFill>
+              <a:schemeClr val="bg2">
+                <a:lumMod val="50000"/>
+              </a:schemeClr>
+            </a:solidFill>
+          </a:ln>
+        </p:spPr>
+        <p:style>
+          <a:lnRef idx="2">
+            <a:schemeClr val="accent1">
+              <a:shade val="50000"/>
+            </a:schemeClr>
+          </a:lnRef>
+          <a:fillRef idx="1">
+            <a:schemeClr val="accent1"/>
+          </a:fillRef>
+          <a:effectRef idx="0">
+            <a:schemeClr val="accent1"/>
+          </a:effectRef>
+          <a:fontRef idx="minor">
+            <a:schemeClr val="lt1"/>
+          </a:fontRef>
+        </p:style>
+        <p:txBody>
+          <a:bodyPr rtlCol="0" anchor="ctr"/>
+          <a:lstStyle/>
+          <a:p>
+            <a:pPr algn="ctr"/>
+            <a:r>
+              <a:rPr lang="en-US" sz="2000" dirty="0">
+                <a:solidFill>
+                  <a:schemeClr val="tx1">
+                    <a:lumMod val="85000"/>
+                    <a:lumOff val="15000"/>
+                  </a:schemeClr>
+                </a:solidFill>
+              </a:rPr>
+              <a:t>Permission</a:t>
+            </a:r>
+          </a:p>
+        </p:txBody>
+      </p:sp>
+      <p:sp>
+        <p:nvSpPr>
+          <p:cNvPr id="18" name="Down Arrow 17">
+            <a:extLst>
+              <a:ext uri="{FF2B5EF4-FFF2-40B4-BE49-F238E27FC236}">
+                <a16:creationId xmlns:a16="http://schemas.microsoft.com/office/drawing/2014/main" id="{A8DAD2EC-3E9B-E942-96A2-159C54469EE2}"/>
+              </a:ext>
+            </a:extLst>
+          </p:cNvPr>
+          <p:cNvSpPr/>
+          <p:nvPr/>
+        </p:nvSpPr>
+        <p:spPr>
+          <a:xfrm>
+            <a:off x="2191459" y="3029199"/>
+            <a:ext cx="161365" cy="581892"/>
+          </a:xfrm>
+          <a:prstGeom prst="downArrow">
+            <a:avLst>
+              <a:gd name="adj1" fmla="val 50000"/>
+              <a:gd name="adj2" fmla="val 129998"/>
+            </a:avLst>
+          </a:prstGeom>
+          <a:solidFill>
+            <a:schemeClr val="bg1">
+              <a:lumMod val="95000"/>
+              <a:alpha val="79584"/>
+            </a:schemeClr>
+          </a:solidFill>
+          <a:ln>
+            <a:solidFill>
+              <a:schemeClr val="bg2">
+                <a:lumMod val="50000"/>
+              </a:schemeClr>
+            </a:solidFill>
+          </a:ln>
+        </p:spPr>
+        <p:style>
+          <a:lnRef idx="2">
+            <a:schemeClr val="accent1">
+              <a:shade val="50000"/>
+            </a:schemeClr>
+          </a:lnRef>
+          <a:fillRef idx="1">
+            <a:schemeClr val="accent1"/>
+          </a:fillRef>
+          <a:effectRef idx="0">
+            <a:schemeClr val="accent1"/>
+          </a:effectRef>
+          <a:fontRef idx="minor">
+            <a:schemeClr val="lt1"/>
+          </a:fontRef>
+        </p:style>
+        <p:txBody>
+          <a:bodyPr rtlCol="0" anchor="ctr"/>
+          <a:lstStyle/>
+          <a:p>
+            <a:pPr algn="ctr"/>
+            <a:endParaRPr lang="en-US"/>
+          </a:p>
+        </p:txBody>
+      </p:sp>
+      <p:sp>
+        <p:nvSpPr>
+          <p:cNvPr id="24" name="Rectangle 23">
+            <a:extLst>
+              <a:ext uri="{FF2B5EF4-FFF2-40B4-BE49-F238E27FC236}">
+                <a16:creationId xmlns:a16="http://schemas.microsoft.com/office/drawing/2014/main" id="{4D48405B-FC50-FE48-9864-E65F44D6BEA9}"/>
+              </a:ext>
+            </a:extLst>
+          </p:cNvPr>
+          <p:cNvSpPr/>
+          <p:nvPr/>
+        </p:nvSpPr>
+        <p:spPr>
+          <a:xfrm>
+            <a:off x="1748889" y="5126767"/>
             <a:ext cx="1524001" cy="665018"/>
           </a:xfrm>
           <a:prstGeom prst="rect">
@@ -5449,10 +7483,10 @@
       </p:sp>
       <p:sp>
         <p:nvSpPr>
-          <p:cNvPr id="27" name="Down Arrow 26">
-            <a:extLst>
-              <a:ext uri="{FF2B5EF4-FFF2-40B4-BE49-F238E27FC236}">
-                <a16:creationId xmlns:a16="http://schemas.microsoft.com/office/drawing/2014/main" id="{68F6EEB0-BC58-E14D-8679-11B822C5F9D6}"/>
+          <p:cNvPr id="25" name="Down Arrow 24">
+            <a:extLst>
+              <a:ext uri="{FF2B5EF4-FFF2-40B4-BE49-F238E27FC236}">
+                <a16:creationId xmlns:a16="http://schemas.microsoft.com/office/drawing/2014/main" id="{C38E727F-4FE9-4943-9A29-A68D7FE9CB45}"/>
               </a:ext>
             </a:extLst>
           </p:cNvPr>
@@ -5460,9 +7494,9 @@
           <p:nvPr/>
         </p:nvSpPr>
         <p:spPr>
-          <a:xfrm rot="21000000">
-            <a:off x="2260983" y="4265975"/>
-            <a:ext cx="161365" cy="772627"/>
+          <a:xfrm rot="20675198">
+            <a:off x="2299675" y="4257985"/>
+            <a:ext cx="161365" cy="888316"/>
           </a:xfrm>
           <a:prstGeom prst="downArrow">
             <a:avLst>
@@ -5511,10 +7545,10 @@
       </p:sp>
       <p:sp>
         <p:nvSpPr>
-          <p:cNvPr id="28" name="Rectangle 27">
-            <a:extLst>
-              <a:ext uri="{FF2B5EF4-FFF2-40B4-BE49-F238E27FC236}">
-                <a16:creationId xmlns:a16="http://schemas.microsoft.com/office/drawing/2014/main" id="{EDF4912B-F808-8F44-B8BF-FFF885A64E0C}"/>
+          <p:cNvPr id="26" name="Rectangle 25">
+            <a:extLst>
+              <a:ext uri="{FF2B5EF4-FFF2-40B4-BE49-F238E27FC236}">
+                <a16:creationId xmlns:a16="http://schemas.microsoft.com/office/drawing/2014/main" id="{6A8C3861-7AA5-7B4D-8171-C7F0BA70A786}"/>
               </a:ext>
             </a:extLst>
           </p:cNvPr>
@@ -5523,7 +7557,7 @@
         </p:nvSpPr>
         <p:spPr>
           <a:xfrm>
-            <a:off x="1589724" y="4950888"/>
+            <a:off x="1669306" y="5038827"/>
             <a:ext cx="1524001" cy="665018"/>
           </a:xfrm>
           <a:prstGeom prst="rect">
@@ -5580,10 +7614,10 @@
       </p:sp>
       <p:sp>
         <p:nvSpPr>
-          <p:cNvPr id="29" name="Down Arrow 28">
-            <a:extLst>
-              <a:ext uri="{FF2B5EF4-FFF2-40B4-BE49-F238E27FC236}">
-                <a16:creationId xmlns:a16="http://schemas.microsoft.com/office/drawing/2014/main" id="{CC76696C-EEF6-094E-8EBF-656B4960E1DF}"/>
+          <p:cNvPr id="27" name="Down Arrow 26">
+            <a:extLst>
+              <a:ext uri="{FF2B5EF4-FFF2-40B4-BE49-F238E27FC236}">
+                <a16:creationId xmlns:a16="http://schemas.microsoft.com/office/drawing/2014/main" id="{68F6EEB0-BC58-E14D-8679-11B822C5F9D6}"/>
               </a:ext>
             </a:extLst>
           </p:cNvPr>
@@ -5591,9 +7625,9 @@
           <p:nvPr/>
         </p:nvSpPr>
         <p:spPr>
-          <a:xfrm rot="21300000">
-            <a:off x="2213539" y="4271914"/>
-            <a:ext cx="161365" cy="672768"/>
+          <a:xfrm rot="21000000">
+            <a:off x="2260983" y="4265975"/>
+            <a:ext cx="161365" cy="772627"/>
           </a:xfrm>
           <a:prstGeom prst="downArrow">
             <a:avLst>
@@ -5642,10 +7676,10 @@
       </p:sp>
       <p:sp>
         <p:nvSpPr>
-          <p:cNvPr id="7" name="Rectangle 6">
-            <a:extLst>
-              <a:ext uri="{FF2B5EF4-FFF2-40B4-BE49-F238E27FC236}">
-                <a16:creationId xmlns:a16="http://schemas.microsoft.com/office/drawing/2014/main" id="{084195EB-CEC7-3642-9E4F-07763E9EF4CC}"/>
+          <p:cNvPr id="28" name="Rectangle 27">
+            <a:extLst>
+              <a:ext uri="{FF2B5EF4-FFF2-40B4-BE49-F238E27FC236}">
+                <a16:creationId xmlns:a16="http://schemas.microsoft.com/office/drawing/2014/main" id="{EDF4912B-F808-8F44-B8BF-FFF885A64E0C}"/>
               </a:ext>
             </a:extLst>
           </p:cNvPr>
@@ -5654,7 +7688,7 @@
         </p:nvSpPr>
         <p:spPr>
           <a:xfrm>
-            <a:off x="1510142" y="4862949"/>
+            <a:off x="1589724" y="4950888"/>
             <a:ext cx="1524001" cy="665018"/>
           </a:xfrm>
           <a:prstGeom prst="rect">
@@ -5711,10 +7745,10 @@
       </p:sp>
       <p:sp>
         <p:nvSpPr>
-          <p:cNvPr id="17" name="Down Arrow 16">
-            <a:extLst>
-              <a:ext uri="{FF2B5EF4-FFF2-40B4-BE49-F238E27FC236}">
-                <a16:creationId xmlns:a16="http://schemas.microsoft.com/office/drawing/2014/main" id="{79138125-78FD-2843-9EDB-DB6D8C3820EA}"/>
+          <p:cNvPr id="29" name="Down Arrow 28">
+            <a:extLst>
+              <a:ext uri="{FF2B5EF4-FFF2-40B4-BE49-F238E27FC236}">
+                <a16:creationId xmlns:a16="http://schemas.microsoft.com/office/drawing/2014/main" id="{CC76696C-EEF6-094E-8EBF-656B4960E1DF}"/>
               </a:ext>
             </a:extLst>
           </p:cNvPr>
@@ -5722,9 +7756,9 @@
           <p:nvPr/>
         </p:nvSpPr>
         <p:spPr>
-          <a:xfrm>
-            <a:off x="2191458" y="4281057"/>
-            <a:ext cx="161365" cy="581892"/>
+          <a:xfrm rot="21300000">
+            <a:off x="2213539" y="4271914"/>
+            <a:ext cx="161365" cy="672768"/>
           </a:xfrm>
           <a:prstGeom prst="downArrow">
             <a:avLst>
@@ -5771,10 +7805,141 @@
           </a:p>
         </p:txBody>
       </p:sp>
+      <p:sp>
+        <p:nvSpPr>
+          <p:cNvPr id="7" name="Rectangle 6">
+            <a:extLst>
+              <a:ext uri="{FF2B5EF4-FFF2-40B4-BE49-F238E27FC236}">
+                <a16:creationId xmlns:a16="http://schemas.microsoft.com/office/drawing/2014/main" id="{084195EB-CEC7-3642-9E4F-07763E9EF4CC}"/>
+              </a:ext>
+            </a:extLst>
+          </p:cNvPr>
+          <p:cNvSpPr/>
+          <p:nvPr/>
+        </p:nvSpPr>
+        <p:spPr>
+          <a:xfrm>
+            <a:off x="1510142" y="4862949"/>
+            <a:ext cx="1524001" cy="665018"/>
+          </a:xfrm>
+          <a:prstGeom prst="rect">
+            <a:avLst/>
+          </a:prstGeom>
+          <a:solidFill>
+            <a:schemeClr val="bg1">
+              <a:lumMod val="95000"/>
+              <a:alpha val="79584"/>
+            </a:schemeClr>
+          </a:solidFill>
+          <a:ln w="38100">
+            <a:solidFill>
+              <a:schemeClr val="bg2">
+                <a:lumMod val="50000"/>
+              </a:schemeClr>
+            </a:solidFill>
+          </a:ln>
+        </p:spPr>
+        <p:style>
+          <a:lnRef idx="2">
+            <a:schemeClr val="accent1">
+              <a:shade val="50000"/>
+            </a:schemeClr>
+          </a:lnRef>
+          <a:fillRef idx="1">
+            <a:schemeClr val="accent1"/>
+          </a:fillRef>
+          <a:effectRef idx="0">
+            <a:schemeClr val="accent1"/>
+          </a:effectRef>
+          <a:fontRef idx="minor">
+            <a:schemeClr val="lt1"/>
+          </a:fontRef>
+        </p:style>
+        <p:txBody>
+          <a:bodyPr rtlCol="0" anchor="ctr"/>
+          <a:lstStyle/>
+          <a:p>
+            <a:pPr algn="ctr"/>
+            <a:r>
+              <a:rPr lang="en-US" sz="2000" dirty="0">
+                <a:solidFill>
+                  <a:schemeClr val="tx1">
+                    <a:lumMod val="85000"/>
+                    <a:lumOff val="15000"/>
+                  </a:schemeClr>
+                </a:solidFill>
+              </a:rPr>
+              <a:t>Capability</a:t>
+            </a:r>
+          </a:p>
+        </p:txBody>
+      </p:sp>
+      <p:sp>
+        <p:nvSpPr>
+          <p:cNvPr id="17" name="Down Arrow 16">
+            <a:extLst>
+              <a:ext uri="{FF2B5EF4-FFF2-40B4-BE49-F238E27FC236}">
+                <a16:creationId xmlns:a16="http://schemas.microsoft.com/office/drawing/2014/main" id="{79138125-78FD-2843-9EDB-DB6D8C3820EA}"/>
+              </a:ext>
+            </a:extLst>
+          </p:cNvPr>
+          <p:cNvSpPr/>
+          <p:nvPr/>
+        </p:nvSpPr>
+        <p:spPr>
+          <a:xfrm>
+            <a:off x="2191458" y="4281057"/>
+            <a:ext cx="161365" cy="581892"/>
+          </a:xfrm>
+          <a:prstGeom prst="downArrow">
+            <a:avLst>
+              <a:gd name="adj1" fmla="val 50000"/>
+              <a:gd name="adj2" fmla="val 129998"/>
+            </a:avLst>
+          </a:prstGeom>
+          <a:solidFill>
+            <a:schemeClr val="bg1">
+              <a:lumMod val="95000"/>
+              <a:alpha val="79584"/>
+            </a:schemeClr>
+          </a:solidFill>
+          <a:ln>
+            <a:solidFill>
+              <a:schemeClr val="bg2">
+                <a:lumMod val="50000"/>
+              </a:schemeClr>
+            </a:solidFill>
+          </a:ln>
+        </p:spPr>
+        <p:style>
+          <a:lnRef idx="2">
+            <a:schemeClr val="accent1">
+              <a:shade val="50000"/>
+            </a:schemeClr>
+          </a:lnRef>
+          <a:fillRef idx="1">
+            <a:schemeClr val="accent1"/>
+          </a:fillRef>
+          <a:effectRef idx="0">
+            <a:schemeClr val="accent1"/>
+          </a:effectRef>
+          <a:fontRef idx="minor">
+            <a:schemeClr val="lt1"/>
+          </a:fontRef>
+        </p:style>
+        <p:txBody>
+          <a:bodyPr rtlCol="0" anchor="ctr"/>
+          <a:lstStyle/>
+          <a:p>
+            <a:pPr algn="ctr"/>
+            <a:endParaRPr lang="en-US"/>
+          </a:p>
+        </p:txBody>
+      </p:sp>
     </p:spTree>
     <p:extLst>
       <p:ext uri="{BB962C8B-B14F-4D97-AF65-F5344CB8AC3E}">
-        <p14:creationId xmlns:p14="http://schemas.microsoft.com/office/powerpoint/2010/main" val="1649457572"/>
+        <p14:creationId xmlns:p14="http://schemas.microsoft.com/office/powerpoint/2010/main" val="1367795088"/>
       </p:ext>
     </p:extLst>
   </p:cSld>

</xml_diff>

<commit_message>
building up the general picture
</commit_message>
<xml_diff>
--- a/getting-apis-to-work-2021/img/RBAC.pptx
+++ b/getting-apis-to-work-2021/img/RBAC.pptx
@@ -7,9 +7,12 @@
   <p:sldIdLst>
     <p:sldId id="256" r:id="rId2"/>
     <p:sldId id="257" r:id="rId3"/>
-    <p:sldId id="261" r:id="rId4"/>
-    <p:sldId id="263" r:id="rId5"/>
-    <p:sldId id="262" r:id="rId6"/>
+    <p:sldId id="264" r:id="rId4"/>
+    <p:sldId id="265" r:id="rId5"/>
+    <p:sldId id="266" r:id="rId6"/>
+    <p:sldId id="261" r:id="rId7"/>
+    <p:sldId id="263" r:id="rId8"/>
+    <p:sldId id="262" r:id="rId9"/>
   </p:sldIdLst>
   <p:sldSz cx="12192000" cy="6858000"/>
   <p:notesSz cx="6858000" cy="9144000"/>
@@ -3642,213 +3645,6 @@
       </p:grpSpPr>
       <p:sp>
         <p:nvSpPr>
-          <p:cNvPr id="2" name="Rectangle 1">
-            <a:extLst>
-              <a:ext uri="{FF2B5EF4-FFF2-40B4-BE49-F238E27FC236}">
-                <a16:creationId xmlns:a16="http://schemas.microsoft.com/office/drawing/2014/main" id="{9B7387F5-ACA9-7141-97D3-A62F3221BA74}"/>
-              </a:ext>
-            </a:extLst>
-          </p:cNvPr>
-          <p:cNvSpPr/>
-          <p:nvPr/>
-        </p:nvSpPr>
-        <p:spPr>
-          <a:xfrm>
-            <a:off x="1510145" y="1122219"/>
-            <a:ext cx="1524001" cy="665018"/>
-          </a:xfrm>
-          <a:prstGeom prst="rect">
-            <a:avLst/>
-          </a:prstGeom>
-          <a:solidFill>
-            <a:schemeClr val="bg1">
-              <a:lumMod val="95000"/>
-            </a:schemeClr>
-          </a:solidFill>
-          <a:ln w="38100">
-            <a:solidFill>
-              <a:schemeClr val="bg2">
-                <a:lumMod val="50000"/>
-                <a:alpha val="80030"/>
-              </a:schemeClr>
-            </a:solidFill>
-          </a:ln>
-        </p:spPr>
-        <p:style>
-          <a:lnRef idx="2">
-            <a:schemeClr val="accent1">
-              <a:shade val="50000"/>
-            </a:schemeClr>
-          </a:lnRef>
-          <a:fillRef idx="1">
-            <a:schemeClr val="accent1"/>
-          </a:fillRef>
-          <a:effectRef idx="0">
-            <a:schemeClr val="accent1"/>
-          </a:effectRef>
-          <a:fontRef idx="minor">
-            <a:schemeClr val="lt1"/>
-          </a:fontRef>
-        </p:style>
-        <p:txBody>
-          <a:bodyPr rtlCol="0" anchor="ctr"/>
-          <a:lstStyle/>
-          <a:p>
-            <a:pPr algn="ctr"/>
-            <a:r>
-              <a:rPr lang="en-US" sz="2000" dirty="0">
-                <a:solidFill>
-                  <a:schemeClr val="tx1">
-                    <a:lumMod val="85000"/>
-                    <a:lumOff val="15000"/>
-                  </a:schemeClr>
-                </a:solidFill>
-              </a:rPr>
-              <a:t>User</a:t>
-            </a:r>
-          </a:p>
-        </p:txBody>
-      </p:sp>
-      <p:sp>
-        <p:nvSpPr>
-          <p:cNvPr id="5" name="Rectangle 4">
-            <a:extLst>
-              <a:ext uri="{FF2B5EF4-FFF2-40B4-BE49-F238E27FC236}">
-                <a16:creationId xmlns:a16="http://schemas.microsoft.com/office/drawing/2014/main" id="{D1CCEEB6-0FB9-4C4E-A7F2-C6729B9FC8EA}"/>
-              </a:ext>
-            </a:extLst>
-          </p:cNvPr>
-          <p:cNvSpPr/>
-          <p:nvPr/>
-        </p:nvSpPr>
-        <p:spPr>
-          <a:xfrm>
-            <a:off x="1510145" y="2369129"/>
-            <a:ext cx="1524001" cy="665018"/>
-          </a:xfrm>
-          <a:prstGeom prst="rect">
-            <a:avLst/>
-          </a:prstGeom>
-          <a:solidFill>
-            <a:schemeClr val="bg1">
-              <a:lumMod val="95000"/>
-            </a:schemeClr>
-          </a:solidFill>
-          <a:ln w="38100">
-            <a:solidFill>
-              <a:schemeClr val="bg2">
-                <a:lumMod val="50000"/>
-                <a:alpha val="80030"/>
-              </a:schemeClr>
-            </a:solidFill>
-          </a:ln>
-        </p:spPr>
-        <p:style>
-          <a:lnRef idx="2">
-            <a:schemeClr val="accent1">
-              <a:shade val="50000"/>
-            </a:schemeClr>
-          </a:lnRef>
-          <a:fillRef idx="1">
-            <a:schemeClr val="accent1"/>
-          </a:fillRef>
-          <a:effectRef idx="0">
-            <a:schemeClr val="accent1"/>
-          </a:effectRef>
-          <a:fontRef idx="minor">
-            <a:schemeClr val="lt1"/>
-          </a:fontRef>
-        </p:style>
-        <p:txBody>
-          <a:bodyPr rtlCol="0" anchor="ctr"/>
-          <a:lstStyle/>
-          <a:p>
-            <a:pPr algn="ctr"/>
-            <a:r>
-              <a:rPr lang="en-US" sz="2000" dirty="0">
-                <a:solidFill>
-                  <a:schemeClr val="tx1">
-                    <a:lumMod val="85000"/>
-                    <a:lumOff val="15000"/>
-                  </a:schemeClr>
-                </a:solidFill>
-              </a:rPr>
-              <a:t>Role</a:t>
-            </a:r>
-          </a:p>
-        </p:txBody>
-      </p:sp>
-      <p:sp>
-        <p:nvSpPr>
-          <p:cNvPr id="6" name="Rectangle 5">
-            <a:extLst>
-              <a:ext uri="{FF2B5EF4-FFF2-40B4-BE49-F238E27FC236}">
-                <a16:creationId xmlns:a16="http://schemas.microsoft.com/office/drawing/2014/main" id="{292A8187-D086-6241-BD43-8F4A54EACBD1}"/>
-              </a:ext>
-            </a:extLst>
-          </p:cNvPr>
-          <p:cNvSpPr/>
-          <p:nvPr/>
-        </p:nvSpPr>
-        <p:spPr>
-          <a:xfrm>
-            <a:off x="1510142" y="3616039"/>
-            <a:ext cx="1524001" cy="665018"/>
-          </a:xfrm>
-          <a:prstGeom prst="rect">
-            <a:avLst/>
-          </a:prstGeom>
-          <a:solidFill>
-            <a:schemeClr val="bg1">
-              <a:lumMod val="95000"/>
-            </a:schemeClr>
-          </a:solidFill>
-          <a:ln w="38100">
-            <a:solidFill>
-              <a:schemeClr val="bg2">
-                <a:lumMod val="50000"/>
-                <a:alpha val="80030"/>
-              </a:schemeClr>
-            </a:solidFill>
-          </a:ln>
-        </p:spPr>
-        <p:style>
-          <a:lnRef idx="2">
-            <a:schemeClr val="accent1">
-              <a:shade val="50000"/>
-            </a:schemeClr>
-          </a:lnRef>
-          <a:fillRef idx="1">
-            <a:schemeClr val="accent1"/>
-          </a:fillRef>
-          <a:effectRef idx="0">
-            <a:schemeClr val="accent1"/>
-          </a:effectRef>
-          <a:fontRef idx="minor">
-            <a:schemeClr val="lt1"/>
-          </a:fontRef>
-        </p:style>
-        <p:txBody>
-          <a:bodyPr rtlCol="0" anchor="ctr"/>
-          <a:lstStyle/>
-          <a:p>
-            <a:pPr algn="ctr"/>
-            <a:r>
-              <a:rPr lang="en-US" sz="2000" dirty="0">
-                <a:solidFill>
-                  <a:schemeClr val="tx1">
-                    <a:lumMod val="85000"/>
-                    <a:lumOff val="15000"/>
-                  </a:schemeClr>
-                </a:solidFill>
-              </a:rPr>
-              <a:t>Permission</a:t>
-            </a:r>
-          </a:p>
-        </p:txBody>
-      </p:sp>
-      <p:sp>
-        <p:nvSpPr>
           <p:cNvPr id="7" name="Rectangle 6">
             <a:extLst>
               <a:ext uri="{FF2B5EF4-FFF2-40B4-BE49-F238E27FC236}">
@@ -3913,192 +3709,6 @@
               </a:rPr>
               <a:t>Capability</a:t>
             </a:r>
-          </a:p>
-        </p:txBody>
-      </p:sp>
-      <p:sp>
-        <p:nvSpPr>
-          <p:cNvPr id="15" name="Down Arrow 14">
-            <a:extLst>
-              <a:ext uri="{FF2B5EF4-FFF2-40B4-BE49-F238E27FC236}">
-                <a16:creationId xmlns:a16="http://schemas.microsoft.com/office/drawing/2014/main" id="{03FE2F9B-D768-9846-AF7E-C97F162AF435}"/>
-              </a:ext>
-            </a:extLst>
-          </p:cNvPr>
-          <p:cNvSpPr/>
-          <p:nvPr/>
-        </p:nvSpPr>
-        <p:spPr>
-          <a:xfrm>
-            <a:off x="2191459" y="1787237"/>
-            <a:ext cx="161365" cy="581892"/>
-          </a:xfrm>
-          <a:prstGeom prst="downArrow">
-            <a:avLst>
-              <a:gd name="adj1" fmla="val 50000"/>
-              <a:gd name="adj2" fmla="val 129998"/>
-            </a:avLst>
-          </a:prstGeom>
-          <a:solidFill>
-            <a:schemeClr val="bg1">
-              <a:lumMod val="95000"/>
-            </a:schemeClr>
-          </a:solidFill>
-          <a:ln>
-            <a:solidFill>
-              <a:schemeClr val="bg2">
-                <a:lumMod val="50000"/>
-                <a:alpha val="80030"/>
-              </a:schemeClr>
-            </a:solidFill>
-          </a:ln>
-        </p:spPr>
-        <p:style>
-          <a:lnRef idx="2">
-            <a:schemeClr val="accent1">
-              <a:shade val="50000"/>
-            </a:schemeClr>
-          </a:lnRef>
-          <a:fillRef idx="1">
-            <a:schemeClr val="accent1"/>
-          </a:fillRef>
-          <a:effectRef idx="0">
-            <a:schemeClr val="accent1"/>
-          </a:effectRef>
-          <a:fontRef idx="minor">
-            <a:schemeClr val="lt1"/>
-          </a:fontRef>
-        </p:style>
-        <p:txBody>
-          <a:bodyPr rtlCol="0" anchor="ctr"/>
-          <a:lstStyle/>
-          <a:p>
-            <a:pPr algn="ctr"/>
-            <a:endParaRPr lang="en-US"/>
-          </a:p>
-        </p:txBody>
-      </p:sp>
-      <p:sp>
-        <p:nvSpPr>
-          <p:cNvPr id="17" name="Down Arrow 16">
-            <a:extLst>
-              <a:ext uri="{FF2B5EF4-FFF2-40B4-BE49-F238E27FC236}">
-                <a16:creationId xmlns:a16="http://schemas.microsoft.com/office/drawing/2014/main" id="{79138125-78FD-2843-9EDB-DB6D8C3820EA}"/>
-              </a:ext>
-            </a:extLst>
-          </p:cNvPr>
-          <p:cNvSpPr/>
-          <p:nvPr/>
-        </p:nvSpPr>
-        <p:spPr>
-          <a:xfrm>
-            <a:off x="2191458" y="4281057"/>
-            <a:ext cx="161365" cy="581892"/>
-          </a:xfrm>
-          <a:prstGeom prst="downArrow">
-            <a:avLst>
-              <a:gd name="adj1" fmla="val 50000"/>
-              <a:gd name="adj2" fmla="val 129998"/>
-            </a:avLst>
-          </a:prstGeom>
-          <a:solidFill>
-            <a:schemeClr val="bg1">
-              <a:lumMod val="95000"/>
-            </a:schemeClr>
-          </a:solidFill>
-          <a:ln>
-            <a:solidFill>
-              <a:schemeClr val="bg2">
-                <a:lumMod val="50000"/>
-                <a:alpha val="80030"/>
-              </a:schemeClr>
-            </a:solidFill>
-          </a:ln>
-        </p:spPr>
-        <p:style>
-          <a:lnRef idx="2">
-            <a:schemeClr val="accent1">
-              <a:shade val="50000"/>
-            </a:schemeClr>
-          </a:lnRef>
-          <a:fillRef idx="1">
-            <a:schemeClr val="accent1"/>
-          </a:fillRef>
-          <a:effectRef idx="0">
-            <a:schemeClr val="accent1"/>
-          </a:effectRef>
-          <a:fontRef idx="minor">
-            <a:schemeClr val="lt1"/>
-          </a:fontRef>
-        </p:style>
-        <p:txBody>
-          <a:bodyPr rtlCol="0" anchor="ctr"/>
-          <a:lstStyle/>
-          <a:p>
-            <a:pPr algn="ctr"/>
-            <a:endParaRPr lang="en-US"/>
-          </a:p>
-        </p:txBody>
-      </p:sp>
-      <p:sp>
-        <p:nvSpPr>
-          <p:cNvPr id="18" name="Down Arrow 17">
-            <a:extLst>
-              <a:ext uri="{FF2B5EF4-FFF2-40B4-BE49-F238E27FC236}">
-                <a16:creationId xmlns:a16="http://schemas.microsoft.com/office/drawing/2014/main" id="{A8DAD2EC-3E9B-E942-96A2-159C54469EE2}"/>
-              </a:ext>
-            </a:extLst>
-          </p:cNvPr>
-          <p:cNvSpPr/>
-          <p:nvPr/>
-        </p:nvSpPr>
-        <p:spPr>
-          <a:xfrm>
-            <a:off x="2191459" y="3029199"/>
-            <a:ext cx="161365" cy="581892"/>
-          </a:xfrm>
-          <a:prstGeom prst="downArrow">
-            <a:avLst>
-              <a:gd name="adj1" fmla="val 50000"/>
-              <a:gd name="adj2" fmla="val 129998"/>
-            </a:avLst>
-          </a:prstGeom>
-          <a:solidFill>
-            <a:schemeClr val="bg1">
-              <a:lumMod val="95000"/>
-            </a:schemeClr>
-          </a:solidFill>
-          <a:ln>
-            <a:solidFill>
-              <a:schemeClr val="bg2">
-                <a:lumMod val="50000"/>
-                <a:alpha val="80030"/>
-              </a:schemeClr>
-            </a:solidFill>
-          </a:ln>
-        </p:spPr>
-        <p:style>
-          <a:lnRef idx="2">
-            <a:schemeClr val="accent1">
-              <a:shade val="50000"/>
-            </a:schemeClr>
-          </a:lnRef>
-          <a:fillRef idx="1">
-            <a:schemeClr val="accent1"/>
-          </a:fillRef>
-          <a:effectRef idx="0">
-            <a:schemeClr val="accent1"/>
-          </a:effectRef>
-          <a:fontRef idx="minor">
-            <a:schemeClr val="lt1"/>
-          </a:fontRef>
-        </p:style>
-        <p:txBody>
-          <a:bodyPr rtlCol="0" anchor="ctr"/>
-          <a:lstStyle/>
-          <a:p>
-            <a:pPr algn="ctr"/>
-            <a:endParaRPr lang="en-US"/>
           </a:p>
         </p:txBody>
       </p:sp>
@@ -4134,10 +3744,10 @@
       </p:grpSpPr>
       <p:sp>
         <p:nvSpPr>
-          <p:cNvPr id="11" name="Rectangle 10">
-            <a:extLst>
-              <a:ext uri="{FF2B5EF4-FFF2-40B4-BE49-F238E27FC236}">
-                <a16:creationId xmlns:a16="http://schemas.microsoft.com/office/drawing/2014/main" id="{F5DFF4CB-98E1-FF48-A069-97B4154B328B}"/>
+          <p:cNvPr id="6" name="Rectangle 5">
+            <a:extLst>
+              <a:ext uri="{FF2B5EF4-FFF2-40B4-BE49-F238E27FC236}">
+                <a16:creationId xmlns:a16="http://schemas.microsoft.com/office/drawing/2014/main" id="{292A8187-D086-6241-BD43-8F4A54EACBD1}"/>
               </a:ext>
             </a:extLst>
           </p:cNvPr>
@@ -4146,7 +3756,7 @@
         </p:nvSpPr>
         <p:spPr>
           <a:xfrm>
-            <a:off x="1752176" y="2632947"/>
+            <a:off x="1510142" y="3616039"/>
             <a:ext cx="1524001" cy="665018"/>
           </a:xfrm>
           <a:prstGeom prst="rect">
@@ -4155,606 +3765,13 @@
           <a:solidFill>
             <a:schemeClr val="bg1">
               <a:lumMod val="95000"/>
-              <a:alpha val="79584"/>
             </a:schemeClr>
           </a:solidFill>
           <a:ln w="38100">
             <a:solidFill>
               <a:schemeClr val="bg2">
                 <a:lumMod val="50000"/>
-              </a:schemeClr>
-            </a:solidFill>
-          </a:ln>
-        </p:spPr>
-        <p:style>
-          <a:lnRef idx="2">
-            <a:schemeClr val="accent1">
-              <a:shade val="50000"/>
-            </a:schemeClr>
-          </a:lnRef>
-          <a:fillRef idx="1">
-            <a:schemeClr val="accent1"/>
-          </a:fillRef>
-          <a:effectRef idx="0">
-            <a:schemeClr val="accent1"/>
-          </a:effectRef>
-          <a:fontRef idx="minor">
-            <a:schemeClr val="lt1"/>
-          </a:fontRef>
-        </p:style>
-        <p:txBody>
-          <a:bodyPr rtlCol="0" anchor="ctr"/>
-          <a:lstStyle/>
-          <a:p>
-            <a:pPr algn="ctr"/>
-            <a:r>
-              <a:rPr lang="en-US" sz="2000" dirty="0">
-                <a:solidFill>
-                  <a:schemeClr val="tx1">
-                    <a:lumMod val="85000"/>
-                    <a:lumOff val="15000"/>
-                  </a:schemeClr>
-                </a:solidFill>
-              </a:rPr>
-              <a:t>Role</a:t>
-            </a:r>
-          </a:p>
-        </p:txBody>
-      </p:sp>
-      <p:sp>
-        <p:nvSpPr>
-          <p:cNvPr id="14" name="Down Arrow 13">
-            <a:extLst>
-              <a:ext uri="{FF2B5EF4-FFF2-40B4-BE49-F238E27FC236}">
-                <a16:creationId xmlns:a16="http://schemas.microsoft.com/office/drawing/2014/main" id="{7401979E-EFD4-3B4A-B5AE-34BF68CA615C}"/>
-              </a:ext>
-            </a:extLst>
-          </p:cNvPr>
-          <p:cNvSpPr/>
-          <p:nvPr/>
-        </p:nvSpPr>
-        <p:spPr>
-          <a:xfrm rot="20675198">
-            <a:off x="2302962" y="1764165"/>
-            <a:ext cx="161365" cy="888316"/>
-          </a:xfrm>
-          <a:prstGeom prst="downArrow">
-            <a:avLst>
-              <a:gd name="adj1" fmla="val 50000"/>
-              <a:gd name="adj2" fmla="val 129998"/>
-            </a:avLst>
-          </a:prstGeom>
-          <a:solidFill>
-            <a:schemeClr val="bg1">
-              <a:lumMod val="95000"/>
-              <a:alpha val="79584"/>
-            </a:schemeClr>
-          </a:solidFill>
-          <a:ln>
-            <a:solidFill>
-              <a:schemeClr val="bg2">
-                <a:lumMod val="50000"/>
-              </a:schemeClr>
-            </a:solidFill>
-          </a:ln>
-        </p:spPr>
-        <p:style>
-          <a:lnRef idx="2">
-            <a:schemeClr val="accent1">
-              <a:shade val="50000"/>
-            </a:schemeClr>
-          </a:lnRef>
-          <a:fillRef idx="1">
-            <a:schemeClr val="accent1"/>
-          </a:fillRef>
-          <a:effectRef idx="0">
-            <a:schemeClr val="accent1"/>
-          </a:effectRef>
-          <a:fontRef idx="minor">
-            <a:schemeClr val="lt1"/>
-          </a:fontRef>
-        </p:style>
-        <p:txBody>
-          <a:bodyPr rtlCol="0" anchor="ctr"/>
-          <a:lstStyle/>
-          <a:p>
-            <a:pPr algn="ctr"/>
-            <a:endParaRPr lang="en-US"/>
-          </a:p>
-        </p:txBody>
-      </p:sp>
-      <p:sp>
-        <p:nvSpPr>
-          <p:cNvPr id="10" name="Rectangle 9">
-            <a:extLst>
-              <a:ext uri="{FF2B5EF4-FFF2-40B4-BE49-F238E27FC236}">
-                <a16:creationId xmlns:a16="http://schemas.microsoft.com/office/drawing/2014/main" id="{B7F1EEC2-724B-1848-91A6-1DFD50EBDEE6}"/>
-              </a:ext>
-            </a:extLst>
-          </p:cNvPr>
-          <p:cNvSpPr/>
-          <p:nvPr/>
-        </p:nvSpPr>
-        <p:spPr>
-          <a:xfrm>
-            <a:off x="1671499" y="2545007"/>
-            <a:ext cx="1524001" cy="665018"/>
-          </a:xfrm>
-          <a:prstGeom prst="rect">
-            <a:avLst/>
-          </a:prstGeom>
-          <a:solidFill>
-            <a:schemeClr val="bg1">
-              <a:lumMod val="95000"/>
-              <a:alpha val="79584"/>
-            </a:schemeClr>
-          </a:solidFill>
-          <a:ln w="38100">
-            <a:solidFill>
-              <a:schemeClr val="bg2">
-                <a:lumMod val="50000"/>
-              </a:schemeClr>
-            </a:solidFill>
-          </a:ln>
-        </p:spPr>
-        <p:style>
-          <a:lnRef idx="2">
-            <a:schemeClr val="accent1">
-              <a:shade val="50000"/>
-            </a:schemeClr>
-          </a:lnRef>
-          <a:fillRef idx="1">
-            <a:schemeClr val="accent1"/>
-          </a:fillRef>
-          <a:effectRef idx="0">
-            <a:schemeClr val="accent1"/>
-          </a:effectRef>
-          <a:fontRef idx="minor">
-            <a:schemeClr val="lt1"/>
-          </a:fontRef>
-        </p:style>
-        <p:txBody>
-          <a:bodyPr rtlCol="0" anchor="ctr"/>
-          <a:lstStyle/>
-          <a:p>
-            <a:pPr algn="ctr"/>
-            <a:r>
-              <a:rPr lang="en-US" sz="2000" dirty="0">
-                <a:solidFill>
-                  <a:schemeClr val="tx1">
-                    <a:lumMod val="85000"/>
-                    <a:lumOff val="15000"/>
-                  </a:schemeClr>
-                </a:solidFill>
-              </a:rPr>
-              <a:t>Role</a:t>
-            </a:r>
-          </a:p>
-        </p:txBody>
-      </p:sp>
-      <p:sp>
-        <p:nvSpPr>
-          <p:cNvPr id="13" name="Down Arrow 12">
-            <a:extLst>
-              <a:ext uri="{FF2B5EF4-FFF2-40B4-BE49-F238E27FC236}">
-                <a16:creationId xmlns:a16="http://schemas.microsoft.com/office/drawing/2014/main" id="{B4CDB232-AE9B-3D4F-B146-8B666553560E}"/>
-              </a:ext>
-            </a:extLst>
-          </p:cNvPr>
-          <p:cNvSpPr/>
-          <p:nvPr/>
-        </p:nvSpPr>
-        <p:spPr>
-          <a:xfrm rot="21000000">
-            <a:off x="2264270" y="1772155"/>
-            <a:ext cx="161365" cy="772627"/>
-          </a:xfrm>
-          <a:prstGeom prst="downArrow">
-            <a:avLst>
-              <a:gd name="adj1" fmla="val 50000"/>
-              <a:gd name="adj2" fmla="val 129998"/>
-            </a:avLst>
-          </a:prstGeom>
-          <a:solidFill>
-            <a:schemeClr val="bg1">
-              <a:lumMod val="95000"/>
-              <a:alpha val="79584"/>
-            </a:schemeClr>
-          </a:solidFill>
-          <a:ln>
-            <a:solidFill>
-              <a:schemeClr val="bg2">
-                <a:lumMod val="50000"/>
-              </a:schemeClr>
-            </a:solidFill>
-          </a:ln>
-        </p:spPr>
-        <p:style>
-          <a:lnRef idx="2">
-            <a:schemeClr val="accent1">
-              <a:shade val="50000"/>
-            </a:schemeClr>
-          </a:lnRef>
-          <a:fillRef idx="1">
-            <a:schemeClr val="accent1"/>
-          </a:fillRef>
-          <a:effectRef idx="0">
-            <a:schemeClr val="accent1"/>
-          </a:effectRef>
-          <a:fontRef idx="minor">
-            <a:schemeClr val="lt1"/>
-          </a:fontRef>
-        </p:style>
-        <p:txBody>
-          <a:bodyPr rtlCol="0" anchor="ctr"/>
-          <a:lstStyle/>
-          <a:p>
-            <a:pPr algn="ctr"/>
-            <a:endParaRPr lang="en-US"/>
-          </a:p>
-        </p:txBody>
-      </p:sp>
-      <p:sp>
-        <p:nvSpPr>
-          <p:cNvPr id="9" name="Rectangle 8">
-            <a:extLst>
-              <a:ext uri="{FF2B5EF4-FFF2-40B4-BE49-F238E27FC236}">
-                <a16:creationId xmlns:a16="http://schemas.microsoft.com/office/drawing/2014/main" id="{6F7D0253-8737-834F-8F03-1696179FCA7C}"/>
-              </a:ext>
-            </a:extLst>
-          </p:cNvPr>
-          <p:cNvSpPr/>
-          <p:nvPr/>
-        </p:nvSpPr>
-        <p:spPr>
-          <a:xfrm>
-            <a:off x="1590822" y="2457068"/>
-            <a:ext cx="1524001" cy="665018"/>
-          </a:xfrm>
-          <a:prstGeom prst="rect">
-            <a:avLst/>
-          </a:prstGeom>
-          <a:solidFill>
-            <a:schemeClr val="bg1">
-              <a:lumMod val="95000"/>
-              <a:alpha val="79584"/>
-            </a:schemeClr>
-          </a:solidFill>
-          <a:ln w="38100">
-            <a:solidFill>
-              <a:schemeClr val="bg2">
-                <a:lumMod val="50000"/>
-              </a:schemeClr>
-            </a:solidFill>
-          </a:ln>
-        </p:spPr>
-        <p:style>
-          <a:lnRef idx="2">
-            <a:schemeClr val="accent1">
-              <a:shade val="50000"/>
-            </a:schemeClr>
-          </a:lnRef>
-          <a:fillRef idx="1">
-            <a:schemeClr val="accent1"/>
-          </a:fillRef>
-          <a:effectRef idx="0">
-            <a:schemeClr val="accent1"/>
-          </a:effectRef>
-          <a:fontRef idx="minor">
-            <a:schemeClr val="lt1"/>
-          </a:fontRef>
-        </p:style>
-        <p:txBody>
-          <a:bodyPr rtlCol="0" anchor="ctr"/>
-          <a:lstStyle/>
-          <a:p>
-            <a:pPr algn="ctr"/>
-            <a:r>
-              <a:rPr lang="en-US" sz="2000" dirty="0">
-                <a:solidFill>
-                  <a:schemeClr val="tx1">
-                    <a:lumMod val="85000"/>
-                    <a:lumOff val="15000"/>
-                  </a:schemeClr>
-                </a:solidFill>
-              </a:rPr>
-              <a:t>Role</a:t>
-            </a:r>
-          </a:p>
-        </p:txBody>
-      </p:sp>
-      <p:sp>
-        <p:nvSpPr>
-          <p:cNvPr id="12" name="Down Arrow 11">
-            <a:extLst>
-              <a:ext uri="{FF2B5EF4-FFF2-40B4-BE49-F238E27FC236}">
-                <a16:creationId xmlns:a16="http://schemas.microsoft.com/office/drawing/2014/main" id="{6CFDBBEA-1C60-B94C-BA5B-0530357207B3}"/>
-              </a:ext>
-            </a:extLst>
-          </p:cNvPr>
-          <p:cNvSpPr/>
-          <p:nvPr/>
-        </p:nvSpPr>
-        <p:spPr>
-          <a:xfrm rot="21300000">
-            <a:off x="2216826" y="1778094"/>
-            <a:ext cx="161365" cy="672768"/>
-          </a:xfrm>
-          <a:prstGeom prst="downArrow">
-            <a:avLst>
-              <a:gd name="adj1" fmla="val 50000"/>
-              <a:gd name="adj2" fmla="val 129998"/>
-            </a:avLst>
-          </a:prstGeom>
-          <a:solidFill>
-            <a:schemeClr val="bg1">
-              <a:lumMod val="95000"/>
-              <a:alpha val="79584"/>
-            </a:schemeClr>
-          </a:solidFill>
-          <a:ln>
-            <a:solidFill>
-              <a:schemeClr val="bg2">
-                <a:lumMod val="50000"/>
-              </a:schemeClr>
-            </a:solidFill>
-          </a:ln>
-        </p:spPr>
-        <p:style>
-          <a:lnRef idx="2">
-            <a:schemeClr val="accent1">
-              <a:shade val="50000"/>
-            </a:schemeClr>
-          </a:lnRef>
-          <a:fillRef idx="1">
-            <a:schemeClr val="accent1"/>
-          </a:fillRef>
-          <a:effectRef idx="0">
-            <a:schemeClr val="accent1"/>
-          </a:effectRef>
-          <a:fontRef idx="minor">
-            <a:schemeClr val="lt1"/>
-          </a:fontRef>
-        </p:style>
-        <p:txBody>
-          <a:bodyPr rtlCol="0" anchor="ctr"/>
-          <a:lstStyle/>
-          <a:p>
-            <a:pPr algn="ctr"/>
-            <a:endParaRPr lang="en-US"/>
-          </a:p>
-        </p:txBody>
-      </p:sp>
-      <p:sp>
-        <p:nvSpPr>
-          <p:cNvPr id="2" name="Rectangle 1">
-            <a:extLst>
-              <a:ext uri="{FF2B5EF4-FFF2-40B4-BE49-F238E27FC236}">
-                <a16:creationId xmlns:a16="http://schemas.microsoft.com/office/drawing/2014/main" id="{9B7387F5-ACA9-7141-97D3-A62F3221BA74}"/>
-              </a:ext>
-            </a:extLst>
-          </p:cNvPr>
-          <p:cNvSpPr/>
-          <p:nvPr/>
-        </p:nvSpPr>
-        <p:spPr>
-          <a:xfrm>
-            <a:off x="1510145" y="1122219"/>
-            <a:ext cx="1524001" cy="665018"/>
-          </a:xfrm>
-          <a:prstGeom prst="rect">
-            <a:avLst/>
-          </a:prstGeom>
-          <a:solidFill>
-            <a:schemeClr val="bg1">
-              <a:lumMod val="95000"/>
-              <a:alpha val="79584"/>
-            </a:schemeClr>
-          </a:solidFill>
-          <a:ln w="38100">
-            <a:solidFill>
-              <a:schemeClr val="bg2">
-                <a:lumMod val="50000"/>
-              </a:schemeClr>
-            </a:solidFill>
-          </a:ln>
-        </p:spPr>
-        <p:style>
-          <a:lnRef idx="2">
-            <a:schemeClr val="accent1">
-              <a:shade val="50000"/>
-            </a:schemeClr>
-          </a:lnRef>
-          <a:fillRef idx="1">
-            <a:schemeClr val="accent1"/>
-          </a:fillRef>
-          <a:effectRef idx="0">
-            <a:schemeClr val="accent1"/>
-          </a:effectRef>
-          <a:fontRef idx="minor">
-            <a:schemeClr val="lt1"/>
-          </a:fontRef>
-        </p:style>
-        <p:txBody>
-          <a:bodyPr rtlCol="0" anchor="ctr"/>
-          <a:lstStyle/>
-          <a:p>
-            <a:pPr algn="ctr"/>
-            <a:r>
-              <a:rPr lang="en-US" sz="2000" dirty="0">
-                <a:solidFill>
-                  <a:schemeClr val="tx1">
-                    <a:lumMod val="85000"/>
-                    <a:lumOff val="15000"/>
-                  </a:schemeClr>
-                </a:solidFill>
-              </a:rPr>
-              <a:t>User</a:t>
-            </a:r>
-          </a:p>
-        </p:txBody>
-      </p:sp>
-      <p:sp>
-        <p:nvSpPr>
-          <p:cNvPr id="5" name="Rectangle 4">
-            <a:extLst>
-              <a:ext uri="{FF2B5EF4-FFF2-40B4-BE49-F238E27FC236}">
-                <a16:creationId xmlns:a16="http://schemas.microsoft.com/office/drawing/2014/main" id="{D1CCEEB6-0FB9-4C4E-A7F2-C6729B9FC8EA}"/>
-              </a:ext>
-            </a:extLst>
-          </p:cNvPr>
-          <p:cNvSpPr/>
-          <p:nvPr/>
-        </p:nvSpPr>
-        <p:spPr>
-          <a:xfrm>
-            <a:off x="1510145" y="2369129"/>
-            <a:ext cx="1524001" cy="665018"/>
-          </a:xfrm>
-          <a:prstGeom prst="rect">
-            <a:avLst/>
-          </a:prstGeom>
-          <a:solidFill>
-            <a:schemeClr val="bg1">
-              <a:lumMod val="95000"/>
-              <a:alpha val="79584"/>
-            </a:schemeClr>
-          </a:solidFill>
-          <a:ln w="38100">
-            <a:solidFill>
-              <a:schemeClr val="bg2">
-                <a:lumMod val="50000"/>
-              </a:schemeClr>
-            </a:solidFill>
-          </a:ln>
-        </p:spPr>
-        <p:style>
-          <a:lnRef idx="2">
-            <a:schemeClr val="accent1">
-              <a:shade val="50000"/>
-            </a:schemeClr>
-          </a:lnRef>
-          <a:fillRef idx="1">
-            <a:schemeClr val="accent1"/>
-          </a:fillRef>
-          <a:effectRef idx="0">
-            <a:schemeClr val="accent1"/>
-          </a:effectRef>
-          <a:fontRef idx="minor">
-            <a:schemeClr val="lt1"/>
-          </a:fontRef>
-        </p:style>
-        <p:txBody>
-          <a:bodyPr rtlCol="0" anchor="ctr"/>
-          <a:lstStyle/>
-          <a:p>
-            <a:pPr algn="ctr"/>
-            <a:r>
-              <a:rPr lang="en-US" sz="2000" dirty="0">
-                <a:solidFill>
-                  <a:schemeClr val="tx1">
-                    <a:lumMod val="85000"/>
-                    <a:lumOff val="15000"/>
-                  </a:schemeClr>
-                </a:solidFill>
-              </a:rPr>
-              <a:t>Role</a:t>
-            </a:r>
-          </a:p>
-        </p:txBody>
-      </p:sp>
-      <p:sp>
-        <p:nvSpPr>
-          <p:cNvPr id="15" name="Down Arrow 14">
-            <a:extLst>
-              <a:ext uri="{FF2B5EF4-FFF2-40B4-BE49-F238E27FC236}">
-                <a16:creationId xmlns:a16="http://schemas.microsoft.com/office/drawing/2014/main" id="{03FE2F9B-D768-9846-AF7E-C97F162AF435}"/>
-              </a:ext>
-            </a:extLst>
-          </p:cNvPr>
-          <p:cNvSpPr/>
-          <p:nvPr/>
-        </p:nvSpPr>
-        <p:spPr>
-          <a:xfrm>
-            <a:off x="2191459" y="1787237"/>
-            <a:ext cx="161365" cy="581892"/>
-          </a:xfrm>
-          <a:prstGeom prst="downArrow">
-            <a:avLst>
-              <a:gd name="adj1" fmla="val 50000"/>
-              <a:gd name="adj2" fmla="val 129998"/>
-            </a:avLst>
-          </a:prstGeom>
-          <a:solidFill>
-            <a:schemeClr val="bg1">
-              <a:lumMod val="95000"/>
-              <a:alpha val="79584"/>
-            </a:schemeClr>
-          </a:solidFill>
-          <a:ln>
-            <a:solidFill>
-              <a:schemeClr val="bg2">
-                <a:lumMod val="50000"/>
-              </a:schemeClr>
-            </a:solidFill>
-          </a:ln>
-        </p:spPr>
-        <p:style>
-          <a:lnRef idx="2">
-            <a:schemeClr val="accent1">
-              <a:shade val="50000"/>
-            </a:schemeClr>
-          </a:lnRef>
-          <a:fillRef idx="1">
-            <a:schemeClr val="accent1"/>
-          </a:fillRef>
-          <a:effectRef idx="0">
-            <a:schemeClr val="accent1"/>
-          </a:effectRef>
-          <a:fontRef idx="minor">
-            <a:schemeClr val="lt1"/>
-          </a:fontRef>
-        </p:style>
-        <p:txBody>
-          <a:bodyPr rtlCol="0" anchor="ctr"/>
-          <a:lstStyle/>
-          <a:p>
-            <a:pPr algn="ctr"/>
-            <a:endParaRPr lang="en-US"/>
-          </a:p>
-        </p:txBody>
-      </p:sp>
-      <p:sp>
-        <p:nvSpPr>
-          <p:cNvPr id="6" name="Rectangle 5">
-            <a:extLst>
-              <a:ext uri="{FF2B5EF4-FFF2-40B4-BE49-F238E27FC236}">
-                <a16:creationId xmlns:a16="http://schemas.microsoft.com/office/drawing/2014/main" id="{292A8187-D086-6241-BD43-8F4A54EACBD1}"/>
-              </a:ext>
-            </a:extLst>
-          </p:cNvPr>
-          <p:cNvSpPr/>
-          <p:nvPr/>
-        </p:nvSpPr>
-        <p:spPr>
-          <a:xfrm>
-            <a:off x="1510142" y="3616039"/>
-            <a:ext cx="1524001" cy="665018"/>
-          </a:xfrm>
-          <a:prstGeom prst="rect">
-            <a:avLst/>
-          </a:prstGeom>
-          <a:solidFill>
-            <a:schemeClr val="bg1">
-              <a:lumMod val="95000"/>
-              <a:alpha val="79584"/>
-            </a:schemeClr>
-          </a:solidFill>
-          <a:ln w="38100">
-            <a:solidFill>
-              <a:schemeClr val="bg2">
-                <a:lumMod val="50000"/>
+                <a:alpha val="80030"/>
               </a:schemeClr>
             </a:solidFill>
           </a:ln>
@@ -4796,68 +3813,6 @@
       </p:sp>
       <p:sp>
         <p:nvSpPr>
-          <p:cNvPr id="18" name="Down Arrow 17">
-            <a:extLst>
-              <a:ext uri="{FF2B5EF4-FFF2-40B4-BE49-F238E27FC236}">
-                <a16:creationId xmlns:a16="http://schemas.microsoft.com/office/drawing/2014/main" id="{A8DAD2EC-3E9B-E942-96A2-159C54469EE2}"/>
-              </a:ext>
-            </a:extLst>
-          </p:cNvPr>
-          <p:cNvSpPr/>
-          <p:nvPr/>
-        </p:nvSpPr>
-        <p:spPr>
-          <a:xfrm>
-            <a:off x="2191459" y="3029199"/>
-            <a:ext cx="161365" cy="581892"/>
-          </a:xfrm>
-          <a:prstGeom prst="downArrow">
-            <a:avLst>
-              <a:gd name="adj1" fmla="val 50000"/>
-              <a:gd name="adj2" fmla="val 129998"/>
-            </a:avLst>
-          </a:prstGeom>
-          <a:solidFill>
-            <a:schemeClr val="bg1">
-              <a:lumMod val="95000"/>
-              <a:alpha val="79584"/>
-            </a:schemeClr>
-          </a:solidFill>
-          <a:ln>
-            <a:solidFill>
-              <a:schemeClr val="bg2">
-                <a:lumMod val="50000"/>
-              </a:schemeClr>
-            </a:solidFill>
-          </a:ln>
-        </p:spPr>
-        <p:style>
-          <a:lnRef idx="2">
-            <a:schemeClr val="accent1">
-              <a:shade val="50000"/>
-            </a:schemeClr>
-          </a:lnRef>
-          <a:fillRef idx="1">
-            <a:schemeClr val="accent1"/>
-          </a:fillRef>
-          <a:effectRef idx="0">
-            <a:schemeClr val="accent1"/>
-          </a:effectRef>
-          <a:fontRef idx="minor">
-            <a:schemeClr val="lt1"/>
-          </a:fontRef>
-        </p:style>
-        <p:txBody>
-          <a:bodyPr rtlCol="0" anchor="ctr"/>
-          <a:lstStyle/>
-          <a:p>
-            <a:pPr algn="ctr"/>
-            <a:endParaRPr lang="en-US"/>
-          </a:p>
-        </p:txBody>
-      </p:sp>
-      <p:sp>
-        <p:nvSpPr>
           <p:cNvPr id="7" name="Rectangle 6">
             <a:extLst>
               <a:ext uri="{FF2B5EF4-FFF2-40B4-BE49-F238E27FC236}">
@@ -4879,13 +3834,13 @@
           <a:solidFill>
             <a:schemeClr val="bg1">
               <a:lumMod val="95000"/>
-              <a:alpha val="79584"/>
             </a:schemeClr>
           </a:solidFill>
           <a:ln w="38100">
             <a:solidFill>
               <a:schemeClr val="bg2">
                 <a:lumMod val="50000"/>
+                <a:alpha val="80030"/>
               </a:schemeClr>
             </a:solidFill>
           </a:ln>
@@ -4951,13 +3906,13 @@
           <a:solidFill>
             <a:schemeClr val="bg1">
               <a:lumMod val="95000"/>
-              <a:alpha val="79584"/>
             </a:schemeClr>
           </a:solidFill>
           <a:ln>
             <a:solidFill>
               <a:schemeClr val="bg2">
                 <a:lumMod val="50000"/>
+                <a:alpha val="80030"/>
               </a:schemeClr>
             </a:solidFill>
           </a:ln>
@@ -4990,7 +3945,7 @@
     </p:spTree>
     <p:extLst>
       <p:ext uri="{BB962C8B-B14F-4D97-AF65-F5344CB8AC3E}">
-        <p14:creationId xmlns:p14="http://schemas.microsoft.com/office/powerpoint/2010/main" val="3840253160"/>
+        <p14:creationId xmlns:p14="http://schemas.microsoft.com/office/powerpoint/2010/main" val="674908156"/>
       </p:ext>
     </p:extLst>
   </p:cSld>
@@ -5019,6 +3974,1744 @@
       </p:grpSpPr>
       <p:sp>
         <p:nvSpPr>
+          <p:cNvPr id="5" name="Rectangle 4">
+            <a:extLst>
+              <a:ext uri="{FF2B5EF4-FFF2-40B4-BE49-F238E27FC236}">
+                <a16:creationId xmlns:a16="http://schemas.microsoft.com/office/drawing/2014/main" id="{D1CCEEB6-0FB9-4C4E-A7F2-C6729B9FC8EA}"/>
+              </a:ext>
+            </a:extLst>
+          </p:cNvPr>
+          <p:cNvSpPr/>
+          <p:nvPr/>
+        </p:nvSpPr>
+        <p:spPr>
+          <a:xfrm>
+            <a:off x="1510145" y="2369129"/>
+            <a:ext cx="1524001" cy="665018"/>
+          </a:xfrm>
+          <a:prstGeom prst="rect">
+            <a:avLst/>
+          </a:prstGeom>
+          <a:solidFill>
+            <a:schemeClr val="bg1">
+              <a:lumMod val="95000"/>
+            </a:schemeClr>
+          </a:solidFill>
+          <a:ln w="38100">
+            <a:solidFill>
+              <a:schemeClr val="bg2">
+                <a:lumMod val="50000"/>
+                <a:alpha val="80030"/>
+              </a:schemeClr>
+            </a:solidFill>
+          </a:ln>
+        </p:spPr>
+        <p:style>
+          <a:lnRef idx="2">
+            <a:schemeClr val="accent1">
+              <a:shade val="50000"/>
+            </a:schemeClr>
+          </a:lnRef>
+          <a:fillRef idx="1">
+            <a:schemeClr val="accent1"/>
+          </a:fillRef>
+          <a:effectRef idx="0">
+            <a:schemeClr val="accent1"/>
+          </a:effectRef>
+          <a:fontRef idx="minor">
+            <a:schemeClr val="lt1"/>
+          </a:fontRef>
+        </p:style>
+        <p:txBody>
+          <a:bodyPr rtlCol="0" anchor="ctr"/>
+          <a:lstStyle/>
+          <a:p>
+            <a:pPr algn="ctr"/>
+            <a:r>
+              <a:rPr lang="en-US" sz="2000" dirty="0">
+                <a:solidFill>
+                  <a:schemeClr val="tx1">
+                    <a:lumMod val="85000"/>
+                    <a:lumOff val="15000"/>
+                  </a:schemeClr>
+                </a:solidFill>
+              </a:rPr>
+              <a:t>Role</a:t>
+            </a:r>
+          </a:p>
+        </p:txBody>
+      </p:sp>
+      <p:sp>
+        <p:nvSpPr>
+          <p:cNvPr id="6" name="Rectangle 5">
+            <a:extLst>
+              <a:ext uri="{FF2B5EF4-FFF2-40B4-BE49-F238E27FC236}">
+                <a16:creationId xmlns:a16="http://schemas.microsoft.com/office/drawing/2014/main" id="{292A8187-D086-6241-BD43-8F4A54EACBD1}"/>
+              </a:ext>
+            </a:extLst>
+          </p:cNvPr>
+          <p:cNvSpPr/>
+          <p:nvPr/>
+        </p:nvSpPr>
+        <p:spPr>
+          <a:xfrm>
+            <a:off x="1510142" y="3616039"/>
+            <a:ext cx="1524001" cy="665018"/>
+          </a:xfrm>
+          <a:prstGeom prst="rect">
+            <a:avLst/>
+          </a:prstGeom>
+          <a:solidFill>
+            <a:schemeClr val="bg1">
+              <a:lumMod val="95000"/>
+            </a:schemeClr>
+          </a:solidFill>
+          <a:ln w="38100">
+            <a:solidFill>
+              <a:schemeClr val="bg2">
+                <a:lumMod val="50000"/>
+                <a:alpha val="80030"/>
+              </a:schemeClr>
+            </a:solidFill>
+          </a:ln>
+        </p:spPr>
+        <p:style>
+          <a:lnRef idx="2">
+            <a:schemeClr val="accent1">
+              <a:shade val="50000"/>
+            </a:schemeClr>
+          </a:lnRef>
+          <a:fillRef idx="1">
+            <a:schemeClr val="accent1"/>
+          </a:fillRef>
+          <a:effectRef idx="0">
+            <a:schemeClr val="accent1"/>
+          </a:effectRef>
+          <a:fontRef idx="minor">
+            <a:schemeClr val="lt1"/>
+          </a:fontRef>
+        </p:style>
+        <p:txBody>
+          <a:bodyPr rtlCol="0" anchor="ctr"/>
+          <a:lstStyle/>
+          <a:p>
+            <a:pPr algn="ctr"/>
+            <a:r>
+              <a:rPr lang="en-US" sz="2000" dirty="0">
+                <a:solidFill>
+                  <a:schemeClr val="tx1">
+                    <a:lumMod val="85000"/>
+                    <a:lumOff val="15000"/>
+                  </a:schemeClr>
+                </a:solidFill>
+              </a:rPr>
+              <a:t>Permission</a:t>
+            </a:r>
+          </a:p>
+        </p:txBody>
+      </p:sp>
+      <p:sp>
+        <p:nvSpPr>
+          <p:cNvPr id="7" name="Rectangle 6">
+            <a:extLst>
+              <a:ext uri="{FF2B5EF4-FFF2-40B4-BE49-F238E27FC236}">
+                <a16:creationId xmlns:a16="http://schemas.microsoft.com/office/drawing/2014/main" id="{084195EB-CEC7-3642-9E4F-07763E9EF4CC}"/>
+              </a:ext>
+            </a:extLst>
+          </p:cNvPr>
+          <p:cNvSpPr/>
+          <p:nvPr/>
+        </p:nvSpPr>
+        <p:spPr>
+          <a:xfrm>
+            <a:off x="1510142" y="4862949"/>
+            <a:ext cx="1524001" cy="665018"/>
+          </a:xfrm>
+          <a:prstGeom prst="rect">
+            <a:avLst/>
+          </a:prstGeom>
+          <a:solidFill>
+            <a:schemeClr val="bg1">
+              <a:lumMod val="95000"/>
+            </a:schemeClr>
+          </a:solidFill>
+          <a:ln w="38100">
+            <a:solidFill>
+              <a:schemeClr val="bg2">
+                <a:lumMod val="50000"/>
+                <a:alpha val="80030"/>
+              </a:schemeClr>
+            </a:solidFill>
+          </a:ln>
+        </p:spPr>
+        <p:style>
+          <a:lnRef idx="2">
+            <a:schemeClr val="accent1">
+              <a:shade val="50000"/>
+            </a:schemeClr>
+          </a:lnRef>
+          <a:fillRef idx="1">
+            <a:schemeClr val="accent1"/>
+          </a:fillRef>
+          <a:effectRef idx="0">
+            <a:schemeClr val="accent1"/>
+          </a:effectRef>
+          <a:fontRef idx="minor">
+            <a:schemeClr val="lt1"/>
+          </a:fontRef>
+        </p:style>
+        <p:txBody>
+          <a:bodyPr rtlCol="0" anchor="ctr"/>
+          <a:lstStyle/>
+          <a:p>
+            <a:pPr algn="ctr"/>
+            <a:r>
+              <a:rPr lang="en-US" sz="2000" dirty="0">
+                <a:solidFill>
+                  <a:schemeClr val="tx1">
+                    <a:lumMod val="85000"/>
+                    <a:lumOff val="15000"/>
+                  </a:schemeClr>
+                </a:solidFill>
+              </a:rPr>
+              <a:t>Capability</a:t>
+            </a:r>
+          </a:p>
+        </p:txBody>
+      </p:sp>
+      <p:sp>
+        <p:nvSpPr>
+          <p:cNvPr id="17" name="Down Arrow 16">
+            <a:extLst>
+              <a:ext uri="{FF2B5EF4-FFF2-40B4-BE49-F238E27FC236}">
+                <a16:creationId xmlns:a16="http://schemas.microsoft.com/office/drawing/2014/main" id="{79138125-78FD-2843-9EDB-DB6D8C3820EA}"/>
+              </a:ext>
+            </a:extLst>
+          </p:cNvPr>
+          <p:cNvSpPr/>
+          <p:nvPr/>
+        </p:nvSpPr>
+        <p:spPr>
+          <a:xfrm>
+            <a:off x="2191458" y="4281057"/>
+            <a:ext cx="161365" cy="581892"/>
+          </a:xfrm>
+          <a:prstGeom prst="downArrow">
+            <a:avLst>
+              <a:gd name="adj1" fmla="val 50000"/>
+              <a:gd name="adj2" fmla="val 129998"/>
+            </a:avLst>
+          </a:prstGeom>
+          <a:solidFill>
+            <a:schemeClr val="bg1">
+              <a:lumMod val="95000"/>
+            </a:schemeClr>
+          </a:solidFill>
+          <a:ln>
+            <a:solidFill>
+              <a:schemeClr val="bg2">
+                <a:lumMod val="50000"/>
+                <a:alpha val="80030"/>
+              </a:schemeClr>
+            </a:solidFill>
+          </a:ln>
+        </p:spPr>
+        <p:style>
+          <a:lnRef idx="2">
+            <a:schemeClr val="accent1">
+              <a:shade val="50000"/>
+            </a:schemeClr>
+          </a:lnRef>
+          <a:fillRef idx="1">
+            <a:schemeClr val="accent1"/>
+          </a:fillRef>
+          <a:effectRef idx="0">
+            <a:schemeClr val="accent1"/>
+          </a:effectRef>
+          <a:fontRef idx="minor">
+            <a:schemeClr val="lt1"/>
+          </a:fontRef>
+        </p:style>
+        <p:txBody>
+          <a:bodyPr rtlCol="0" anchor="ctr"/>
+          <a:lstStyle/>
+          <a:p>
+            <a:pPr algn="ctr"/>
+            <a:endParaRPr lang="en-US"/>
+          </a:p>
+        </p:txBody>
+      </p:sp>
+      <p:sp>
+        <p:nvSpPr>
+          <p:cNvPr id="18" name="Down Arrow 17">
+            <a:extLst>
+              <a:ext uri="{FF2B5EF4-FFF2-40B4-BE49-F238E27FC236}">
+                <a16:creationId xmlns:a16="http://schemas.microsoft.com/office/drawing/2014/main" id="{A8DAD2EC-3E9B-E942-96A2-159C54469EE2}"/>
+              </a:ext>
+            </a:extLst>
+          </p:cNvPr>
+          <p:cNvSpPr/>
+          <p:nvPr/>
+        </p:nvSpPr>
+        <p:spPr>
+          <a:xfrm>
+            <a:off x="2191459" y="3029199"/>
+            <a:ext cx="161365" cy="581892"/>
+          </a:xfrm>
+          <a:prstGeom prst="downArrow">
+            <a:avLst>
+              <a:gd name="adj1" fmla="val 50000"/>
+              <a:gd name="adj2" fmla="val 129998"/>
+            </a:avLst>
+          </a:prstGeom>
+          <a:solidFill>
+            <a:schemeClr val="bg1">
+              <a:lumMod val="95000"/>
+            </a:schemeClr>
+          </a:solidFill>
+          <a:ln>
+            <a:solidFill>
+              <a:schemeClr val="bg2">
+                <a:lumMod val="50000"/>
+                <a:alpha val="80030"/>
+              </a:schemeClr>
+            </a:solidFill>
+          </a:ln>
+        </p:spPr>
+        <p:style>
+          <a:lnRef idx="2">
+            <a:schemeClr val="accent1">
+              <a:shade val="50000"/>
+            </a:schemeClr>
+          </a:lnRef>
+          <a:fillRef idx="1">
+            <a:schemeClr val="accent1"/>
+          </a:fillRef>
+          <a:effectRef idx="0">
+            <a:schemeClr val="accent1"/>
+          </a:effectRef>
+          <a:fontRef idx="minor">
+            <a:schemeClr val="lt1"/>
+          </a:fontRef>
+        </p:style>
+        <p:txBody>
+          <a:bodyPr rtlCol="0" anchor="ctr"/>
+          <a:lstStyle/>
+          <a:p>
+            <a:pPr algn="ctr"/>
+            <a:endParaRPr lang="en-US"/>
+          </a:p>
+        </p:txBody>
+      </p:sp>
+    </p:spTree>
+    <p:extLst>
+      <p:ext uri="{BB962C8B-B14F-4D97-AF65-F5344CB8AC3E}">
+        <p14:creationId xmlns:p14="http://schemas.microsoft.com/office/powerpoint/2010/main" val="2002102711"/>
+      </p:ext>
+    </p:extLst>
+  </p:cSld>
+  <p:clrMapOvr>
+    <a:masterClrMapping/>
+  </p:clrMapOvr>
+</p:sld>
+</file>
+
+<file path=ppt/slides/slide5.xml><?xml version="1.0" encoding="utf-8"?>
+<p:sld xmlns:a="http://schemas.openxmlformats.org/drawingml/2006/main" xmlns:r="http://schemas.openxmlformats.org/officeDocument/2006/relationships" xmlns:p="http://schemas.openxmlformats.org/presentationml/2006/main">
+  <p:cSld>
+    <p:spTree>
+      <p:nvGrpSpPr>
+        <p:cNvPr id="1" name=""/>
+        <p:cNvGrpSpPr/>
+        <p:nvPr/>
+      </p:nvGrpSpPr>
+      <p:grpSpPr>
+        <a:xfrm>
+          <a:off x="0" y="0"/>
+          <a:ext cx="0" cy="0"/>
+          <a:chOff x="0" y="0"/>
+          <a:chExt cx="0" cy="0"/>
+        </a:xfrm>
+      </p:grpSpPr>
+      <p:sp>
+        <p:nvSpPr>
+          <p:cNvPr id="2" name="Rectangle 1">
+            <a:extLst>
+              <a:ext uri="{FF2B5EF4-FFF2-40B4-BE49-F238E27FC236}">
+                <a16:creationId xmlns:a16="http://schemas.microsoft.com/office/drawing/2014/main" id="{9B7387F5-ACA9-7141-97D3-A62F3221BA74}"/>
+              </a:ext>
+            </a:extLst>
+          </p:cNvPr>
+          <p:cNvSpPr/>
+          <p:nvPr/>
+        </p:nvSpPr>
+        <p:spPr>
+          <a:xfrm>
+            <a:off x="1510145" y="1122219"/>
+            <a:ext cx="1524001" cy="665018"/>
+          </a:xfrm>
+          <a:prstGeom prst="rect">
+            <a:avLst/>
+          </a:prstGeom>
+          <a:solidFill>
+            <a:schemeClr val="bg1">
+              <a:lumMod val="95000"/>
+            </a:schemeClr>
+          </a:solidFill>
+          <a:ln w="38100">
+            <a:solidFill>
+              <a:schemeClr val="bg2">
+                <a:lumMod val="50000"/>
+                <a:alpha val="80030"/>
+              </a:schemeClr>
+            </a:solidFill>
+          </a:ln>
+        </p:spPr>
+        <p:style>
+          <a:lnRef idx="2">
+            <a:schemeClr val="accent1">
+              <a:shade val="50000"/>
+            </a:schemeClr>
+          </a:lnRef>
+          <a:fillRef idx="1">
+            <a:schemeClr val="accent1"/>
+          </a:fillRef>
+          <a:effectRef idx="0">
+            <a:schemeClr val="accent1"/>
+          </a:effectRef>
+          <a:fontRef idx="minor">
+            <a:schemeClr val="lt1"/>
+          </a:fontRef>
+        </p:style>
+        <p:txBody>
+          <a:bodyPr rtlCol="0" anchor="ctr"/>
+          <a:lstStyle/>
+          <a:p>
+            <a:pPr algn="ctr"/>
+            <a:r>
+              <a:rPr lang="en-US" sz="2000" dirty="0">
+                <a:solidFill>
+                  <a:schemeClr val="tx1">
+                    <a:lumMod val="85000"/>
+                    <a:lumOff val="15000"/>
+                  </a:schemeClr>
+                </a:solidFill>
+              </a:rPr>
+              <a:t>User</a:t>
+            </a:r>
+          </a:p>
+        </p:txBody>
+      </p:sp>
+      <p:sp>
+        <p:nvSpPr>
+          <p:cNvPr id="5" name="Rectangle 4">
+            <a:extLst>
+              <a:ext uri="{FF2B5EF4-FFF2-40B4-BE49-F238E27FC236}">
+                <a16:creationId xmlns:a16="http://schemas.microsoft.com/office/drawing/2014/main" id="{D1CCEEB6-0FB9-4C4E-A7F2-C6729B9FC8EA}"/>
+              </a:ext>
+            </a:extLst>
+          </p:cNvPr>
+          <p:cNvSpPr/>
+          <p:nvPr/>
+        </p:nvSpPr>
+        <p:spPr>
+          <a:xfrm>
+            <a:off x="1510145" y="2369129"/>
+            <a:ext cx="1524001" cy="665018"/>
+          </a:xfrm>
+          <a:prstGeom prst="rect">
+            <a:avLst/>
+          </a:prstGeom>
+          <a:solidFill>
+            <a:schemeClr val="bg1">
+              <a:lumMod val="95000"/>
+            </a:schemeClr>
+          </a:solidFill>
+          <a:ln w="38100">
+            <a:solidFill>
+              <a:schemeClr val="bg2">
+                <a:lumMod val="50000"/>
+                <a:alpha val="80030"/>
+              </a:schemeClr>
+            </a:solidFill>
+          </a:ln>
+        </p:spPr>
+        <p:style>
+          <a:lnRef idx="2">
+            <a:schemeClr val="accent1">
+              <a:shade val="50000"/>
+            </a:schemeClr>
+          </a:lnRef>
+          <a:fillRef idx="1">
+            <a:schemeClr val="accent1"/>
+          </a:fillRef>
+          <a:effectRef idx="0">
+            <a:schemeClr val="accent1"/>
+          </a:effectRef>
+          <a:fontRef idx="minor">
+            <a:schemeClr val="lt1"/>
+          </a:fontRef>
+        </p:style>
+        <p:txBody>
+          <a:bodyPr rtlCol="0" anchor="ctr"/>
+          <a:lstStyle/>
+          <a:p>
+            <a:pPr algn="ctr"/>
+            <a:r>
+              <a:rPr lang="en-US" sz="2000" dirty="0">
+                <a:solidFill>
+                  <a:schemeClr val="tx1">
+                    <a:lumMod val="85000"/>
+                    <a:lumOff val="15000"/>
+                  </a:schemeClr>
+                </a:solidFill>
+              </a:rPr>
+              <a:t>Role</a:t>
+            </a:r>
+          </a:p>
+        </p:txBody>
+      </p:sp>
+      <p:sp>
+        <p:nvSpPr>
+          <p:cNvPr id="6" name="Rectangle 5">
+            <a:extLst>
+              <a:ext uri="{FF2B5EF4-FFF2-40B4-BE49-F238E27FC236}">
+                <a16:creationId xmlns:a16="http://schemas.microsoft.com/office/drawing/2014/main" id="{292A8187-D086-6241-BD43-8F4A54EACBD1}"/>
+              </a:ext>
+            </a:extLst>
+          </p:cNvPr>
+          <p:cNvSpPr/>
+          <p:nvPr/>
+        </p:nvSpPr>
+        <p:spPr>
+          <a:xfrm>
+            <a:off x="1510142" y="3616039"/>
+            <a:ext cx="1524001" cy="665018"/>
+          </a:xfrm>
+          <a:prstGeom prst="rect">
+            <a:avLst/>
+          </a:prstGeom>
+          <a:solidFill>
+            <a:schemeClr val="bg1">
+              <a:lumMod val="95000"/>
+            </a:schemeClr>
+          </a:solidFill>
+          <a:ln w="38100">
+            <a:solidFill>
+              <a:schemeClr val="bg2">
+                <a:lumMod val="50000"/>
+                <a:alpha val="80030"/>
+              </a:schemeClr>
+            </a:solidFill>
+          </a:ln>
+        </p:spPr>
+        <p:style>
+          <a:lnRef idx="2">
+            <a:schemeClr val="accent1">
+              <a:shade val="50000"/>
+            </a:schemeClr>
+          </a:lnRef>
+          <a:fillRef idx="1">
+            <a:schemeClr val="accent1"/>
+          </a:fillRef>
+          <a:effectRef idx="0">
+            <a:schemeClr val="accent1"/>
+          </a:effectRef>
+          <a:fontRef idx="minor">
+            <a:schemeClr val="lt1"/>
+          </a:fontRef>
+        </p:style>
+        <p:txBody>
+          <a:bodyPr rtlCol="0" anchor="ctr"/>
+          <a:lstStyle/>
+          <a:p>
+            <a:pPr algn="ctr"/>
+            <a:r>
+              <a:rPr lang="en-US" sz="2000" dirty="0">
+                <a:solidFill>
+                  <a:schemeClr val="tx1">
+                    <a:lumMod val="85000"/>
+                    <a:lumOff val="15000"/>
+                  </a:schemeClr>
+                </a:solidFill>
+              </a:rPr>
+              <a:t>Permission</a:t>
+            </a:r>
+          </a:p>
+        </p:txBody>
+      </p:sp>
+      <p:sp>
+        <p:nvSpPr>
+          <p:cNvPr id="7" name="Rectangle 6">
+            <a:extLst>
+              <a:ext uri="{FF2B5EF4-FFF2-40B4-BE49-F238E27FC236}">
+                <a16:creationId xmlns:a16="http://schemas.microsoft.com/office/drawing/2014/main" id="{084195EB-CEC7-3642-9E4F-07763E9EF4CC}"/>
+              </a:ext>
+            </a:extLst>
+          </p:cNvPr>
+          <p:cNvSpPr/>
+          <p:nvPr/>
+        </p:nvSpPr>
+        <p:spPr>
+          <a:xfrm>
+            <a:off x="1510142" y="4862949"/>
+            <a:ext cx="1524001" cy="665018"/>
+          </a:xfrm>
+          <a:prstGeom prst="rect">
+            <a:avLst/>
+          </a:prstGeom>
+          <a:solidFill>
+            <a:schemeClr val="bg1">
+              <a:lumMod val="95000"/>
+            </a:schemeClr>
+          </a:solidFill>
+          <a:ln w="38100">
+            <a:solidFill>
+              <a:schemeClr val="bg2">
+                <a:lumMod val="50000"/>
+                <a:alpha val="80030"/>
+              </a:schemeClr>
+            </a:solidFill>
+          </a:ln>
+        </p:spPr>
+        <p:style>
+          <a:lnRef idx="2">
+            <a:schemeClr val="accent1">
+              <a:shade val="50000"/>
+            </a:schemeClr>
+          </a:lnRef>
+          <a:fillRef idx="1">
+            <a:schemeClr val="accent1"/>
+          </a:fillRef>
+          <a:effectRef idx="0">
+            <a:schemeClr val="accent1"/>
+          </a:effectRef>
+          <a:fontRef idx="minor">
+            <a:schemeClr val="lt1"/>
+          </a:fontRef>
+        </p:style>
+        <p:txBody>
+          <a:bodyPr rtlCol="0" anchor="ctr"/>
+          <a:lstStyle/>
+          <a:p>
+            <a:pPr algn="ctr"/>
+            <a:r>
+              <a:rPr lang="en-US" sz="2000" dirty="0">
+                <a:solidFill>
+                  <a:schemeClr val="tx1">
+                    <a:lumMod val="85000"/>
+                    <a:lumOff val="15000"/>
+                  </a:schemeClr>
+                </a:solidFill>
+              </a:rPr>
+              <a:t>Capability</a:t>
+            </a:r>
+          </a:p>
+        </p:txBody>
+      </p:sp>
+      <p:sp>
+        <p:nvSpPr>
+          <p:cNvPr id="15" name="Down Arrow 14">
+            <a:extLst>
+              <a:ext uri="{FF2B5EF4-FFF2-40B4-BE49-F238E27FC236}">
+                <a16:creationId xmlns:a16="http://schemas.microsoft.com/office/drawing/2014/main" id="{03FE2F9B-D768-9846-AF7E-C97F162AF435}"/>
+              </a:ext>
+            </a:extLst>
+          </p:cNvPr>
+          <p:cNvSpPr/>
+          <p:nvPr/>
+        </p:nvSpPr>
+        <p:spPr>
+          <a:xfrm>
+            <a:off x="2191459" y="1787237"/>
+            <a:ext cx="161365" cy="581892"/>
+          </a:xfrm>
+          <a:prstGeom prst="downArrow">
+            <a:avLst>
+              <a:gd name="adj1" fmla="val 50000"/>
+              <a:gd name="adj2" fmla="val 129998"/>
+            </a:avLst>
+          </a:prstGeom>
+          <a:solidFill>
+            <a:schemeClr val="bg1">
+              <a:lumMod val="95000"/>
+            </a:schemeClr>
+          </a:solidFill>
+          <a:ln>
+            <a:solidFill>
+              <a:schemeClr val="bg2">
+                <a:lumMod val="50000"/>
+                <a:alpha val="80030"/>
+              </a:schemeClr>
+            </a:solidFill>
+          </a:ln>
+        </p:spPr>
+        <p:style>
+          <a:lnRef idx="2">
+            <a:schemeClr val="accent1">
+              <a:shade val="50000"/>
+            </a:schemeClr>
+          </a:lnRef>
+          <a:fillRef idx="1">
+            <a:schemeClr val="accent1"/>
+          </a:fillRef>
+          <a:effectRef idx="0">
+            <a:schemeClr val="accent1"/>
+          </a:effectRef>
+          <a:fontRef idx="minor">
+            <a:schemeClr val="lt1"/>
+          </a:fontRef>
+        </p:style>
+        <p:txBody>
+          <a:bodyPr rtlCol="0" anchor="ctr"/>
+          <a:lstStyle/>
+          <a:p>
+            <a:pPr algn="ctr"/>
+            <a:endParaRPr lang="en-US"/>
+          </a:p>
+        </p:txBody>
+      </p:sp>
+      <p:sp>
+        <p:nvSpPr>
+          <p:cNvPr id="17" name="Down Arrow 16">
+            <a:extLst>
+              <a:ext uri="{FF2B5EF4-FFF2-40B4-BE49-F238E27FC236}">
+                <a16:creationId xmlns:a16="http://schemas.microsoft.com/office/drawing/2014/main" id="{79138125-78FD-2843-9EDB-DB6D8C3820EA}"/>
+              </a:ext>
+            </a:extLst>
+          </p:cNvPr>
+          <p:cNvSpPr/>
+          <p:nvPr/>
+        </p:nvSpPr>
+        <p:spPr>
+          <a:xfrm>
+            <a:off x="2191458" y="4281057"/>
+            <a:ext cx="161365" cy="581892"/>
+          </a:xfrm>
+          <a:prstGeom prst="downArrow">
+            <a:avLst>
+              <a:gd name="adj1" fmla="val 50000"/>
+              <a:gd name="adj2" fmla="val 129998"/>
+            </a:avLst>
+          </a:prstGeom>
+          <a:solidFill>
+            <a:schemeClr val="bg1">
+              <a:lumMod val="95000"/>
+            </a:schemeClr>
+          </a:solidFill>
+          <a:ln>
+            <a:solidFill>
+              <a:schemeClr val="bg2">
+                <a:lumMod val="50000"/>
+                <a:alpha val="80030"/>
+              </a:schemeClr>
+            </a:solidFill>
+          </a:ln>
+        </p:spPr>
+        <p:style>
+          <a:lnRef idx="2">
+            <a:schemeClr val="accent1">
+              <a:shade val="50000"/>
+            </a:schemeClr>
+          </a:lnRef>
+          <a:fillRef idx="1">
+            <a:schemeClr val="accent1"/>
+          </a:fillRef>
+          <a:effectRef idx="0">
+            <a:schemeClr val="accent1"/>
+          </a:effectRef>
+          <a:fontRef idx="minor">
+            <a:schemeClr val="lt1"/>
+          </a:fontRef>
+        </p:style>
+        <p:txBody>
+          <a:bodyPr rtlCol="0" anchor="ctr"/>
+          <a:lstStyle/>
+          <a:p>
+            <a:pPr algn="ctr"/>
+            <a:endParaRPr lang="en-US"/>
+          </a:p>
+        </p:txBody>
+      </p:sp>
+      <p:sp>
+        <p:nvSpPr>
+          <p:cNvPr id="18" name="Down Arrow 17">
+            <a:extLst>
+              <a:ext uri="{FF2B5EF4-FFF2-40B4-BE49-F238E27FC236}">
+                <a16:creationId xmlns:a16="http://schemas.microsoft.com/office/drawing/2014/main" id="{A8DAD2EC-3E9B-E942-96A2-159C54469EE2}"/>
+              </a:ext>
+            </a:extLst>
+          </p:cNvPr>
+          <p:cNvSpPr/>
+          <p:nvPr/>
+        </p:nvSpPr>
+        <p:spPr>
+          <a:xfrm>
+            <a:off x="2191459" y="3029199"/>
+            <a:ext cx="161365" cy="581892"/>
+          </a:xfrm>
+          <a:prstGeom prst="downArrow">
+            <a:avLst>
+              <a:gd name="adj1" fmla="val 50000"/>
+              <a:gd name="adj2" fmla="val 129998"/>
+            </a:avLst>
+          </a:prstGeom>
+          <a:solidFill>
+            <a:schemeClr val="bg1">
+              <a:lumMod val="95000"/>
+            </a:schemeClr>
+          </a:solidFill>
+          <a:ln>
+            <a:solidFill>
+              <a:schemeClr val="bg2">
+                <a:lumMod val="50000"/>
+                <a:alpha val="80030"/>
+              </a:schemeClr>
+            </a:solidFill>
+          </a:ln>
+        </p:spPr>
+        <p:style>
+          <a:lnRef idx="2">
+            <a:schemeClr val="accent1">
+              <a:shade val="50000"/>
+            </a:schemeClr>
+          </a:lnRef>
+          <a:fillRef idx="1">
+            <a:schemeClr val="accent1"/>
+          </a:fillRef>
+          <a:effectRef idx="0">
+            <a:schemeClr val="accent1"/>
+          </a:effectRef>
+          <a:fontRef idx="minor">
+            <a:schemeClr val="lt1"/>
+          </a:fontRef>
+        </p:style>
+        <p:txBody>
+          <a:bodyPr rtlCol="0" anchor="ctr"/>
+          <a:lstStyle/>
+          <a:p>
+            <a:pPr algn="ctr"/>
+            <a:endParaRPr lang="en-US"/>
+          </a:p>
+        </p:txBody>
+      </p:sp>
+    </p:spTree>
+    <p:extLst>
+      <p:ext uri="{BB962C8B-B14F-4D97-AF65-F5344CB8AC3E}">
+        <p14:creationId xmlns:p14="http://schemas.microsoft.com/office/powerpoint/2010/main" val="315599626"/>
+      </p:ext>
+    </p:extLst>
+  </p:cSld>
+  <p:clrMapOvr>
+    <a:masterClrMapping/>
+  </p:clrMapOvr>
+</p:sld>
+</file>
+
+<file path=ppt/slides/slide6.xml><?xml version="1.0" encoding="utf-8"?>
+<p:sld xmlns:a="http://schemas.openxmlformats.org/drawingml/2006/main" xmlns:r="http://schemas.openxmlformats.org/officeDocument/2006/relationships" xmlns:p="http://schemas.openxmlformats.org/presentationml/2006/main">
+  <p:cSld>
+    <p:spTree>
+      <p:nvGrpSpPr>
+        <p:cNvPr id="1" name=""/>
+        <p:cNvGrpSpPr/>
+        <p:nvPr/>
+      </p:nvGrpSpPr>
+      <p:grpSpPr>
+        <a:xfrm>
+          <a:off x="0" y="0"/>
+          <a:ext cx="0" cy="0"/>
+          <a:chOff x="0" y="0"/>
+          <a:chExt cx="0" cy="0"/>
+        </a:xfrm>
+      </p:grpSpPr>
+      <p:sp>
+        <p:nvSpPr>
+          <p:cNvPr id="11" name="Rectangle 10">
+            <a:extLst>
+              <a:ext uri="{FF2B5EF4-FFF2-40B4-BE49-F238E27FC236}">
+                <a16:creationId xmlns:a16="http://schemas.microsoft.com/office/drawing/2014/main" id="{F5DFF4CB-98E1-FF48-A069-97B4154B328B}"/>
+              </a:ext>
+            </a:extLst>
+          </p:cNvPr>
+          <p:cNvSpPr/>
+          <p:nvPr/>
+        </p:nvSpPr>
+        <p:spPr>
+          <a:xfrm>
+            <a:off x="1752176" y="2632947"/>
+            <a:ext cx="1524001" cy="665018"/>
+          </a:xfrm>
+          <a:prstGeom prst="rect">
+            <a:avLst/>
+          </a:prstGeom>
+          <a:solidFill>
+            <a:schemeClr val="bg1">
+              <a:lumMod val="95000"/>
+              <a:alpha val="79584"/>
+            </a:schemeClr>
+          </a:solidFill>
+          <a:ln w="38100">
+            <a:solidFill>
+              <a:schemeClr val="bg2">
+                <a:lumMod val="50000"/>
+              </a:schemeClr>
+            </a:solidFill>
+          </a:ln>
+        </p:spPr>
+        <p:style>
+          <a:lnRef idx="2">
+            <a:schemeClr val="accent1">
+              <a:shade val="50000"/>
+            </a:schemeClr>
+          </a:lnRef>
+          <a:fillRef idx="1">
+            <a:schemeClr val="accent1"/>
+          </a:fillRef>
+          <a:effectRef idx="0">
+            <a:schemeClr val="accent1"/>
+          </a:effectRef>
+          <a:fontRef idx="minor">
+            <a:schemeClr val="lt1"/>
+          </a:fontRef>
+        </p:style>
+        <p:txBody>
+          <a:bodyPr rtlCol="0" anchor="ctr"/>
+          <a:lstStyle/>
+          <a:p>
+            <a:pPr algn="ctr"/>
+            <a:r>
+              <a:rPr lang="en-US" sz="2000" dirty="0">
+                <a:solidFill>
+                  <a:schemeClr val="tx1">
+                    <a:lumMod val="85000"/>
+                    <a:lumOff val="15000"/>
+                  </a:schemeClr>
+                </a:solidFill>
+              </a:rPr>
+              <a:t>Role</a:t>
+            </a:r>
+          </a:p>
+        </p:txBody>
+      </p:sp>
+      <p:sp>
+        <p:nvSpPr>
+          <p:cNvPr id="14" name="Down Arrow 13">
+            <a:extLst>
+              <a:ext uri="{FF2B5EF4-FFF2-40B4-BE49-F238E27FC236}">
+                <a16:creationId xmlns:a16="http://schemas.microsoft.com/office/drawing/2014/main" id="{7401979E-EFD4-3B4A-B5AE-34BF68CA615C}"/>
+              </a:ext>
+            </a:extLst>
+          </p:cNvPr>
+          <p:cNvSpPr/>
+          <p:nvPr/>
+        </p:nvSpPr>
+        <p:spPr>
+          <a:xfrm rot="20675198">
+            <a:off x="2302962" y="1764165"/>
+            <a:ext cx="161365" cy="888316"/>
+          </a:xfrm>
+          <a:prstGeom prst="downArrow">
+            <a:avLst>
+              <a:gd name="adj1" fmla="val 50000"/>
+              <a:gd name="adj2" fmla="val 129998"/>
+            </a:avLst>
+          </a:prstGeom>
+          <a:solidFill>
+            <a:schemeClr val="bg1">
+              <a:lumMod val="95000"/>
+              <a:alpha val="79584"/>
+            </a:schemeClr>
+          </a:solidFill>
+          <a:ln>
+            <a:solidFill>
+              <a:schemeClr val="bg2">
+                <a:lumMod val="50000"/>
+              </a:schemeClr>
+            </a:solidFill>
+          </a:ln>
+        </p:spPr>
+        <p:style>
+          <a:lnRef idx="2">
+            <a:schemeClr val="accent1">
+              <a:shade val="50000"/>
+            </a:schemeClr>
+          </a:lnRef>
+          <a:fillRef idx="1">
+            <a:schemeClr val="accent1"/>
+          </a:fillRef>
+          <a:effectRef idx="0">
+            <a:schemeClr val="accent1"/>
+          </a:effectRef>
+          <a:fontRef idx="minor">
+            <a:schemeClr val="lt1"/>
+          </a:fontRef>
+        </p:style>
+        <p:txBody>
+          <a:bodyPr rtlCol="0" anchor="ctr"/>
+          <a:lstStyle/>
+          <a:p>
+            <a:pPr algn="ctr"/>
+            <a:endParaRPr lang="en-US"/>
+          </a:p>
+        </p:txBody>
+      </p:sp>
+      <p:sp>
+        <p:nvSpPr>
+          <p:cNvPr id="10" name="Rectangle 9">
+            <a:extLst>
+              <a:ext uri="{FF2B5EF4-FFF2-40B4-BE49-F238E27FC236}">
+                <a16:creationId xmlns:a16="http://schemas.microsoft.com/office/drawing/2014/main" id="{B7F1EEC2-724B-1848-91A6-1DFD50EBDEE6}"/>
+              </a:ext>
+            </a:extLst>
+          </p:cNvPr>
+          <p:cNvSpPr/>
+          <p:nvPr/>
+        </p:nvSpPr>
+        <p:spPr>
+          <a:xfrm>
+            <a:off x="1671499" y="2545007"/>
+            <a:ext cx="1524001" cy="665018"/>
+          </a:xfrm>
+          <a:prstGeom prst="rect">
+            <a:avLst/>
+          </a:prstGeom>
+          <a:solidFill>
+            <a:schemeClr val="bg1">
+              <a:lumMod val="95000"/>
+              <a:alpha val="79584"/>
+            </a:schemeClr>
+          </a:solidFill>
+          <a:ln w="38100">
+            <a:solidFill>
+              <a:schemeClr val="bg2">
+                <a:lumMod val="50000"/>
+              </a:schemeClr>
+            </a:solidFill>
+          </a:ln>
+        </p:spPr>
+        <p:style>
+          <a:lnRef idx="2">
+            <a:schemeClr val="accent1">
+              <a:shade val="50000"/>
+            </a:schemeClr>
+          </a:lnRef>
+          <a:fillRef idx="1">
+            <a:schemeClr val="accent1"/>
+          </a:fillRef>
+          <a:effectRef idx="0">
+            <a:schemeClr val="accent1"/>
+          </a:effectRef>
+          <a:fontRef idx="minor">
+            <a:schemeClr val="lt1"/>
+          </a:fontRef>
+        </p:style>
+        <p:txBody>
+          <a:bodyPr rtlCol="0" anchor="ctr"/>
+          <a:lstStyle/>
+          <a:p>
+            <a:pPr algn="ctr"/>
+            <a:r>
+              <a:rPr lang="en-US" sz="2000" dirty="0">
+                <a:solidFill>
+                  <a:schemeClr val="tx1">
+                    <a:lumMod val="85000"/>
+                    <a:lumOff val="15000"/>
+                  </a:schemeClr>
+                </a:solidFill>
+              </a:rPr>
+              <a:t>Role</a:t>
+            </a:r>
+          </a:p>
+        </p:txBody>
+      </p:sp>
+      <p:sp>
+        <p:nvSpPr>
+          <p:cNvPr id="13" name="Down Arrow 12">
+            <a:extLst>
+              <a:ext uri="{FF2B5EF4-FFF2-40B4-BE49-F238E27FC236}">
+                <a16:creationId xmlns:a16="http://schemas.microsoft.com/office/drawing/2014/main" id="{B4CDB232-AE9B-3D4F-B146-8B666553560E}"/>
+              </a:ext>
+            </a:extLst>
+          </p:cNvPr>
+          <p:cNvSpPr/>
+          <p:nvPr/>
+        </p:nvSpPr>
+        <p:spPr>
+          <a:xfrm rot="21000000">
+            <a:off x="2264270" y="1772155"/>
+            <a:ext cx="161365" cy="772627"/>
+          </a:xfrm>
+          <a:prstGeom prst="downArrow">
+            <a:avLst>
+              <a:gd name="adj1" fmla="val 50000"/>
+              <a:gd name="adj2" fmla="val 129998"/>
+            </a:avLst>
+          </a:prstGeom>
+          <a:solidFill>
+            <a:schemeClr val="bg1">
+              <a:lumMod val="95000"/>
+              <a:alpha val="79584"/>
+            </a:schemeClr>
+          </a:solidFill>
+          <a:ln>
+            <a:solidFill>
+              <a:schemeClr val="bg2">
+                <a:lumMod val="50000"/>
+              </a:schemeClr>
+            </a:solidFill>
+          </a:ln>
+        </p:spPr>
+        <p:style>
+          <a:lnRef idx="2">
+            <a:schemeClr val="accent1">
+              <a:shade val="50000"/>
+            </a:schemeClr>
+          </a:lnRef>
+          <a:fillRef idx="1">
+            <a:schemeClr val="accent1"/>
+          </a:fillRef>
+          <a:effectRef idx="0">
+            <a:schemeClr val="accent1"/>
+          </a:effectRef>
+          <a:fontRef idx="minor">
+            <a:schemeClr val="lt1"/>
+          </a:fontRef>
+        </p:style>
+        <p:txBody>
+          <a:bodyPr rtlCol="0" anchor="ctr"/>
+          <a:lstStyle/>
+          <a:p>
+            <a:pPr algn="ctr"/>
+            <a:endParaRPr lang="en-US"/>
+          </a:p>
+        </p:txBody>
+      </p:sp>
+      <p:sp>
+        <p:nvSpPr>
+          <p:cNvPr id="9" name="Rectangle 8">
+            <a:extLst>
+              <a:ext uri="{FF2B5EF4-FFF2-40B4-BE49-F238E27FC236}">
+                <a16:creationId xmlns:a16="http://schemas.microsoft.com/office/drawing/2014/main" id="{6F7D0253-8737-834F-8F03-1696179FCA7C}"/>
+              </a:ext>
+            </a:extLst>
+          </p:cNvPr>
+          <p:cNvSpPr/>
+          <p:nvPr/>
+        </p:nvSpPr>
+        <p:spPr>
+          <a:xfrm>
+            <a:off x="1590822" y="2457068"/>
+            <a:ext cx="1524001" cy="665018"/>
+          </a:xfrm>
+          <a:prstGeom prst="rect">
+            <a:avLst/>
+          </a:prstGeom>
+          <a:solidFill>
+            <a:schemeClr val="bg1">
+              <a:lumMod val="95000"/>
+              <a:alpha val="79584"/>
+            </a:schemeClr>
+          </a:solidFill>
+          <a:ln w="38100">
+            <a:solidFill>
+              <a:schemeClr val="bg2">
+                <a:lumMod val="50000"/>
+              </a:schemeClr>
+            </a:solidFill>
+          </a:ln>
+        </p:spPr>
+        <p:style>
+          <a:lnRef idx="2">
+            <a:schemeClr val="accent1">
+              <a:shade val="50000"/>
+            </a:schemeClr>
+          </a:lnRef>
+          <a:fillRef idx="1">
+            <a:schemeClr val="accent1"/>
+          </a:fillRef>
+          <a:effectRef idx="0">
+            <a:schemeClr val="accent1"/>
+          </a:effectRef>
+          <a:fontRef idx="minor">
+            <a:schemeClr val="lt1"/>
+          </a:fontRef>
+        </p:style>
+        <p:txBody>
+          <a:bodyPr rtlCol="0" anchor="ctr"/>
+          <a:lstStyle/>
+          <a:p>
+            <a:pPr algn="ctr"/>
+            <a:r>
+              <a:rPr lang="en-US" sz="2000" dirty="0">
+                <a:solidFill>
+                  <a:schemeClr val="tx1">
+                    <a:lumMod val="85000"/>
+                    <a:lumOff val="15000"/>
+                  </a:schemeClr>
+                </a:solidFill>
+              </a:rPr>
+              <a:t>Role</a:t>
+            </a:r>
+          </a:p>
+        </p:txBody>
+      </p:sp>
+      <p:sp>
+        <p:nvSpPr>
+          <p:cNvPr id="12" name="Down Arrow 11">
+            <a:extLst>
+              <a:ext uri="{FF2B5EF4-FFF2-40B4-BE49-F238E27FC236}">
+                <a16:creationId xmlns:a16="http://schemas.microsoft.com/office/drawing/2014/main" id="{6CFDBBEA-1C60-B94C-BA5B-0530357207B3}"/>
+              </a:ext>
+            </a:extLst>
+          </p:cNvPr>
+          <p:cNvSpPr/>
+          <p:nvPr/>
+        </p:nvSpPr>
+        <p:spPr>
+          <a:xfrm rot="21300000">
+            <a:off x="2216826" y="1778094"/>
+            <a:ext cx="161365" cy="672768"/>
+          </a:xfrm>
+          <a:prstGeom prst="downArrow">
+            <a:avLst>
+              <a:gd name="adj1" fmla="val 50000"/>
+              <a:gd name="adj2" fmla="val 129998"/>
+            </a:avLst>
+          </a:prstGeom>
+          <a:solidFill>
+            <a:schemeClr val="bg1">
+              <a:lumMod val="95000"/>
+              <a:alpha val="79584"/>
+            </a:schemeClr>
+          </a:solidFill>
+          <a:ln>
+            <a:solidFill>
+              <a:schemeClr val="bg2">
+                <a:lumMod val="50000"/>
+              </a:schemeClr>
+            </a:solidFill>
+          </a:ln>
+        </p:spPr>
+        <p:style>
+          <a:lnRef idx="2">
+            <a:schemeClr val="accent1">
+              <a:shade val="50000"/>
+            </a:schemeClr>
+          </a:lnRef>
+          <a:fillRef idx="1">
+            <a:schemeClr val="accent1"/>
+          </a:fillRef>
+          <a:effectRef idx="0">
+            <a:schemeClr val="accent1"/>
+          </a:effectRef>
+          <a:fontRef idx="minor">
+            <a:schemeClr val="lt1"/>
+          </a:fontRef>
+        </p:style>
+        <p:txBody>
+          <a:bodyPr rtlCol="0" anchor="ctr"/>
+          <a:lstStyle/>
+          <a:p>
+            <a:pPr algn="ctr"/>
+            <a:endParaRPr lang="en-US"/>
+          </a:p>
+        </p:txBody>
+      </p:sp>
+      <p:sp>
+        <p:nvSpPr>
+          <p:cNvPr id="2" name="Rectangle 1">
+            <a:extLst>
+              <a:ext uri="{FF2B5EF4-FFF2-40B4-BE49-F238E27FC236}">
+                <a16:creationId xmlns:a16="http://schemas.microsoft.com/office/drawing/2014/main" id="{9B7387F5-ACA9-7141-97D3-A62F3221BA74}"/>
+              </a:ext>
+            </a:extLst>
+          </p:cNvPr>
+          <p:cNvSpPr/>
+          <p:nvPr/>
+        </p:nvSpPr>
+        <p:spPr>
+          <a:xfrm>
+            <a:off x="1510145" y="1122219"/>
+            <a:ext cx="1524001" cy="665018"/>
+          </a:xfrm>
+          <a:prstGeom prst="rect">
+            <a:avLst/>
+          </a:prstGeom>
+          <a:solidFill>
+            <a:schemeClr val="bg1">
+              <a:lumMod val="95000"/>
+              <a:alpha val="79584"/>
+            </a:schemeClr>
+          </a:solidFill>
+          <a:ln w="38100">
+            <a:solidFill>
+              <a:schemeClr val="bg2">
+                <a:lumMod val="50000"/>
+              </a:schemeClr>
+            </a:solidFill>
+          </a:ln>
+        </p:spPr>
+        <p:style>
+          <a:lnRef idx="2">
+            <a:schemeClr val="accent1">
+              <a:shade val="50000"/>
+            </a:schemeClr>
+          </a:lnRef>
+          <a:fillRef idx="1">
+            <a:schemeClr val="accent1"/>
+          </a:fillRef>
+          <a:effectRef idx="0">
+            <a:schemeClr val="accent1"/>
+          </a:effectRef>
+          <a:fontRef idx="minor">
+            <a:schemeClr val="lt1"/>
+          </a:fontRef>
+        </p:style>
+        <p:txBody>
+          <a:bodyPr rtlCol="0" anchor="ctr"/>
+          <a:lstStyle/>
+          <a:p>
+            <a:pPr algn="ctr"/>
+            <a:r>
+              <a:rPr lang="en-US" sz="2000" dirty="0">
+                <a:solidFill>
+                  <a:schemeClr val="tx1">
+                    <a:lumMod val="85000"/>
+                    <a:lumOff val="15000"/>
+                  </a:schemeClr>
+                </a:solidFill>
+              </a:rPr>
+              <a:t>User</a:t>
+            </a:r>
+          </a:p>
+        </p:txBody>
+      </p:sp>
+      <p:sp>
+        <p:nvSpPr>
+          <p:cNvPr id="5" name="Rectangle 4">
+            <a:extLst>
+              <a:ext uri="{FF2B5EF4-FFF2-40B4-BE49-F238E27FC236}">
+                <a16:creationId xmlns:a16="http://schemas.microsoft.com/office/drawing/2014/main" id="{D1CCEEB6-0FB9-4C4E-A7F2-C6729B9FC8EA}"/>
+              </a:ext>
+            </a:extLst>
+          </p:cNvPr>
+          <p:cNvSpPr/>
+          <p:nvPr/>
+        </p:nvSpPr>
+        <p:spPr>
+          <a:xfrm>
+            <a:off x="1510145" y="2369129"/>
+            <a:ext cx="1524001" cy="665018"/>
+          </a:xfrm>
+          <a:prstGeom prst="rect">
+            <a:avLst/>
+          </a:prstGeom>
+          <a:solidFill>
+            <a:schemeClr val="bg1">
+              <a:lumMod val="95000"/>
+              <a:alpha val="79584"/>
+            </a:schemeClr>
+          </a:solidFill>
+          <a:ln w="38100">
+            <a:solidFill>
+              <a:schemeClr val="bg2">
+                <a:lumMod val="50000"/>
+              </a:schemeClr>
+            </a:solidFill>
+          </a:ln>
+        </p:spPr>
+        <p:style>
+          <a:lnRef idx="2">
+            <a:schemeClr val="accent1">
+              <a:shade val="50000"/>
+            </a:schemeClr>
+          </a:lnRef>
+          <a:fillRef idx="1">
+            <a:schemeClr val="accent1"/>
+          </a:fillRef>
+          <a:effectRef idx="0">
+            <a:schemeClr val="accent1"/>
+          </a:effectRef>
+          <a:fontRef idx="minor">
+            <a:schemeClr val="lt1"/>
+          </a:fontRef>
+        </p:style>
+        <p:txBody>
+          <a:bodyPr rtlCol="0" anchor="ctr"/>
+          <a:lstStyle/>
+          <a:p>
+            <a:pPr algn="ctr"/>
+            <a:r>
+              <a:rPr lang="en-US" sz="2000" dirty="0">
+                <a:solidFill>
+                  <a:schemeClr val="tx1">
+                    <a:lumMod val="85000"/>
+                    <a:lumOff val="15000"/>
+                  </a:schemeClr>
+                </a:solidFill>
+              </a:rPr>
+              <a:t>Role</a:t>
+            </a:r>
+          </a:p>
+        </p:txBody>
+      </p:sp>
+      <p:sp>
+        <p:nvSpPr>
+          <p:cNvPr id="15" name="Down Arrow 14">
+            <a:extLst>
+              <a:ext uri="{FF2B5EF4-FFF2-40B4-BE49-F238E27FC236}">
+                <a16:creationId xmlns:a16="http://schemas.microsoft.com/office/drawing/2014/main" id="{03FE2F9B-D768-9846-AF7E-C97F162AF435}"/>
+              </a:ext>
+            </a:extLst>
+          </p:cNvPr>
+          <p:cNvSpPr/>
+          <p:nvPr/>
+        </p:nvSpPr>
+        <p:spPr>
+          <a:xfrm>
+            <a:off x="2191459" y="1787237"/>
+            <a:ext cx="161365" cy="581892"/>
+          </a:xfrm>
+          <a:prstGeom prst="downArrow">
+            <a:avLst>
+              <a:gd name="adj1" fmla="val 50000"/>
+              <a:gd name="adj2" fmla="val 129998"/>
+            </a:avLst>
+          </a:prstGeom>
+          <a:solidFill>
+            <a:schemeClr val="bg1">
+              <a:lumMod val="95000"/>
+              <a:alpha val="79584"/>
+            </a:schemeClr>
+          </a:solidFill>
+          <a:ln>
+            <a:solidFill>
+              <a:schemeClr val="bg2">
+                <a:lumMod val="50000"/>
+              </a:schemeClr>
+            </a:solidFill>
+          </a:ln>
+        </p:spPr>
+        <p:style>
+          <a:lnRef idx="2">
+            <a:schemeClr val="accent1">
+              <a:shade val="50000"/>
+            </a:schemeClr>
+          </a:lnRef>
+          <a:fillRef idx="1">
+            <a:schemeClr val="accent1"/>
+          </a:fillRef>
+          <a:effectRef idx="0">
+            <a:schemeClr val="accent1"/>
+          </a:effectRef>
+          <a:fontRef idx="minor">
+            <a:schemeClr val="lt1"/>
+          </a:fontRef>
+        </p:style>
+        <p:txBody>
+          <a:bodyPr rtlCol="0" anchor="ctr"/>
+          <a:lstStyle/>
+          <a:p>
+            <a:pPr algn="ctr"/>
+            <a:endParaRPr lang="en-US"/>
+          </a:p>
+        </p:txBody>
+      </p:sp>
+      <p:sp>
+        <p:nvSpPr>
+          <p:cNvPr id="6" name="Rectangle 5">
+            <a:extLst>
+              <a:ext uri="{FF2B5EF4-FFF2-40B4-BE49-F238E27FC236}">
+                <a16:creationId xmlns:a16="http://schemas.microsoft.com/office/drawing/2014/main" id="{292A8187-D086-6241-BD43-8F4A54EACBD1}"/>
+              </a:ext>
+            </a:extLst>
+          </p:cNvPr>
+          <p:cNvSpPr/>
+          <p:nvPr/>
+        </p:nvSpPr>
+        <p:spPr>
+          <a:xfrm>
+            <a:off x="1510142" y="3616039"/>
+            <a:ext cx="1524001" cy="665018"/>
+          </a:xfrm>
+          <a:prstGeom prst="rect">
+            <a:avLst/>
+          </a:prstGeom>
+          <a:solidFill>
+            <a:schemeClr val="bg1">
+              <a:lumMod val="95000"/>
+              <a:alpha val="79584"/>
+            </a:schemeClr>
+          </a:solidFill>
+          <a:ln w="38100">
+            <a:solidFill>
+              <a:schemeClr val="bg2">
+                <a:lumMod val="50000"/>
+              </a:schemeClr>
+            </a:solidFill>
+          </a:ln>
+        </p:spPr>
+        <p:style>
+          <a:lnRef idx="2">
+            <a:schemeClr val="accent1">
+              <a:shade val="50000"/>
+            </a:schemeClr>
+          </a:lnRef>
+          <a:fillRef idx="1">
+            <a:schemeClr val="accent1"/>
+          </a:fillRef>
+          <a:effectRef idx="0">
+            <a:schemeClr val="accent1"/>
+          </a:effectRef>
+          <a:fontRef idx="minor">
+            <a:schemeClr val="lt1"/>
+          </a:fontRef>
+        </p:style>
+        <p:txBody>
+          <a:bodyPr rtlCol="0" anchor="ctr"/>
+          <a:lstStyle/>
+          <a:p>
+            <a:pPr algn="ctr"/>
+            <a:r>
+              <a:rPr lang="en-US" sz="2000" dirty="0">
+                <a:solidFill>
+                  <a:schemeClr val="tx1">
+                    <a:lumMod val="85000"/>
+                    <a:lumOff val="15000"/>
+                  </a:schemeClr>
+                </a:solidFill>
+              </a:rPr>
+              <a:t>Permission</a:t>
+            </a:r>
+          </a:p>
+        </p:txBody>
+      </p:sp>
+      <p:sp>
+        <p:nvSpPr>
+          <p:cNvPr id="18" name="Down Arrow 17">
+            <a:extLst>
+              <a:ext uri="{FF2B5EF4-FFF2-40B4-BE49-F238E27FC236}">
+                <a16:creationId xmlns:a16="http://schemas.microsoft.com/office/drawing/2014/main" id="{A8DAD2EC-3E9B-E942-96A2-159C54469EE2}"/>
+              </a:ext>
+            </a:extLst>
+          </p:cNvPr>
+          <p:cNvSpPr/>
+          <p:nvPr/>
+        </p:nvSpPr>
+        <p:spPr>
+          <a:xfrm>
+            <a:off x="2191459" y="3029199"/>
+            <a:ext cx="161365" cy="581892"/>
+          </a:xfrm>
+          <a:prstGeom prst="downArrow">
+            <a:avLst>
+              <a:gd name="adj1" fmla="val 50000"/>
+              <a:gd name="adj2" fmla="val 129998"/>
+            </a:avLst>
+          </a:prstGeom>
+          <a:solidFill>
+            <a:schemeClr val="bg1">
+              <a:lumMod val="95000"/>
+              <a:alpha val="79584"/>
+            </a:schemeClr>
+          </a:solidFill>
+          <a:ln>
+            <a:solidFill>
+              <a:schemeClr val="bg2">
+                <a:lumMod val="50000"/>
+              </a:schemeClr>
+            </a:solidFill>
+          </a:ln>
+        </p:spPr>
+        <p:style>
+          <a:lnRef idx="2">
+            <a:schemeClr val="accent1">
+              <a:shade val="50000"/>
+            </a:schemeClr>
+          </a:lnRef>
+          <a:fillRef idx="1">
+            <a:schemeClr val="accent1"/>
+          </a:fillRef>
+          <a:effectRef idx="0">
+            <a:schemeClr val="accent1"/>
+          </a:effectRef>
+          <a:fontRef idx="minor">
+            <a:schemeClr val="lt1"/>
+          </a:fontRef>
+        </p:style>
+        <p:txBody>
+          <a:bodyPr rtlCol="0" anchor="ctr"/>
+          <a:lstStyle/>
+          <a:p>
+            <a:pPr algn="ctr"/>
+            <a:endParaRPr lang="en-US"/>
+          </a:p>
+        </p:txBody>
+      </p:sp>
+      <p:sp>
+        <p:nvSpPr>
+          <p:cNvPr id="7" name="Rectangle 6">
+            <a:extLst>
+              <a:ext uri="{FF2B5EF4-FFF2-40B4-BE49-F238E27FC236}">
+                <a16:creationId xmlns:a16="http://schemas.microsoft.com/office/drawing/2014/main" id="{084195EB-CEC7-3642-9E4F-07763E9EF4CC}"/>
+              </a:ext>
+            </a:extLst>
+          </p:cNvPr>
+          <p:cNvSpPr/>
+          <p:nvPr/>
+        </p:nvSpPr>
+        <p:spPr>
+          <a:xfrm>
+            <a:off x="1510142" y="4862949"/>
+            <a:ext cx="1524001" cy="665018"/>
+          </a:xfrm>
+          <a:prstGeom prst="rect">
+            <a:avLst/>
+          </a:prstGeom>
+          <a:solidFill>
+            <a:schemeClr val="bg1">
+              <a:lumMod val="95000"/>
+              <a:alpha val="79584"/>
+            </a:schemeClr>
+          </a:solidFill>
+          <a:ln w="38100">
+            <a:solidFill>
+              <a:schemeClr val="bg2">
+                <a:lumMod val="50000"/>
+              </a:schemeClr>
+            </a:solidFill>
+          </a:ln>
+        </p:spPr>
+        <p:style>
+          <a:lnRef idx="2">
+            <a:schemeClr val="accent1">
+              <a:shade val="50000"/>
+            </a:schemeClr>
+          </a:lnRef>
+          <a:fillRef idx="1">
+            <a:schemeClr val="accent1"/>
+          </a:fillRef>
+          <a:effectRef idx="0">
+            <a:schemeClr val="accent1"/>
+          </a:effectRef>
+          <a:fontRef idx="minor">
+            <a:schemeClr val="lt1"/>
+          </a:fontRef>
+        </p:style>
+        <p:txBody>
+          <a:bodyPr rtlCol="0" anchor="ctr"/>
+          <a:lstStyle/>
+          <a:p>
+            <a:pPr algn="ctr"/>
+            <a:r>
+              <a:rPr lang="en-US" sz="2000" dirty="0">
+                <a:solidFill>
+                  <a:schemeClr val="tx1">
+                    <a:lumMod val="85000"/>
+                    <a:lumOff val="15000"/>
+                  </a:schemeClr>
+                </a:solidFill>
+              </a:rPr>
+              <a:t>Capability</a:t>
+            </a:r>
+          </a:p>
+        </p:txBody>
+      </p:sp>
+      <p:sp>
+        <p:nvSpPr>
+          <p:cNvPr id="17" name="Down Arrow 16">
+            <a:extLst>
+              <a:ext uri="{FF2B5EF4-FFF2-40B4-BE49-F238E27FC236}">
+                <a16:creationId xmlns:a16="http://schemas.microsoft.com/office/drawing/2014/main" id="{79138125-78FD-2843-9EDB-DB6D8C3820EA}"/>
+              </a:ext>
+            </a:extLst>
+          </p:cNvPr>
+          <p:cNvSpPr/>
+          <p:nvPr/>
+        </p:nvSpPr>
+        <p:spPr>
+          <a:xfrm>
+            <a:off x="2191458" y="4281057"/>
+            <a:ext cx="161365" cy="581892"/>
+          </a:xfrm>
+          <a:prstGeom prst="downArrow">
+            <a:avLst>
+              <a:gd name="adj1" fmla="val 50000"/>
+              <a:gd name="adj2" fmla="val 129998"/>
+            </a:avLst>
+          </a:prstGeom>
+          <a:solidFill>
+            <a:schemeClr val="bg1">
+              <a:lumMod val="95000"/>
+              <a:alpha val="79584"/>
+            </a:schemeClr>
+          </a:solidFill>
+          <a:ln>
+            <a:solidFill>
+              <a:schemeClr val="bg2">
+                <a:lumMod val="50000"/>
+              </a:schemeClr>
+            </a:solidFill>
+          </a:ln>
+        </p:spPr>
+        <p:style>
+          <a:lnRef idx="2">
+            <a:schemeClr val="accent1">
+              <a:shade val="50000"/>
+            </a:schemeClr>
+          </a:lnRef>
+          <a:fillRef idx="1">
+            <a:schemeClr val="accent1"/>
+          </a:fillRef>
+          <a:effectRef idx="0">
+            <a:schemeClr val="accent1"/>
+          </a:effectRef>
+          <a:fontRef idx="minor">
+            <a:schemeClr val="lt1"/>
+          </a:fontRef>
+        </p:style>
+        <p:txBody>
+          <a:bodyPr rtlCol="0" anchor="ctr"/>
+          <a:lstStyle/>
+          <a:p>
+            <a:pPr algn="ctr"/>
+            <a:endParaRPr lang="en-US"/>
+          </a:p>
+        </p:txBody>
+      </p:sp>
+    </p:spTree>
+    <p:extLst>
+      <p:ext uri="{BB962C8B-B14F-4D97-AF65-F5344CB8AC3E}">
+        <p14:creationId xmlns:p14="http://schemas.microsoft.com/office/powerpoint/2010/main" val="3840253160"/>
+      </p:ext>
+    </p:extLst>
+  </p:cSld>
+  <p:clrMapOvr>
+    <a:masterClrMapping/>
+  </p:clrMapOvr>
+</p:sld>
+</file>
+
+<file path=ppt/slides/slide7.xml><?xml version="1.0" encoding="utf-8"?>
+<p:sld xmlns:a="http://schemas.openxmlformats.org/drawingml/2006/main" xmlns:r="http://schemas.openxmlformats.org/officeDocument/2006/relationships" xmlns:p="http://schemas.openxmlformats.org/presentationml/2006/main">
+  <p:cSld>
+    <p:spTree>
+      <p:nvGrpSpPr>
+        <p:cNvPr id="1" name=""/>
+        <p:cNvGrpSpPr/>
+        <p:nvPr/>
+      </p:nvGrpSpPr>
+      <p:grpSpPr>
+        <a:xfrm>
+          <a:off x="0" y="0"/>
+          <a:ext cx="0" cy="0"/>
+          <a:chOff x="0" y="0"/>
+          <a:chExt cx="0" cy="0"/>
+        </a:xfrm>
+      </p:grpSpPr>
+      <p:sp>
+        <p:nvSpPr>
           <p:cNvPr id="11" name="Rectangle 10">
             <a:extLst>
               <a:ext uri="{FF2B5EF4-FFF2-40B4-BE49-F238E27FC236}">
@@ -6278,7 +6971,7 @@
 </p:sld>
 </file>
 
-<file path=ppt/slides/slide5.xml><?xml version="1.0" encoding="utf-8"?>
+<file path=ppt/slides/slide8.xml><?xml version="1.0" encoding="utf-8"?>
 <p:sld xmlns:a="http://schemas.openxmlformats.org/drawingml/2006/main" xmlns:r="http://schemas.openxmlformats.org/officeDocument/2006/relationships" xmlns:p="http://schemas.openxmlformats.org/presentationml/2006/main">
   <p:cSld>
     <p:spTree>

</xml_diff>

<commit_message>
adding more picture details
</commit_message>
<xml_diff>
--- a/getting-apis-to-work-2021/img/RBAC.pptx
+++ b/getting-apis-to-work-2021/img/RBAC.pptx
@@ -6,13 +6,7 @@
   </p:sldMasterIdLst>
   <p:sldIdLst>
     <p:sldId id="256" r:id="rId2"/>
-    <p:sldId id="257" r:id="rId3"/>
-    <p:sldId id="264" r:id="rId4"/>
-    <p:sldId id="265" r:id="rId5"/>
-    <p:sldId id="266" r:id="rId6"/>
-    <p:sldId id="261" r:id="rId7"/>
-    <p:sldId id="263" r:id="rId8"/>
-    <p:sldId id="262" r:id="rId9"/>
+    <p:sldId id="262" r:id="rId3"/>
   </p:sldIdLst>
   <p:sldSz cx="12192000" cy="6858000"/>
   <p:notesSz cx="6858000" cy="9144000"/>
@@ -3645,10 +3639,10 @@
       </p:grpSpPr>
       <p:sp>
         <p:nvSpPr>
-          <p:cNvPr id="7" name="Rectangle 6">
-            <a:extLst>
-              <a:ext uri="{FF2B5EF4-FFF2-40B4-BE49-F238E27FC236}">
-                <a16:creationId xmlns:a16="http://schemas.microsoft.com/office/drawing/2014/main" id="{084195EB-CEC7-3642-9E4F-07763E9EF4CC}"/>
+          <p:cNvPr id="11" name="Rectangle 10">
+            <a:extLst>
+              <a:ext uri="{FF2B5EF4-FFF2-40B4-BE49-F238E27FC236}">
+                <a16:creationId xmlns:a16="http://schemas.microsoft.com/office/drawing/2014/main" id="{F5DFF4CB-98E1-FF48-A069-97B4154B328B}"/>
               </a:ext>
             </a:extLst>
           </p:cNvPr>
@@ -3657,1189 +3651,7 @@
         </p:nvSpPr>
         <p:spPr>
           <a:xfrm>
-            <a:off x="1510142" y="4862949"/>
-            <a:ext cx="1524001" cy="665018"/>
-          </a:xfrm>
-          <a:prstGeom prst="rect">
-            <a:avLst/>
-          </a:prstGeom>
-          <a:solidFill>
-            <a:schemeClr val="bg1">
-              <a:lumMod val="95000"/>
-            </a:schemeClr>
-          </a:solidFill>
-          <a:ln w="38100">
-            <a:solidFill>
-              <a:schemeClr val="bg2">
-                <a:lumMod val="50000"/>
-                <a:alpha val="80030"/>
-              </a:schemeClr>
-            </a:solidFill>
-          </a:ln>
-        </p:spPr>
-        <p:style>
-          <a:lnRef idx="2">
-            <a:schemeClr val="accent1">
-              <a:shade val="50000"/>
-            </a:schemeClr>
-          </a:lnRef>
-          <a:fillRef idx="1">
-            <a:schemeClr val="accent1"/>
-          </a:fillRef>
-          <a:effectRef idx="0">
-            <a:schemeClr val="accent1"/>
-          </a:effectRef>
-          <a:fontRef idx="minor">
-            <a:schemeClr val="lt1"/>
-          </a:fontRef>
-        </p:style>
-        <p:txBody>
-          <a:bodyPr rtlCol="0" anchor="ctr"/>
-          <a:lstStyle/>
-          <a:p>
-            <a:pPr algn="ctr"/>
-            <a:r>
-              <a:rPr lang="en-US" sz="2000" dirty="0">
-                <a:solidFill>
-                  <a:schemeClr val="tx1">
-                    <a:lumMod val="85000"/>
-                    <a:lumOff val="15000"/>
-                  </a:schemeClr>
-                </a:solidFill>
-              </a:rPr>
-              <a:t>Capability</a:t>
-            </a:r>
-          </a:p>
-        </p:txBody>
-      </p:sp>
-    </p:spTree>
-    <p:extLst>
-      <p:ext uri="{BB962C8B-B14F-4D97-AF65-F5344CB8AC3E}">
-        <p14:creationId xmlns:p14="http://schemas.microsoft.com/office/powerpoint/2010/main" val="1458879343"/>
-      </p:ext>
-    </p:extLst>
-  </p:cSld>
-  <p:clrMapOvr>
-    <a:masterClrMapping/>
-  </p:clrMapOvr>
-</p:sld>
-</file>
-
-<file path=ppt/slides/slide3.xml><?xml version="1.0" encoding="utf-8"?>
-<p:sld xmlns:a="http://schemas.openxmlformats.org/drawingml/2006/main" xmlns:r="http://schemas.openxmlformats.org/officeDocument/2006/relationships" xmlns:p="http://schemas.openxmlformats.org/presentationml/2006/main">
-  <p:cSld>
-    <p:spTree>
-      <p:nvGrpSpPr>
-        <p:cNvPr id="1" name=""/>
-        <p:cNvGrpSpPr/>
-        <p:nvPr/>
-      </p:nvGrpSpPr>
-      <p:grpSpPr>
-        <a:xfrm>
-          <a:off x="0" y="0"/>
-          <a:ext cx="0" cy="0"/>
-          <a:chOff x="0" y="0"/>
-          <a:chExt cx="0" cy="0"/>
-        </a:xfrm>
-      </p:grpSpPr>
-      <p:sp>
-        <p:nvSpPr>
-          <p:cNvPr id="6" name="Rectangle 5">
-            <a:extLst>
-              <a:ext uri="{FF2B5EF4-FFF2-40B4-BE49-F238E27FC236}">
-                <a16:creationId xmlns:a16="http://schemas.microsoft.com/office/drawing/2014/main" id="{292A8187-D086-6241-BD43-8F4A54EACBD1}"/>
-              </a:ext>
-            </a:extLst>
-          </p:cNvPr>
-          <p:cNvSpPr/>
-          <p:nvPr/>
-        </p:nvSpPr>
-        <p:spPr>
-          <a:xfrm>
-            <a:off x="1510142" y="3616039"/>
-            <a:ext cx="1524001" cy="665018"/>
-          </a:xfrm>
-          <a:prstGeom prst="rect">
-            <a:avLst/>
-          </a:prstGeom>
-          <a:solidFill>
-            <a:schemeClr val="bg1">
-              <a:lumMod val="95000"/>
-            </a:schemeClr>
-          </a:solidFill>
-          <a:ln w="38100">
-            <a:solidFill>
-              <a:schemeClr val="bg2">
-                <a:lumMod val="50000"/>
-                <a:alpha val="80030"/>
-              </a:schemeClr>
-            </a:solidFill>
-          </a:ln>
-        </p:spPr>
-        <p:style>
-          <a:lnRef idx="2">
-            <a:schemeClr val="accent1">
-              <a:shade val="50000"/>
-            </a:schemeClr>
-          </a:lnRef>
-          <a:fillRef idx="1">
-            <a:schemeClr val="accent1"/>
-          </a:fillRef>
-          <a:effectRef idx="0">
-            <a:schemeClr val="accent1"/>
-          </a:effectRef>
-          <a:fontRef idx="minor">
-            <a:schemeClr val="lt1"/>
-          </a:fontRef>
-        </p:style>
-        <p:txBody>
-          <a:bodyPr rtlCol="0" anchor="ctr"/>
-          <a:lstStyle/>
-          <a:p>
-            <a:pPr algn="ctr"/>
-            <a:r>
-              <a:rPr lang="en-US" sz="2000" dirty="0">
-                <a:solidFill>
-                  <a:schemeClr val="tx1">
-                    <a:lumMod val="85000"/>
-                    <a:lumOff val="15000"/>
-                  </a:schemeClr>
-                </a:solidFill>
-              </a:rPr>
-              <a:t>Permission</a:t>
-            </a:r>
-          </a:p>
-        </p:txBody>
-      </p:sp>
-      <p:sp>
-        <p:nvSpPr>
-          <p:cNvPr id="7" name="Rectangle 6">
-            <a:extLst>
-              <a:ext uri="{FF2B5EF4-FFF2-40B4-BE49-F238E27FC236}">
-                <a16:creationId xmlns:a16="http://schemas.microsoft.com/office/drawing/2014/main" id="{084195EB-CEC7-3642-9E4F-07763E9EF4CC}"/>
-              </a:ext>
-            </a:extLst>
-          </p:cNvPr>
-          <p:cNvSpPr/>
-          <p:nvPr/>
-        </p:nvSpPr>
-        <p:spPr>
-          <a:xfrm>
-            <a:off x="1510142" y="4862949"/>
-            <a:ext cx="1524001" cy="665018"/>
-          </a:xfrm>
-          <a:prstGeom prst="rect">
-            <a:avLst/>
-          </a:prstGeom>
-          <a:solidFill>
-            <a:schemeClr val="bg1">
-              <a:lumMod val="95000"/>
-            </a:schemeClr>
-          </a:solidFill>
-          <a:ln w="38100">
-            <a:solidFill>
-              <a:schemeClr val="bg2">
-                <a:lumMod val="50000"/>
-                <a:alpha val="80030"/>
-              </a:schemeClr>
-            </a:solidFill>
-          </a:ln>
-        </p:spPr>
-        <p:style>
-          <a:lnRef idx="2">
-            <a:schemeClr val="accent1">
-              <a:shade val="50000"/>
-            </a:schemeClr>
-          </a:lnRef>
-          <a:fillRef idx="1">
-            <a:schemeClr val="accent1"/>
-          </a:fillRef>
-          <a:effectRef idx="0">
-            <a:schemeClr val="accent1"/>
-          </a:effectRef>
-          <a:fontRef idx="minor">
-            <a:schemeClr val="lt1"/>
-          </a:fontRef>
-        </p:style>
-        <p:txBody>
-          <a:bodyPr rtlCol="0" anchor="ctr"/>
-          <a:lstStyle/>
-          <a:p>
-            <a:pPr algn="ctr"/>
-            <a:r>
-              <a:rPr lang="en-US" sz="2000" dirty="0">
-                <a:solidFill>
-                  <a:schemeClr val="tx1">
-                    <a:lumMod val="85000"/>
-                    <a:lumOff val="15000"/>
-                  </a:schemeClr>
-                </a:solidFill>
-              </a:rPr>
-              <a:t>Capability</a:t>
-            </a:r>
-          </a:p>
-        </p:txBody>
-      </p:sp>
-      <p:sp>
-        <p:nvSpPr>
-          <p:cNvPr id="17" name="Down Arrow 16">
-            <a:extLst>
-              <a:ext uri="{FF2B5EF4-FFF2-40B4-BE49-F238E27FC236}">
-                <a16:creationId xmlns:a16="http://schemas.microsoft.com/office/drawing/2014/main" id="{79138125-78FD-2843-9EDB-DB6D8C3820EA}"/>
-              </a:ext>
-            </a:extLst>
-          </p:cNvPr>
-          <p:cNvSpPr/>
-          <p:nvPr/>
-        </p:nvSpPr>
-        <p:spPr>
-          <a:xfrm>
-            <a:off x="2191458" y="4281057"/>
-            <a:ext cx="161365" cy="581892"/>
-          </a:xfrm>
-          <a:prstGeom prst="downArrow">
-            <a:avLst>
-              <a:gd name="adj1" fmla="val 50000"/>
-              <a:gd name="adj2" fmla="val 129998"/>
-            </a:avLst>
-          </a:prstGeom>
-          <a:solidFill>
-            <a:schemeClr val="bg1">
-              <a:lumMod val="95000"/>
-            </a:schemeClr>
-          </a:solidFill>
-          <a:ln>
-            <a:solidFill>
-              <a:schemeClr val="bg2">
-                <a:lumMod val="50000"/>
-                <a:alpha val="80030"/>
-              </a:schemeClr>
-            </a:solidFill>
-          </a:ln>
-        </p:spPr>
-        <p:style>
-          <a:lnRef idx="2">
-            <a:schemeClr val="accent1">
-              <a:shade val="50000"/>
-            </a:schemeClr>
-          </a:lnRef>
-          <a:fillRef idx="1">
-            <a:schemeClr val="accent1"/>
-          </a:fillRef>
-          <a:effectRef idx="0">
-            <a:schemeClr val="accent1"/>
-          </a:effectRef>
-          <a:fontRef idx="minor">
-            <a:schemeClr val="lt1"/>
-          </a:fontRef>
-        </p:style>
-        <p:txBody>
-          <a:bodyPr rtlCol="0" anchor="ctr"/>
-          <a:lstStyle/>
-          <a:p>
-            <a:pPr algn="ctr"/>
-            <a:endParaRPr lang="en-US"/>
-          </a:p>
-        </p:txBody>
-      </p:sp>
-    </p:spTree>
-    <p:extLst>
-      <p:ext uri="{BB962C8B-B14F-4D97-AF65-F5344CB8AC3E}">
-        <p14:creationId xmlns:p14="http://schemas.microsoft.com/office/powerpoint/2010/main" val="674908156"/>
-      </p:ext>
-    </p:extLst>
-  </p:cSld>
-  <p:clrMapOvr>
-    <a:masterClrMapping/>
-  </p:clrMapOvr>
-</p:sld>
-</file>
-
-<file path=ppt/slides/slide4.xml><?xml version="1.0" encoding="utf-8"?>
-<p:sld xmlns:a="http://schemas.openxmlformats.org/drawingml/2006/main" xmlns:r="http://schemas.openxmlformats.org/officeDocument/2006/relationships" xmlns:p="http://schemas.openxmlformats.org/presentationml/2006/main">
-  <p:cSld>
-    <p:spTree>
-      <p:nvGrpSpPr>
-        <p:cNvPr id="1" name=""/>
-        <p:cNvGrpSpPr/>
-        <p:nvPr/>
-      </p:nvGrpSpPr>
-      <p:grpSpPr>
-        <a:xfrm>
-          <a:off x="0" y="0"/>
-          <a:ext cx="0" cy="0"/>
-          <a:chOff x="0" y="0"/>
-          <a:chExt cx="0" cy="0"/>
-        </a:xfrm>
-      </p:grpSpPr>
-      <p:sp>
-        <p:nvSpPr>
-          <p:cNvPr id="5" name="Rectangle 4">
-            <a:extLst>
-              <a:ext uri="{FF2B5EF4-FFF2-40B4-BE49-F238E27FC236}">
-                <a16:creationId xmlns:a16="http://schemas.microsoft.com/office/drawing/2014/main" id="{D1CCEEB6-0FB9-4C4E-A7F2-C6729B9FC8EA}"/>
-              </a:ext>
-            </a:extLst>
-          </p:cNvPr>
-          <p:cNvSpPr/>
-          <p:nvPr/>
-        </p:nvSpPr>
-        <p:spPr>
-          <a:xfrm>
-            <a:off x="1510145" y="2369129"/>
-            <a:ext cx="1524001" cy="665018"/>
-          </a:xfrm>
-          <a:prstGeom prst="rect">
-            <a:avLst/>
-          </a:prstGeom>
-          <a:solidFill>
-            <a:schemeClr val="bg1">
-              <a:lumMod val="95000"/>
-            </a:schemeClr>
-          </a:solidFill>
-          <a:ln w="38100">
-            <a:solidFill>
-              <a:schemeClr val="bg2">
-                <a:lumMod val="50000"/>
-                <a:alpha val="80030"/>
-              </a:schemeClr>
-            </a:solidFill>
-          </a:ln>
-        </p:spPr>
-        <p:style>
-          <a:lnRef idx="2">
-            <a:schemeClr val="accent1">
-              <a:shade val="50000"/>
-            </a:schemeClr>
-          </a:lnRef>
-          <a:fillRef idx="1">
-            <a:schemeClr val="accent1"/>
-          </a:fillRef>
-          <a:effectRef idx="0">
-            <a:schemeClr val="accent1"/>
-          </a:effectRef>
-          <a:fontRef idx="minor">
-            <a:schemeClr val="lt1"/>
-          </a:fontRef>
-        </p:style>
-        <p:txBody>
-          <a:bodyPr rtlCol="0" anchor="ctr"/>
-          <a:lstStyle/>
-          <a:p>
-            <a:pPr algn="ctr"/>
-            <a:r>
-              <a:rPr lang="en-US" sz="2000" dirty="0">
-                <a:solidFill>
-                  <a:schemeClr val="tx1">
-                    <a:lumMod val="85000"/>
-                    <a:lumOff val="15000"/>
-                  </a:schemeClr>
-                </a:solidFill>
-              </a:rPr>
-              <a:t>Role</a:t>
-            </a:r>
-          </a:p>
-        </p:txBody>
-      </p:sp>
-      <p:sp>
-        <p:nvSpPr>
-          <p:cNvPr id="6" name="Rectangle 5">
-            <a:extLst>
-              <a:ext uri="{FF2B5EF4-FFF2-40B4-BE49-F238E27FC236}">
-                <a16:creationId xmlns:a16="http://schemas.microsoft.com/office/drawing/2014/main" id="{292A8187-D086-6241-BD43-8F4A54EACBD1}"/>
-              </a:ext>
-            </a:extLst>
-          </p:cNvPr>
-          <p:cNvSpPr/>
-          <p:nvPr/>
-        </p:nvSpPr>
-        <p:spPr>
-          <a:xfrm>
-            <a:off x="1510142" y="3616039"/>
-            <a:ext cx="1524001" cy="665018"/>
-          </a:xfrm>
-          <a:prstGeom prst="rect">
-            <a:avLst/>
-          </a:prstGeom>
-          <a:solidFill>
-            <a:schemeClr val="bg1">
-              <a:lumMod val="95000"/>
-            </a:schemeClr>
-          </a:solidFill>
-          <a:ln w="38100">
-            <a:solidFill>
-              <a:schemeClr val="bg2">
-                <a:lumMod val="50000"/>
-                <a:alpha val="80030"/>
-              </a:schemeClr>
-            </a:solidFill>
-          </a:ln>
-        </p:spPr>
-        <p:style>
-          <a:lnRef idx="2">
-            <a:schemeClr val="accent1">
-              <a:shade val="50000"/>
-            </a:schemeClr>
-          </a:lnRef>
-          <a:fillRef idx="1">
-            <a:schemeClr val="accent1"/>
-          </a:fillRef>
-          <a:effectRef idx="0">
-            <a:schemeClr val="accent1"/>
-          </a:effectRef>
-          <a:fontRef idx="minor">
-            <a:schemeClr val="lt1"/>
-          </a:fontRef>
-        </p:style>
-        <p:txBody>
-          <a:bodyPr rtlCol="0" anchor="ctr"/>
-          <a:lstStyle/>
-          <a:p>
-            <a:pPr algn="ctr"/>
-            <a:r>
-              <a:rPr lang="en-US" sz="2000" dirty="0">
-                <a:solidFill>
-                  <a:schemeClr val="tx1">
-                    <a:lumMod val="85000"/>
-                    <a:lumOff val="15000"/>
-                  </a:schemeClr>
-                </a:solidFill>
-              </a:rPr>
-              <a:t>Permission</a:t>
-            </a:r>
-          </a:p>
-        </p:txBody>
-      </p:sp>
-      <p:sp>
-        <p:nvSpPr>
-          <p:cNvPr id="7" name="Rectangle 6">
-            <a:extLst>
-              <a:ext uri="{FF2B5EF4-FFF2-40B4-BE49-F238E27FC236}">
-                <a16:creationId xmlns:a16="http://schemas.microsoft.com/office/drawing/2014/main" id="{084195EB-CEC7-3642-9E4F-07763E9EF4CC}"/>
-              </a:ext>
-            </a:extLst>
-          </p:cNvPr>
-          <p:cNvSpPr/>
-          <p:nvPr/>
-        </p:nvSpPr>
-        <p:spPr>
-          <a:xfrm>
-            <a:off x="1510142" y="4862949"/>
-            <a:ext cx="1524001" cy="665018"/>
-          </a:xfrm>
-          <a:prstGeom prst="rect">
-            <a:avLst/>
-          </a:prstGeom>
-          <a:solidFill>
-            <a:schemeClr val="bg1">
-              <a:lumMod val="95000"/>
-            </a:schemeClr>
-          </a:solidFill>
-          <a:ln w="38100">
-            <a:solidFill>
-              <a:schemeClr val="bg2">
-                <a:lumMod val="50000"/>
-                <a:alpha val="80030"/>
-              </a:schemeClr>
-            </a:solidFill>
-          </a:ln>
-        </p:spPr>
-        <p:style>
-          <a:lnRef idx="2">
-            <a:schemeClr val="accent1">
-              <a:shade val="50000"/>
-            </a:schemeClr>
-          </a:lnRef>
-          <a:fillRef idx="1">
-            <a:schemeClr val="accent1"/>
-          </a:fillRef>
-          <a:effectRef idx="0">
-            <a:schemeClr val="accent1"/>
-          </a:effectRef>
-          <a:fontRef idx="minor">
-            <a:schemeClr val="lt1"/>
-          </a:fontRef>
-        </p:style>
-        <p:txBody>
-          <a:bodyPr rtlCol="0" anchor="ctr"/>
-          <a:lstStyle/>
-          <a:p>
-            <a:pPr algn="ctr"/>
-            <a:r>
-              <a:rPr lang="en-US" sz="2000" dirty="0">
-                <a:solidFill>
-                  <a:schemeClr val="tx1">
-                    <a:lumMod val="85000"/>
-                    <a:lumOff val="15000"/>
-                  </a:schemeClr>
-                </a:solidFill>
-              </a:rPr>
-              <a:t>Capability</a:t>
-            </a:r>
-          </a:p>
-        </p:txBody>
-      </p:sp>
-      <p:sp>
-        <p:nvSpPr>
-          <p:cNvPr id="17" name="Down Arrow 16">
-            <a:extLst>
-              <a:ext uri="{FF2B5EF4-FFF2-40B4-BE49-F238E27FC236}">
-                <a16:creationId xmlns:a16="http://schemas.microsoft.com/office/drawing/2014/main" id="{79138125-78FD-2843-9EDB-DB6D8C3820EA}"/>
-              </a:ext>
-            </a:extLst>
-          </p:cNvPr>
-          <p:cNvSpPr/>
-          <p:nvPr/>
-        </p:nvSpPr>
-        <p:spPr>
-          <a:xfrm>
-            <a:off x="2191458" y="4281057"/>
-            <a:ext cx="161365" cy="581892"/>
-          </a:xfrm>
-          <a:prstGeom prst="downArrow">
-            <a:avLst>
-              <a:gd name="adj1" fmla="val 50000"/>
-              <a:gd name="adj2" fmla="val 129998"/>
-            </a:avLst>
-          </a:prstGeom>
-          <a:solidFill>
-            <a:schemeClr val="bg1">
-              <a:lumMod val="95000"/>
-            </a:schemeClr>
-          </a:solidFill>
-          <a:ln>
-            <a:solidFill>
-              <a:schemeClr val="bg2">
-                <a:lumMod val="50000"/>
-                <a:alpha val="80030"/>
-              </a:schemeClr>
-            </a:solidFill>
-          </a:ln>
-        </p:spPr>
-        <p:style>
-          <a:lnRef idx="2">
-            <a:schemeClr val="accent1">
-              <a:shade val="50000"/>
-            </a:schemeClr>
-          </a:lnRef>
-          <a:fillRef idx="1">
-            <a:schemeClr val="accent1"/>
-          </a:fillRef>
-          <a:effectRef idx="0">
-            <a:schemeClr val="accent1"/>
-          </a:effectRef>
-          <a:fontRef idx="minor">
-            <a:schemeClr val="lt1"/>
-          </a:fontRef>
-        </p:style>
-        <p:txBody>
-          <a:bodyPr rtlCol="0" anchor="ctr"/>
-          <a:lstStyle/>
-          <a:p>
-            <a:pPr algn="ctr"/>
-            <a:endParaRPr lang="en-US"/>
-          </a:p>
-        </p:txBody>
-      </p:sp>
-      <p:sp>
-        <p:nvSpPr>
-          <p:cNvPr id="18" name="Down Arrow 17">
-            <a:extLst>
-              <a:ext uri="{FF2B5EF4-FFF2-40B4-BE49-F238E27FC236}">
-                <a16:creationId xmlns:a16="http://schemas.microsoft.com/office/drawing/2014/main" id="{A8DAD2EC-3E9B-E942-96A2-159C54469EE2}"/>
-              </a:ext>
-            </a:extLst>
-          </p:cNvPr>
-          <p:cNvSpPr/>
-          <p:nvPr/>
-        </p:nvSpPr>
-        <p:spPr>
-          <a:xfrm>
-            <a:off x="2191459" y="3029199"/>
-            <a:ext cx="161365" cy="581892"/>
-          </a:xfrm>
-          <a:prstGeom prst="downArrow">
-            <a:avLst>
-              <a:gd name="adj1" fmla="val 50000"/>
-              <a:gd name="adj2" fmla="val 129998"/>
-            </a:avLst>
-          </a:prstGeom>
-          <a:solidFill>
-            <a:schemeClr val="bg1">
-              <a:lumMod val="95000"/>
-            </a:schemeClr>
-          </a:solidFill>
-          <a:ln>
-            <a:solidFill>
-              <a:schemeClr val="bg2">
-                <a:lumMod val="50000"/>
-                <a:alpha val="80030"/>
-              </a:schemeClr>
-            </a:solidFill>
-          </a:ln>
-        </p:spPr>
-        <p:style>
-          <a:lnRef idx="2">
-            <a:schemeClr val="accent1">
-              <a:shade val="50000"/>
-            </a:schemeClr>
-          </a:lnRef>
-          <a:fillRef idx="1">
-            <a:schemeClr val="accent1"/>
-          </a:fillRef>
-          <a:effectRef idx="0">
-            <a:schemeClr val="accent1"/>
-          </a:effectRef>
-          <a:fontRef idx="minor">
-            <a:schemeClr val="lt1"/>
-          </a:fontRef>
-        </p:style>
-        <p:txBody>
-          <a:bodyPr rtlCol="0" anchor="ctr"/>
-          <a:lstStyle/>
-          <a:p>
-            <a:pPr algn="ctr"/>
-            <a:endParaRPr lang="en-US"/>
-          </a:p>
-        </p:txBody>
-      </p:sp>
-    </p:spTree>
-    <p:extLst>
-      <p:ext uri="{BB962C8B-B14F-4D97-AF65-F5344CB8AC3E}">
-        <p14:creationId xmlns:p14="http://schemas.microsoft.com/office/powerpoint/2010/main" val="2002102711"/>
-      </p:ext>
-    </p:extLst>
-  </p:cSld>
-  <p:clrMapOvr>
-    <a:masterClrMapping/>
-  </p:clrMapOvr>
-</p:sld>
-</file>
-
-<file path=ppt/slides/slide5.xml><?xml version="1.0" encoding="utf-8"?>
-<p:sld xmlns:a="http://schemas.openxmlformats.org/drawingml/2006/main" xmlns:r="http://schemas.openxmlformats.org/officeDocument/2006/relationships" xmlns:p="http://schemas.openxmlformats.org/presentationml/2006/main">
-  <p:cSld>
-    <p:spTree>
-      <p:nvGrpSpPr>
-        <p:cNvPr id="1" name=""/>
-        <p:cNvGrpSpPr/>
-        <p:nvPr/>
-      </p:nvGrpSpPr>
-      <p:grpSpPr>
-        <a:xfrm>
-          <a:off x="0" y="0"/>
-          <a:ext cx="0" cy="0"/>
-          <a:chOff x="0" y="0"/>
-          <a:chExt cx="0" cy="0"/>
-        </a:xfrm>
-      </p:grpSpPr>
-      <p:sp>
-        <p:nvSpPr>
-          <p:cNvPr id="2" name="Rectangle 1">
-            <a:extLst>
-              <a:ext uri="{FF2B5EF4-FFF2-40B4-BE49-F238E27FC236}">
-                <a16:creationId xmlns:a16="http://schemas.microsoft.com/office/drawing/2014/main" id="{9B7387F5-ACA9-7141-97D3-A62F3221BA74}"/>
-              </a:ext>
-            </a:extLst>
-          </p:cNvPr>
-          <p:cNvSpPr/>
-          <p:nvPr/>
-        </p:nvSpPr>
-        <p:spPr>
-          <a:xfrm>
-            <a:off x="1510145" y="1122219"/>
-            <a:ext cx="1524001" cy="665018"/>
-          </a:xfrm>
-          <a:prstGeom prst="rect">
-            <a:avLst/>
-          </a:prstGeom>
-          <a:solidFill>
-            <a:schemeClr val="bg1">
-              <a:lumMod val="95000"/>
-            </a:schemeClr>
-          </a:solidFill>
-          <a:ln w="38100">
-            <a:solidFill>
-              <a:schemeClr val="bg2">
-                <a:lumMod val="50000"/>
-                <a:alpha val="80030"/>
-              </a:schemeClr>
-            </a:solidFill>
-          </a:ln>
-        </p:spPr>
-        <p:style>
-          <a:lnRef idx="2">
-            <a:schemeClr val="accent1">
-              <a:shade val="50000"/>
-            </a:schemeClr>
-          </a:lnRef>
-          <a:fillRef idx="1">
-            <a:schemeClr val="accent1"/>
-          </a:fillRef>
-          <a:effectRef idx="0">
-            <a:schemeClr val="accent1"/>
-          </a:effectRef>
-          <a:fontRef idx="minor">
-            <a:schemeClr val="lt1"/>
-          </a:fontRef>
-        </p:style>
-        <p:txBody>
-          <a:bodyPr rtlCol="0" anchor="ctr"/>
-          <a:lstStyle/>
-          <a:p>
-            <a:pPr algn="ctr"/>
-            <a:r>
-              <a:rPr lang="en-US" sz="2000" dirty="0">
-                <a:solidFill>
-                  <a:schemeClr val="tx1">
-                    <a:lumMod val="85000"/>
-                    <a:lumOff val="15000"/>
-                  </a:schemeClr>
-                </a:solidFill>
-              </a:rPr>
-              <a:t>User</a:t>
-            </a:r>
-          </a:p>
-        </p:txBody>
-      </p:sp>
-      <p:sp>
-        <p:nvSpPr>
-          <p:cNvPr id="5" name="Rectangle 4">
-            <a:extLst>
-              <a:ext uri="{FF2B5EF4-FFF2-40B4-BE49-F238E27FC236}">
-                <a16:creationId xmlns:a16="http://schemas.microsoft.com/office/drawing/2014/main" id="{D1CCEEB6-0FB9-4C4E-A7F2-C6729B9FC8EA}"/>
-              </a:ext>
-            </a:extLst>
-          </p:cNvPr>
-          <p:cNvSpPr/>
-          <p:nvPr/>
-        </p:nvSpPr>
-        <p:spPr>
-          <a:xfrm>
-            <a:off x="1510145" y="2369129"/>
-            <a:ext cx="1524001" cy="665018"/>
-          </a:xfrm>
-          <a:prstGeom prst="rect">
-            <a:avLst/>
-          </a:prstGeom>
-          <a:solidFill>
-            <a:schemeClr val="bg1">
-              <a:lumMod val="95000"/>
-            </a:schemeClr>
-          </a:solidFill>
-          <a:ln w="38100">
-            <a:solidFill>
-              <a:schemeClr val="bg2">
-                <a:lumMod val="50000"/>
-                <a:alpha val="80030"/>
-              </a:schemeClr>
-            </a:solidFill>
-          </a:ln>
-        </p:spPr>
-        <p:style>
-          <a:lnRef idx="2">
-            <a:schemeClr val="accent1">
-              <a:shade val="50000"/>
-            </a:schemeClr>
-          </a:lnRef>
-          <a:fillRef idx="1">
-            <a:schemeClr val="accent1"/>
-          </a:fillRef>
-          <a:effectRef idx="0">
-            <a:schemeClr val="accent1"/>
-          </a:effectRef>
-          <a:fontRef idx="minor">
-            <a:schemeClr val="lt1"/>
-          </a:fontRef>
-        </p:style>
-        <p:txBody>
-          <a:bodyPr rtlCol="0" anchor="ctr"/>
-          <a:lstStyle/>
-          <a:p>
-            <a:pPr algn="ctr"/>
-            <a:r>
-              <a:rPr lang="en-US" sz="2000" dirty="0">
-                <a:solidFill>
-                  <a:schemeClr val="tx1">
-                    <a:lumMod val="85000"/>
-                    <a:lumOff val="15000"/>
-                  </a:schemeClr>
-                </a:solidFill>
-              </a:rPr>
-              <a:t>Role</a:t>
-            </a:r>
-          </a:p>
-        </p:txBody>
-      </p:sp>
-      <p:sp>
-        <p:nvSpPr>
-          <p:cNvPr id="6" name="Rectangle 5">
-            <a:extLst>
-              <a:ext uri="{FF2B5EF4-FFF2-40B4-BE49-F238E27FC236}">
-                <a16:creationId xmlns:a16="http://schemas.microsoft.com/office/drawing/2014/main" id="{292A8187-D086-6241-BD43-8F4A54EACBD1}"/>
-              </a:ext>
-            </a:extLst>
-          </p:cNvPr>
-          <p:cNvSpPr/>
-          <p:nvPr/>
-        </p:nvSpPr>
-        <p:spPr>
-          <a:xfrm>
-            <a:off x="1510142" y="3616039"/>
-            <a:ext cx="1524001" cy="665018"/>
-          </a:xfrm>
-          <a:prstGeom prst="rect">
-            <a:avLst/>
-          </a:prstGeom>
-          <a:solidFill>
-            <a:schemeClr val="bg1">
-              <a:lumMod val="95000"/>
-            </a:schemeClr>
-          </a:solidFill>
-          <a:ln w="38100">
-            <a:solidFill>
-              <a:schemeClr val="bg2">
-                <a:lumMod val="50000"/>
-                <a:alpha val="80030"/>
-              </a:schemeClr>
-            </a:solidFill>
-          </a:ln>
-        </p:spPr>
-        <p:style>
-          <a:lnRef idx="2">
-            <a:schemeClr val="accent1">
-              <a:shade val="50000"/>
-            </a:schemeClr>
-          </a:lnRef>
-          <a:fillRef idx="1">
-            <a:schemeClr val="accent1"/>
-          </a:fillRef>
-          <a:effectRef idx="0">
-            <a:schemeClr val="accent1"/>
-          </a:effectRef>
-          <a:fontRef idx="minor">
-            <a:schemeClr val="lt1"/>
-          </a:fontRef>
-        </p:style>
-        <p:txBody>
-          <a:bodyPr rtlCol="0" anchor="ctr"/>
-          <a:lstStyle/>
-          <a:p>
-            <a:pPr algn="ctr"/>
-            <a:r>
-              <a:rPr lang="en-US" sz="2000" dirty="0">
-                <a:solidFill>
-                  <a:schemeClr val="tx1">
-                    <a:lumMod val="85000"/>
-                    <a:lumOff val="15000"/>
-                  </a:schemeClr>
-                </a:solidFill>
-              </a:rPr>
-              <a:t>Permission</a:t>
-            </a:r>
-          </a:p>
-        </p:txBody>
-      </p:sp>
-      <p:sp>
-        <p:nvSpPr>
-          <p:cNvPr id="7" name="Rectangle 6">
-            <a:extLst>
-              <a:ext uri="{FF2B5EF4-FFF2-40B4-BE49-F238E27FC236}">
-                <a16:creationId xmlns:a16="http://schemas.microsoft.com/office/drawing/2014/main" id="{084195EB-CEC7-3642-9E4F-07763E9EF4CC}"/>
-              </a:ext>
-            </a:extLst>
-          </p:cNvPr>
-          <p:cNvSpPr/>
-          <p:nvPr/>
-        </p:nvSpPr>
-        <p:spPr>
-          <a:xfrm>
-            <a:off x="1510142" y="4862949"/>
-            <a:ext cx="1524001" cy="665018"/>
-          </a:xfrm>
-          <a:prstGeom prst="rect">
-            <a:avLst/>
-          </a:prstGeom>
-          <a:solidFill>
-            <a:schemeClr val="bg1">
-              <a:lumMod val="95000"/>
-            </a:schemeClr>
-          </a:solidFill>
-          <a:ln w="38100">
-            <a:solidFill>
-              <a:schemeClr val="bg2">
-                <a:lumMod val="50000"/>
-                <a:alpha val="80030"/>
-              </a:schemeClr>
-            </a:solidFill>
-          </a:ln>
-        </p:spPr>
-        <p:style>
-          <a:lnRef idx="2">
-            <a:schemeClr val="accent1">
-              <a:shade val="50000"/>
-            </a:schemeClr>
-          </a:lnRef>
-          <a:fillRef idx="1">
-            <a:schemeClr val="accent1"/>
-          </a:fillRef>
-          <a:effectRef idx="0">
-            <a:schemeClr val="accent1"/>
-          </a:effectRef>
-          <a:fontRef idx="minor">
-            <a:schemeClr val="lt1"/>
-          </a:fontRef>
-        </p:style>
-        <p:txBody>
-          <a:bodyPr rtlCol="0" anchor="ctr"/>
-          <a:lstStyle/>
-          <a:p>
-            <a:pPr algn="ctr"/>
-            <a:r>
-              <a:rPr lang="en-US" sz="2000" dirty="0">
-                <a:solidFill>
-                  <a:schemeClr val="tx1">
-                    <a:lumMod val="85000"/>
-                    <a:lumOff val="15000"/>
-                  </a:schemeClr>
-                </a:solidFill>
-              </a:rPr>
-              <a:t>Capability</a:t>
-            </a:r>
-          </a:p>
-        </p:txBody>
-      </p:sp>
-      <p:sp>
-        <p:nvSpPr>
-          <p:cNvPr id="15" name="Down Arrow 14">
-            <a:extLst>
-              <a:ext uri="{FF2B5EF4-FFF2-40B4-BE49-F238E27FC236}">
-                <a16:creationId xmlns:a16="http://schemas.microsoft.com/office/drawing/2014/main" id="{03FE2F9B-D768-9846-AF7E-C97F162AF435}"/>
-              </a:ext>
-            </a:extLst>
-          </p:cNvPr>
-          <p:cNvSpPr/>
-          <p:nvPr/>
-        </p:nvSpPr>
-        <p:spPr>
-          <a:xfrm>
-            <a:off x="2191459" y="1787237"/>
-            <a:ext cx="161365" cy="581892"/>
-          </a:xfrm>
-          <a:prstGeom prst="downArrow">
-            <a:avLst>
-              <a:gd name="adj1" fmla="val 50000"/>
-              <a:gd name="adj2" fmla="val 129998"/>
-            </a:avLst>
-          </a:prstGeom>
-          <a:solidFill>
-            <a:schemeClr val="bg1">
-              <a:lumMod val="95000"/>
-            </a:schemeClr>
-          </a:solidFill>
-          <a:ln>
-            <a:solidFill>
-              <a:schemeClr val="bg2">
-                <a:lumMod val="50000"/>
-                <a:alpha val="80030"/>
-              </a:schemeClr>
-            </a:solidFill>
-          </a:ln>
-        </p:spPr>
-        <p:style>
-          <a:lnRef idx="2">
-            <a:schemeClr val="accent1">
-              <a:shade val="50000"/>
-            </a:schemeClr>
-          </a:lnRef>
-          <a:fillRef idx="1">
-            <a:schemeClr val="accent1"/>
-          </a:fillRef>
-          <a:effectRef idx="0">
-            <a:schemeClr val="accent1"/>
-          </a:effectRef>
-          <a:fontRef idx="minor">
-            <a:schemeClr val="lt1"/>
-          </a:fontRef>
-        </p:style>
-        <p:txBody>
-          <a:bodyPr rtlCol="0" anchor="ctr"/>
-          <a:lstStyle/>
-          <a:p>
-            <a:pPr algn="ctr"/>
-            <a:endParaRPr lang="en-US"/>
-          </a:p>
-        </p:txBody>
-      </p:sp>
-      <p:sp>
-        <p:nvSpPr>
-          <p:cNvPr id="17" name="Down Arrow 16">
-            <a:extLst>
-              <a:ext uri="{FF2B5EF4-FFF2-40B4-BE49-F238E27FC236}">
-                <a16:creationId xmlns:a16="http://schemas.microsoft.com/office/drawing/2014/main" id="{79138125-78FD-2843-9EDB-DB6D8C3820EA}"/>
-              </a:ext>
-            </a:extLst>
-          </p:cNvPr>
-          <p:cNvSpPr/>
-          <p:nvPr/>
-        </p:nvSpPr>
-        <p:spPr>
-          <a:xfrm>
-            <a:off x="2191458" y="4281057"/>
-            <a:ext cx="161365" cy="581892"/>
-          </a:xfrm>
-          <a:prstGeom prst="downArrow">
-            <a:avLst>
-              <a:gd name="adj1" fmla="val 50000"/>
-              <a:gd name="adj2" fmla="val 129998"/>
-            </a:avLst>
-          </a:prstGeom>
-          <a:solidFill>
-            <a:schemeClr val="bg1">
-              <a:lumMod val="95000"/>
-            </a:schemeClr>
-          </a:solidFill>
-          <a:ln>
-            <a:solidFill>
-              <a:schemeClr val="bg2">
-                <a:lumMod val="50000"/>
-                <a:alpha val="80030"/>
-              </a:schemeClr>
-            </a:solidFill>
-          </a:ln>
-        </p:spPr>
-        <p:style>
-          <a:lnRef idx="2">
-            <a:schemeClr val="accent1">
-              <a:shade val="50000"/>
-            </a:schemeClr>
-          </a:lnRef>
-          <a:fillRef idx="1">
-            <a:schemeClr val="accent1"/>
-          </a:fillRef>
-          <a:effectRef idx="0">
-            <a:schemeClr val="accent1"/>
-          </a:effectRef>
-          <a:fontRef idx="minor">
-            <a:schemeClr val="lt1"/>
-          </a:fontRef>
-        </p:style>
-        <p:txBody>
-          <a:bodyPr rtlCol="0" anchor="ctr"/>
-          <a:lstStyle/>
-          <a:p>
-            <a:pPr algn="ctr"/>
-            <a:endParaRPr lang="en-US"/>
-          </a:p>
-        </p:txBody>
-      </p:sp>
-      <p:sp>
-        <p:nvSpPr>
-          <p:cNvPr id="18" name="Down Arrow 17">
-            <a:extLst>
-              <a:ext uri="{FF2B5EF4-FFF2-40B4-BE49-F238E27FC236}">
-                <a16:creationId xmlns:a16="http://schemas.microsoft.com/office/drawing/2014/main" id="{A8DAD2EC-3E9B-E942-96A2-159C54469EE2}"/>
-              </a:ext>
-            </a:extLst>
-          </p:cNvPr>
-          <p:cNvSpPr/>
-          <p:nvPr/>
-        </p:nvSpPr>
-        <p:spPr>
-          <a:xfrm>
-            <a:off x="2191459" y="3029199"/>
-            <a:ext cx="161365" cy="581892"/>
-          </a:xfrm>
-          <a:prstGeom prst="downArrow">
-            <a:avLst>
-              <a:gd name="adj1" fmla="val 50000"/>
-              <a:gd name="adj2" fmla="val 129998"/>
-            </a:avLst>
-          </a:prstGeom>
-          <a:solidFill>
-            <a:schemeClr val="bg1">
-              <a:lumMod val="95000"/>
-            </a:schemeClr>
-          </a:solidFill>
-          <a:ln>
-            <a:solidFill>
-              <a:schemeClr val="bg2">
-                <a:lumMod val="50000"/>
-                <a:alpha val="80030"/>
-              </a:schemeClr>
-            </a:solidFill>
-          </a:ln>
-        </p:spPr>
-        <p:style>
-          <a:lnRef idx="2">
-            <a:schemeClr val="accent1">
-              <a:shade val="50000"/>
-            </a:schemeClr>
-          </a:lnRef>
-          <a:fillRef idx="1">
-            <a:schemeClr val="accent1"/>
-          </a:fillRef>
-          <a:effectRef idx="0">
-            <a:schemeClr val="accent1"/>
-          </a:effectRef>
-          <a:fontRef idx="minor">
-            <a:schemeClr val="lt1"/>
-          </a:fontRef>
-        </p:style>
-        <p:txBody>
-          <a:bodyPr rtlCol="0" anchor="ctr"/>
-          <a:lstStyle/>
-          <a:p>
-            <a:pPr algn="ctr"/>
-            <a:endParaRPr lang="en-US"/>
-          </a:p>
-        </p:txBody>
-      </p:sp>
-    </p:spTree>
-    <p:extLst>
-      <p:ext uri="{BB962C8B-B14F-4D97-AF65-F5344CB8AC3E}">
-        <p14:creationId xmlns:p14="http://schemas.microsoft.com/office/powerpoint/2010/main" val="315599626"/>
-      </p:ext>
-    </p:extLst>
-  </p:cSld>
-  <p:clrMapOvr>
-    <a:masterClrMapping/>
-  </p:clrMapOvr>
-</p:sld>
-</file>
-
-<file path=ppt/slides/slide6.xml><?xml version="1.0" encoding="utf-8"?>
-<p:sld xmlns:a="http://schemas.openxmlformats.org/drawingml/2006/main" xmlns:r="http://schemas.openxmlformats.org/officeDocument/2006/relationships" xmlns:p="http://schemas.openxmlformats.org/presentationml/2006/main">
-  <p:cSld>
-    <p:spTree>
-      <p:nvGrpSpPr>
-        <p:cNvPr id="1" name=""/>
-        <p:cNvGrpSpPr/>
-        <p:nvPr/>
-      </p:nvGrpSpPr>
-      <p:grpSpPr>
-        <a:xfrm>
-          <a:off x="0" y="0"/>
-          <a:ext cx="0" cy="0"/>
-          <a:chOff x="0" y="0"/>
-          <a:chExt cx="0" cy="0"/>
-        </a:xfrm>
-      </p:grpSpPr>
-      <p:sp>
-        <p:nvSpPr>
-          <p:cNvPr id="11" name="Rectangle 10">
-            <a:extLst>
-              <a:ext uri="{FF2B5EF4-FFF2-40B4-BE49-F238E27FC236}">
-                <a16:creationId xmlns:a16="http://schemas.microsoft.com/office/drawing/2014/main" id="{F5DFF4CB-98E1-FF48-A069-97B4154B328B}"/>
-              </a:ext>
-            </a:extLst>
-          </p:cNvPr>
-          <p:cNvSpPr/>
-          <p:nvPr/>
-        </p:nvSpPr>
-        <p:spPr>
-          <a:xfrm>
-            <a:off x="1752176" y="2632947"/>
+            <a:off x="4571999" y="2697115"/>
             <a:ext cx="1524001" cy="665018"/>
           </a:xfrm>
           <a:prstGeom prst="rect">
@@ -4908,7 +3720,7 @@
         </p:nvSpPr>
         <p:spPr>
           <a:xfrm rot="20675198">
-            <a:off x="2302962" y="1764165"/>
+            <a:off x="5122785" y="1828333"/>
             <a:ext cx="161365" cy="888316"/>
           </a:xfrm>
           <a:prstGeom prst="downArrow">
@@ -4970,7 +3782,7 @@
         </p:nvSpPr>
         <p:spPr>
           <a:xfrm>
-            <a:off x="1671499" y="2545007"/>
+            <a:off x="4491322" y="2609175"/>
             <a:ext cx="1524001" cy="665018"/>
           </a:xfrm>
           <a:prstGeom prst="rect">
@@ -5039,7 +3851,7 @@
         </p:nvSpPr>
         <p:spPr>
           <a:xfrm rot="21000000">
-            <a:off x="2264270" y="1772155"/>
+            <a:off x="5084093" y="1836323"/>
             <a:ext cx="161365" cy="772627"/>
           </a:xfrm>
           <a:prstGeom prst="downArrow">
@@ -5101,7 +3913,7 @@
         </p:nvSpPr>
         <p:spPr>
           <a:xfrm>
-            <a:off x="1590822" y="2457068"/>
+            <a:off x="4410645" y="2521236"/>
             <a:ext cx="1524001" cy="665018"/>
           </a:xfrm>
           <a:prstGeom prst="rect">
@@ -5170,7 +3982,7 @@
         </p:nvSpPr>
         <p:spPr>
           <a:xfrm rot="21300000">
-            <a:off x="2216826" y="1778094"/>
+            <a:off x="5036649" y="1842262"/>
             <a:ext cx="161365" cy="672768"/>
           </a:xfrm>
           <a:prstGeom prst="downArrow">
@@ -5232,7 +4044,7 @@
         </p:nvSpPr>
         <p:spPr>
           <a:xfrm>
-            <a:off x="1510145" y="1122219"/>
+            <a:off x="4329968" y="1186387"/>
             <a:ext cx="1524001" cy="665018"/>
           </a:xfrm>
           <a:prstGeom prst="rect">
@@ -5301,7 +4113,7 @@
         </p:nvSpPr>
         <p:spPr>
           <a:xfrm>
-            <a:off x="1510145" y="2369129"/>
+            <a:off x="4329968" y="2433297"/>
             <a:ext cx="1524001" cy="665018"/>
           </a:xfrm>
           <a:prstGeom prst="rect">
@@ -5370,7 +4182,7 @@
         </p:nvSpPr>
         <p:spPr>
           <a:xfrm>
-            <a:off x="2191459" y="1787237"/>
+            <a:off x="5011282" y="1851405"/>
             <a:ext cx="161365" cy="581892"/>
           </a:xfrm>
           <a:prstGeom prst="downArrow">
@@ -5420,10 +4232,10 @@
       </p:sp>
       <p:sp>
         <p:nvSpPr>
-          <p:cNvPr id="6" name="Rectangle 5">
-            <a:extLst>
-              <a:ext uri="{FF2B5EF4-FFF2-40B4-BE49-F238E27FC236}">
-                <a16:creationId xmlns:a16="http://schemas.microsoft.com/office/drawing/2014/main" id="{292A8187-D086-6241-BD43-8F4A54EACBD1}"/>
+          <p:cNvPr id="16" name="Rectangle 15">
+            <a:extLst>
+              <a:ext uri="{FF2B5EF4-FFF2-40B4-BE49-F238E27FC236}">
+                <a16:creationId xmlns:a16="http://schemas.microsoft.com/office/drawing/2014/main" id="{A5CA0DB8-57EB-C840-9FDD-2EBAFE84633F}"/>
               </a:ext>
             </a:extLst>
           </p:cNvPr>
@@ -5432,7 +4244,7 @@
         </p:nvSpPr>
         <p:spPr>
           <a:xfrm>
-            <a:off x="1510142" y="3616039"/>
+            <a:off x="4571996" y="3944025"/>
             <a:ext cx="1524001" cy="665018"/>
           </a:xfrm>
           <a:prstGeom prst="rect">
@@ -5489,10 +4301,10 @@
       </p:sp>
       <p:sp>
         <p:nvSpPr>
-          <p:cNvPr id="18" name="Down Arrow 17">
-            <a:extLst>
-              <a:ext uri="{FF2B5EF4-FFF2-40B4-BE49-F238E27FC236}">
-                <a16:creationId xmlns:a16="http://schemas.microsoft.com/office/drawing/2014/main" id="{A8DAD2EC-3E9B-E942-96A2-159C54469EE2}"/>
+          <p:cNvPr id="19" name="Down Arrow 18">
+            <a:extLst>
+              <a:ext uri="{FF2B5EF4-FFF2-40B4-BE49-F238E27FC236}">
+                <a16:creationId xmlns:a16="http://schemas.microsoft.com/office/drawing/2014/main" id="{F937787E-F591-AB4A-AA83-E0EA75AB4B38}"/>
               </a:ext>
             </a:extLst>
           </p:cNvPr>
@@ -5500,8 +4312,401 @@
           <p:nvPr/>
         </p:nvSpPr>
         <p:spPr>
+          <a:xfrm rot="20675198">
+            <a:off x="5122782" y="3075243"/>
+            <a:ext cx="161365" cy="888316"/>
+          </a:xfrm>
+          <a:prstGeom prst="downArrow">
+            <a:avLst>
+              <a:gd name="adj1" fmla="val 50000"/>
+              <a:gd name="adj2" fmla="val 129998"/>
+            </a:avLst>
+          </a:prstGeom>
+          <a:solidFill>
+            <a:schemeClr val="bg1">
+              <a:lumMod val="95000"/>
+              <a:alpha val="79584"/>
+            </a:schemeClr>
+          </a:solidFill>
+          <a:ln>
+            <a:solidFill>
+              <a:schemeClr val="bg2">
+                <a:lumMod val="50000"/>
+              </a:schemeClr>
+            </a:solidFill>
+          </a:ln>
+        </p:spPr>
+        <p:style>
+          <a:lnRef idx="2">
+            <a:schemeClr val="accent1">
+              <a:shade val="50000"/>
+            </a:schemeClr>
+          </a:lnRef>
+          <a:fillRef idx="1">
+            <a:schemeClr val="accent1"/>
+          </a:fillRef>
+          <a:effectRef idx="0">
+            <a:schemeClr val="accent1"/>
+          </a:effectRef>
+          <a:fontRef idx="minor">
+            <a:schemeClr val="lt1"/>
+          </a:fontRef>
+        </p:style>
+        <p:txBody>
+          <a:bodyPr rtlCol="0" anchor="ctr"/>
+          <a:lstStyle/>
+          <a:p>
+            <a:pPr algn="ctr"/>
+            <a:endParaRPr lang="en-US"/>
+          </a:p>
+        </p:txBody>
+      </p:sp>
+      <p:sp>
+        <p:nvSpPr>
+          <p:cNvPr id="20" name="Rectangle 19">
+            <a:extLst>
+              <a:ext uri="{FF2B5EF4-FFF2-40B4-BE49-F238E27FC236}">
+                <a16:creationId xmlns:a16="http://schemas.microsoft.com/office/drawing/2014/main" id="{6BAE310D-B37C-A241-920E-315A7306B033}"/>
+              </a:ext>
+            </a:extLst>
+          </p:cNvPr>
+          <p:cNvSpPr/>
+          <p:nvPr/>
+        </p:nvSpPr>
+        <p:spPr>
           <a:xfrm>
-            <a:off x="2191459" y="3029199"/>
+            <a:off x="4491319" y="3856085"/>
+            <a:ext cx="1524001" cy="665018"/>
+          </a:xfrm>
+          <a:prstGeom prst="rect">
+            <a:avLst/>
+          </a:prstGeom>
+          <a:solidFill>
+            <a:schemeClr val="bg1">
+              <a:lumMod val="95000"/>
+              <a:alpha val="79584"/>
+            </a:schemeClr>
+          </a:solidFill>
+          <a:ln w="38100">
+            <a:solidFill>
+              <a:schemeClr val="bg2">
+                <a:lumMod val="50000"/>
+              </a:schemeClr>
+            </a:solidFill>
+          </a:ln>
+        </p:spPr>
+        <p:style>
+          <a:lnRef idx="2">
+            <a:schemeClr val="accent1">
+              <a:shade val="50000"/>
+            </a:schemeClr>
+          </a:lnRef>
+          <a:fillRef idx="1">
+            <a:schemeClr val="accent1"/>
+          </a:fillRef>
+          <a:effectRef idx="0">
+            <a:schemeClr val="accent1"/>
+          </a:effectRef>
+          <a:fontRef idx="minor">
+            <a:schemeClr val="lt1"/>
+          </a:fontRef>
+        </p:style>
+        <p:txBody>
+          <a:bodyPr rtlCol="0" anchor="ctr"/>
+          <a:lstStyle/>
+          <a:p>
+            <a:pPr algn="ctr"/>
+            <a:r>
+              <a:rPr lang="en-US" sz="2000" dirty="0">
+                <a:solidFill>
+                  <a:schemeClr val="tx1">
+                    <a:lumMod val="85000"/>
+                    <a:lumOff val="15000"/>
+                  </a:schemeClr>
+                </a:solidFill>
+              </a:rPr>
+              <a:t>Permission</a:t>
+            </a:r>
+          </a:p>
+        </p:txBody>
+      </p:sp>
+      <p:sp>
+        <p:nvSpPr>
+          <p:cNvPr id="21" name="Down Arrow 20">
+            <a:extLst>
+              <a:ext uri="{FF2B5EF4-FFF2-40B4-BE49-F238E27FC236}">
+                <a16:creationId xmlns:a16="http://schemas.microsoft.com/office/drawing/2014/main" id="{675138C8-4353-E442-A21C-738EAB141FBE}"/>
+              </a:ext>
+            </a:extLst>
+          </p:cNvPr>
+          <p:cNvSpPr/>
+          <p:nvPr/>
+        </p:nvSpPr>
+        <p:spPr>
+          <a:xfrm rot="21000000">
+            <a:off x="5084090" y="3083233"/>
+            <a:ext cx="161365" cy="772627"/>
+          </a:xfrm>
+          <a:prstGeom prst="downArrow">
+            <a:avLst>
+              <a:gd name="adj1" fmla="val 50000"/>
+              <a:gd name="adj2" fmla="val 129998"/>
+            </a:avLst>
+          </a:prstGeom>
+          <a:solidFill>
+            <a:schemeClr val="bg1">
+              <a:lumMod val="95000"/>
+              <a:alpha val="79584"/>
+            </a:schemeClr>
+          </a:solidFill>
+          <a:ln>
+            <a:solidFill>
+              <a:schemeClr val="bg2">
+                <a:lumMod val="50000"/>
+              </a:schemeClr>
+            </a:solidFill>
+          </a:ln>
+        </p:spPr>
+        <p:style>
+          <a:lnRef idx="2">
+            <a:schemeClr val="accent1">
+              <a:shade val="50000"/>
+            </a:schemeClr>
+          </a:lnRef>
+          <a:fillRef idx="1">
+            <a:schemeClr val="accent1"/>
+          </a:fillRef>
+          <a:effectRef idx="0">
+            <a:schemeClr val="accent1"/>
+          </a:effectRef>
+          <a:fontRef idx="minor">
+            <a:schemeClr val="lt1"/>
+          </a:fontRef>
+        </p:style>
+        <p:txBody>
+          <a:bodyPr rtlCol="0" anchor="ctr"/>
+          <a:lstStyle/>
+          <a:p>
+            <a:pPr algn="ctr"/>
+            <a:endParaRPr lang="en-US"/>
+          </a:p>
+        </p:txBody>
+      </p:sp>
+      <p:sp>
+        <p:nvSpPr>
+          <p:cNvPr id="22" name="Rectangle 21">
+            <a:extLst>
+              <a:ext uri="{FF2B5EF4-FFF2-40B4-BE49-F238E27FC236}">
+                <a16:creationId xmlns:a16="http://schemas.microsoft.com/office/drawing/2014/main" id="{90B2ED0E-B620-C64A-8FFB-6879542442F6}"/>
+              </a:ext>
+            </a:extLst>
+          </p:cNvPr>
+          <p:cNvSpPr/>
+          <p:nvPr/>
+        </p:nvSpPr>
+        <p:spPr>
+          <a:xfrm>
+            <a:off x="4410642" y="3768146"/>
+            <a:ext cx="1524001" cy="665018"/>
+          </a:xfrm>
+          <a:prstGeom prst="rect">
+            <a:avLst/>
+          </a:prstGeom>
+          <a:solidFill>
+            <a:schemeClr val="bg1">
+              <a:lumMod val="95000"/>
+              <a:alpha val="79584"/>
+            </a:schemeClr>
+          </a:solidFill>
+          <a:ln w="38100">
+            <a:solidFill>
+              <a:schemeClr val="bg2">
+                <a:lumMod val="50000"/>
+              </a:schemeClr>
+            </a:solidFill>
+          </a:ln>
+        </p:spPr>
+        <p:style>
+          <a:lnRef idx="2">
+            <a:schemeClr val="accent1">
+              <a:shade val="50000"/>
+            </a:schemeClr>
+          </a:lnRef>
+          <a:fillRef idx="1">
+            <a:schemeClr val="accent1"/>
+          </a:fillRef>
+          <a:effectRef idx="0">
+            <a:schemeClr val="accent1"/>
+          </a:effectRef>
+          <a:fontRef idx="minor">
+            <a:schemeClr val="lt1"/>
+          </a:fontRef>
+        </p:style>
+        <p:txBody>
+          <a:bodyPr rtlCol="0" anchor="ctr"/>
+          <a:lstStyle/>
+          <a:p>
+            <a:pPr algn="ctr"/>
+            <a:r>
+              <a:rPr lang="en-US" sz="2000" dirty="0">
+                <a:solidFill>
+                  <a:schemeClr val="tx1">
+                    <a:lumMod val="85000"/>
+                    <a:lumOff val="15000"/>
+                  </a:schemeClr>
+                </a:solidFill>
+              </a:rPr>
+              <a:t>Permission</a:t>
+            </a:r>
+          </a:p>
+        </p:txBody>
+      </p:sp>
+      <p:sp>
+        <p:nvSpPr>
+          <p:cNvPr id="23" name="Down Arrow 22">
+            <a:extLst>
+              <a:ext uri="{FF2B5EF4-FFF2-40B4-BE49-F238E27FC236}">
+                <a16:creationId xmlns:a16="http://schemas.microsoft.com/office/drawing/2014/main" id="{09C43943-FB10-2F4E-A6DD-A0608F650847}"/>
+              </a:ext>
+            </a:extLst>
+          </p:cNvPr>
+          <p:cNvSpPr/>
+          <p:nvPr/>
+        </p:nvSpPr>
+        <p:spPr>
+          <a:xfrm rot="21300000">
+            <a:off x="5036646" y="3089172"/>
+            <a:ext cx="161365" cy="672768"/>
+          </a:xfrm>
+          <a:prstGeom prst="downArrow">
+            <a:avLst>
+              <a:gd name="adj1" fmla="val 50000"/>
+              <a:gd name="adj2" fmla="val 129998"/>
+            </a:avLst>
+          </a:prstGeom>
+          <a:solidFill>
+            <a:schemeClr val="bg1">
+              <a:lumMod val="95000"/>
+              <a:alpha val="79584"/>
+            </a:schemeClr>
+          </a:solidFill>
+          <a:ln>
+            <a:solidFill>
+              <a:schemeClr val="bg2">
+                <a:lumMod val="50000"/>
+              </a:schemeClr>
+            </a:solidFill>
+          </a:ln>
+        </p:spPr>
+        <p:style>
+          <a:lnRef idx="2">
+            <a:schemeClr val="accent1">
+              <a:shade val="50000"/>
+            </a:schemeClr>
+          </a:lnRef>
+          <a:fillRef idx="1">
+            <a:schemeClr val="accent1"/>
+          </a:fillRef>
+          <a:effectRef idx="0">
+            <a:schemeClr val="accent1"/>
+          </a:effectRef>
+          <a:fontRef idx="minor">
+            <a:schemeClr val="lt1"/>
+          </a:fontRef>
+        </p:style>
+        <p:txBody>
+          <a:bodyPr rtlCol="0" anchor="ctr"/>
+          <a:lstStyle/>
+          <a:p>
+            <a:pPr algn="ctr"/>
+            <a:endParaRPr lang="en-US"/>
+          </a:p>
+        </p:txBody>
+      </p:sp>
+      <p:sp>
+        <p:nvSpPr>
+          <p:cNvPr id="6" name="Rectangle 5">
+            <a:extLst>
+              <a:ext uri="{FF2B5EF4-FFF2-40B4-BE49-F238E27FC236}">
+                <a16:creationId xmlns:a16="http://schemas.microsoft.com/office/drawing/2014/main" id="{292A8187-D086-6241-BD43-8F4A54EACBD1}"/>
+              </a:ext>
+            </a:extLst>
+          </p:cNvPr>
+          <p:cNvSpPr/>
+          <p:nvPr/>
+        </p:nvSpPr>
+        <p:spPr>
+          <a:xfrm>
+            <a:off x="4329965" y="3680207"/>
+            <a:ext cx="1524001" cy="665018"/>
+          </a:xfrm>
+          <a:prstGeom prst="rect">
+            <a:avLst/>
+          </a:prstGeom>
+          <a:solidFill>
+            <a:schemeClr val="bg1">
+              <a:lumMod val="95000"/>
+              <a:alpha val="79584"/>
+            </a:schemeClr>
+          </a:solidFill>
+          <a:ln w="38100">
+            <a:solidFill>
+              <a:schemeClr val="bg2">
+                <a:lumMod val="50000"/>
+              </a:schemeClr>
+            </a:solidFill>
+          </a:ln>
+        </p:spPr>
+        <p:style>
+          <a:lnRef idx="2">
+            <a:schemeClr val="accent1">
+              <a:shade val="50000"/>
+            </a:schemeClr>
+          </a:lnRef>
+          <a:fillRef idx="1">
+            <a:schemeClr val="accent1"/>
+          </a:fillRef>
+          <a:effectRef idx="0">
+            <a:schemeClr val="accent1"/>
+          </a:effectRef>
+          <a:fontRef idx="minor">
+            <a:schemeClr val="lt1"/>
+          </a:fontRef>
+        </p:style>
+        <p:txBody>
+          <a:bodyPr rtlCol="0" anchor="ctr"/>
+          <a:lstStyle/>
+          <a:p>
+            <a:pPr algn="ctr"/>
+            <a:r>
+              <a:rPr lang="en-US" sz="2000" dirty="0">
+                <a:solidFill>
+                  <a:schemeClr val="tx1">
+                    <a:lumMod val="85000"/>
+                    <a:lumOff val="15000"/>
+                  </a:schemeClr>
+                </a:solidFill>
+              </a:rPr>
+              <a:t>Permission</a:t>
+            </a:r>
+          </a:p>
+        </p:txBody>
+      </p:sp>
+      <p:sp>
+        <p:nvSpPr>
+          <p:cNvPr id="18" name="Down Arrow 17">
+            <a:extLst>
+              <a:ext uri="{FF2B5EF4-FFF2-40B4-BE49-F238E27FC236}">
+                <a16:creationId xmlns:a16="http://schemas.microsoft.com/office/drawing/2014/main" id="{A8DAD2EC-3E9B-E942-96A2-159C54469EE2}"/>
+              </a:ext>
+            </a:extLst>
+          </p:cNvPr>
+          <p:cNvSpPr/>
+          <p:nvPr/>
+        </p:nvSpPr>
+        <p:spPr>
+          <a:xfrm>
+            <a:off x="5011282" y="3093367"/>
             <a:ext cx="161365" cy="581892"/>
           </a:xfrm>
           <a:prstGeom prst="downArrow">
@@ -5551,10 +4756,10 @@
       </p:sp>
       <p:sp>
         <p:nvSpPr>
-          <p:cNvPr id="7" name="Rectangle 6">
-            <a:extLst>
-              <a:ext uri="{FF2B5EF4-FFF2-40B4-BE49-F238E27FC236}">
-                <a16:creationId xmlns:a16="http://schemas.microsoft.com/office/drawing/2014/main" id="{084195EB-CEC7-3642-9E4F-07763E9EF4CC}"/>
+          <p:cNvPr id="24" name="Rectangle 23">
+            <a:extLst>
+              <a:ext uri="{FF2B5EF4-FFF2-40B4-BE49-F238E27FC236}">
+                <a16:creationId xmlns:a16="http://schemas.microsoft.com/office/drawing/2014/main" id="{4D48405B-FC50-FE48-9864-E65F44D6BEA9}"/>
               </a:ext>
             </a:extLst>
           </p:cNvPr>
@@ -5563,7 +4768,7 @@
         </p:nvSpPr>
         <p:spPr>
           <a:xfrm>
-            <a:off x="1510142" y="4862949"/>
+            <a:off x="4568712" y="5190935"/>
             <a:ext cx="1524001" cy="665018"/>
           </a:xfrm>
           <a:prstGeom prst="rect">
@@ -5620,10 +4825,10 @@
       </p:sp>
       <p:sp>
         <p:nvSpPr>
-          <p:cNvPr id="17" name="Down Arrow 16">
-            <a:extLst>
-              <a:ext uri="{FF2B5EF4-FFF2-40B4-BE49-F238E27FC236}">
-                <a16:creationId xmlns:a16="http://schemas.microsoft.com/office/drawing/2014/main" id="{79138125-78FD-2843-9EDB-DB6D8C3820EA}"/>
+          <p:cNvPr id="25" name="Down Arrow 24">
+            <a:extLst>
+              <a:ext uri="{FF2B5EF4-FFF2-40B4-BE49-F238E27FC236}">
+                <a16:creationId xmlns:a16="http://schemas.microsoft.com/office/drawing/2014/main" id="{C38E727F-4FE9-4943-9A29-A68D7FE9CB45}"/>
               </a:ext>
             </a:extLst>
           </p:cNvPr>
@@ -5631,169 +4836,8 @@
           <p:nvPr/>
         </p:nvSpPr>
         <p:spPr>
-          <a:xfrm>
-            <a:off x="2191458" y="4281057"/>
-            <a:ext cx="161365" cy="581892"/>
-          </a:xfrm>
-          <a:prstGeom prst="downArrow">
-            <a:avLst>
-              <a:gd name="adj1" fmla="val 50000"/>
-              <a:gd name="adj2" fmla="val 129998"/>
-            </a:avLst>
-          </a:prstGeom>
-          <a:solidFill>
-            <a:schemeClr val="bg1">
-              <a:lumMod val="95000"/>
-              <a:alpha val="79584"/>
-            </a:schemeClr>
-          </a:solidFill>
-          <a:ln>
-            <a:solidFill>
-              <a:schemeClr val="bg2">
-                <a:lumMod val="50000"/>
-              </a:schemeClr>
-            </a:solidFill>
-          </a:ln>
-        </p:spPr>
-        <p:style>
-          <a:lnRef idx="2">
-            <a:schemeClr val="accent1">
-              <a:shade val="50000"/>
-            </a:schemeClr>
-          </a:lnRef>
-          <a:fillRef idx="1">
-            <a:schemeClr val="accent1"/>
-          </a:fillRef>
-          <a:effectRef idx="0">
-            <a:schemeClr val="accent1"/>
-          </a:effectRef>
-          <a:fontRef idx="minor">
-            <a:schemeClr val="lt1"/>
-          </a:fontRef>
-        </p:style>
-        <p:txBody>
-          <a:bodyPr rtlCol="0" anchor="ctr"/>
-          <a:lstStyle/>
-          <a:p>
-            <a:pPr algn="ctr"/>
-            <a:endParaRPr lang="en-US"/>
-          </a:p>
-        </p:txBody>
-      </p:sp>
-    </p:spTree>
-    <p:extLst>
-      <p:ext uri="{BB962C8B-B14F-4D97-AF65-F5344CB8AC3E}">
-        <p14:creationId xmlns:p14="http://schemas.microsoft.com/office/powerpoint/2010/main" val="3840253160"/>
-      </p:ext>
-    </p:extLst>
-  </p:cSld>
-  <p:clrMapOvr>
-    <a:masterClrMapping/>
-  </p:clrMapOvr>
-</p:sld>
-</file>
-
-<file path=ppt/slides/slide7.xml><?xml version="1.0" encoding="utf-8"?>
-<p:sld xmlns:a="http://schemas.openxmlformats.org/drawingml/2006/main" xmlns:r="http://schemas.openxmlformats.org/officeDocument/2006/relationships" xmlns:p="http://schemas.openxmlformats.org/presentationml/2006/main">
-  <p:cSld>
-    <p:spTree>
-      <p:nvGrpSpPr>
-        <p:cNvPr id="1" name=""/>
-        <p:cNvGrpSpPr/>
-        <p:nvPr/>
-      </p:nvGrpSpPr>
-      <p:grpSpPr>
-        <a:xfrm>
-          <a:off x="0" y="0"/>
-          <a:ext cx="0" cy="0"/>
-          <a:chOff x="0" y="0"/>
-          <a:chExt cx="0" cy="0"/>
-        </a:xfrm>
-      </p:grpSpPr>
-      <p:sp>
-        <p:nvSpPr>
-          <p:cNvPr id="11" name="Rectangle 10">
-            <a:extLst>
-              <a:ext uri="{FF2B5EF4-FFF2-40B4-BE49-F238E27FC236}">
-                <a16:creationId xmlns:a16="http://schemas.microsoft.com/office/drawing/2014/main" id="{F5DFF4CB-98E1-FF48-A069-97B4154B328B}"/>
-              </a:ext>
-            </a:extLst>
-          </p:cNvPr>
-          <p:cNvSpPr/>
-          <p:nvPr/>
-        </p:nvSpPr>
-        <p:spPr>
-          <a:xfrm>
-            <a:off x="1752176" y="2632947"/>
-            <a:ext cx="1524001" cy="665018"/>
-          </a:xfrm>
-          <a:prstGeom prst="rect">
-            <a:avLst/>
-          </a:prstGeom>
-          <a:solidFill>
-            <a:schemeClr val="bg1">
-              <a:lumMod val="95000"/>
-              <a:alpha val="79584"/>
-            </a:schemeClr>
-          </a:solidFill>
-          <a:ln w="38100">
-            <a:solidFill>
-              <a:schemeClr val="bg2">
-                <a:lumMod val="50000"/>
-              </a:schemeClr>
-            </a:solidFill>
-          </a:ln>
-        </p:spPr>
-        <p:style>
-          <a:lnRef idx="2">
-            <a:schemeClr val="accent1">
-              <a:shade val="50000"/>
-            </a:schemeClr>
-          </a:lnRef>
-          <a:fillRef idx="1">
-            <a:schemeClr val="accent1"/>
-          </a:fillRef>
-          <a:effectRef idx="0">
-            <a:schemeClr val="accent1"/>
-          </a:effectRef>
-          <a:fontRef idx="minor">
-            <a:schemeClr val="lt1"/>
-          </a:fontRef>
-        </p:style>
-        <p:txBody>
-          <a:bodyPr rtlCol="0" anchor="ctr"/>
-          <a:lstStyle/>
-          <a:p>
-            <a:pPr algn="ctr"/>
-            <a:r>
-              <a:rPr lang="en-US" sz="2000" dirty="0">
-                <a:solidFill>
-                  <a:schemeClr val="tx1">
-                    <a:lumMod val="85000"/>
-                    <a:lumOff val="15000"/>
-                  </a:schemeClr>
-                </a:solidFill>
-              </a:rPr>
-              <a:t>Role</a:t>
-            </a:r>
-          </a:p>
-        </p:txBody>
-      </p:sp>
-      <p:sp>
-        <p:nvSpPr>
-          <p:cNvPr id="14" name="Down Arrow 13">
-            <a:extLst>
-              <a:ext uri="{FF2B5EF4-FFF2-40B4-BE49-F238E27FC236}">
-                <a16:creationId xmlns:a16="http://schemas.microsoft.com/office/drawing/2014/main" id="{7401979E-EFD4-3B4A-B5AE-34BF68CA615C}"/>
-              </a:ext>
-            </a:extLst>
-          </p:cNvPr>
-          <p:cNvSpPr/>
-          <p:nvPr/>
-        </p:nvSpPr>
-        <p:spPr>
           <a:xfrm rot="20675198">
-            <a:off x="2302962" y="1764165"/>
+            <a:off x="5119498" y="4322153"/>
             <a:ext cx="161365" cy="888316"/>
           </a:xfrm>
           <a:prstGeom prst="downArrow">
@@ -5843,10 +4887,10 @@
       </p:sp>
       <p:sp>
         <p:nvSpPr>
-          <p:cNvPr id="10" name="Rectangle 9">
-            <a:extLst>
-              <a:ext uri="{FF2B5EF4-FFF2-40B4-BE49-F238E27FC236}">
-                <a16:creationId xmlns:a16="http://schemas.microsoft.com/office/drawing/2014/main" id="{B7F1EEC2-724B-1848-91A6-1DFD50EBDEE6}"/>
+          <p:cNvPr id="26" name="Rectangle 25">
+            <a:extLst>
+              <a:ext uri="{FF2B5EF4-FFF2-40B4-BE49-F238E27FC236}">
+                <a16:creationId xmlns:a16="http://schemas.microsoft.com/office/drawing/2014/main" id="{6A8C3861-7AA5-7B4D-8171-C7F0BA70A786}"/>
               </a:ext>
             </a:extLst>
           </p:cNvPr>
@@ -5855,7 +4899,7 @@
         </p:nvSpPr>
         <p:spPr>
           <a:xfrm>
-            <a:off x="1671499" y="2545007"/>
+            <a:off x="4489129" y="5102995"/>
             <a:ext cx="1524001" cy="665018"/>
           </a:xfrm>
           <a:prstGeom prst="rect">
@@ -5905,17 +4949,17 @@
                   </a:schemeClr>
                 </a:solidFill>
               </a:rPr>
-              <a:t>Role</a:t>
-            </a:r>
-          </a:p>
-        </p:txBody>
-      </p:sp>
-      <p:sp>
-        <p:nvSpPr>
-          <p:cNvPr id="13" name="Down Arrow 12">
-            <a:extLst>
-              <a:ext uri="{FF2B5EF4-FFF2-40B4-BE49-F238E27FC236}">
-                <a16:creationId xmlns:a16="http://schemas.microsoft.com/office/drawing/2014/main" id="{B4CDB232-AE9B-3D4F-B146-8B666553560E}"/>
+              <a:t>Capability</a:t>
+            </a:r>
+          </a:p>
+        </p:txBody>
+      </p:sp>
+      <p:sp>
+        <p:nvSpPr>
+          <p:cNvPr id="27" name="Down Arrow 26">
+            <a:extLst>
+              <a:ext uri="{FF2B5EF4-FFF2-40B4-BE49-F238E27FC236}">
+                <a16:creationId xmlns:a16="http://schemas.microsoft.com/office/drawing/2014/main" id="{68F6EEB0-BC58-E14D-8679-11B822C5F9D6}"/>
               </a:ext>
             </a:extLst>
           </p:cNvPr>
@@ -5924,7 +4968,7 @@
         </p:nvSpPr>
         <p:spPr>
           <a:xfrm rot="21000000">
-            <a:off x="2264270" y="1772155"/>
+            <a:off x="5080806" y="4330143"/>
             <a:ext cx="161365" cy="772627"/>
           </a:xfrm>
           <a:prstGeom prst="downArrow">
@@ -5974,10 +5018,10 @@
       </p:sp>
       <p:sp>
         <p:nvSpPr>
-          <p:cNvPr id="9" name="Rectangle 8">
-            <a:extLst>
-              <a:ext uri="{FF2B5EF4-FFF2-40B4-BE49-F238E27FC236}">
-                <a16:creationId xmlns:a16="http://schemas.microsoft.com/office/drawing/2014/main" id="{6F7D0253-8737-834F-8F03-1696179FCA7C}"/>
+          <p:cNvPr id="28" name="Rectangle 27">
+            <a:extLst>
+              <a:ext uri="{FF2B5EF4-FFF2-40B4-BE49-F238E27FC236}">
+                <a16:creationId xmlns:a16="http://schemas.microsoft.com/office/drawing/2014/main" id="{EDF4912B-F808-8F44-B8BF-FFF885A64E0C}"/>
               </a:ext>
             </a:extLst>
           </p:cNvPr>
@@ -5986,7 +5030,7 @@
         </p:nvSpPr>
         <p:spPr>
           <a:xfrm>
-            <a:off x="1590822" y="2457068"/>
+            <a:off x="4409547" y="5015056"/>
             <a:ext cx="1524001" cy="665018"/>
           </a:xfrm>
           <a:prstGeom prst="rect">
@@ -6036,17 +5080,17 @@
                   </a:schemeClr>
                 </a:solidFill>
               </a:rPr>
-              <a:t>Role</a:t>
-            </a:r>
-          </a:p>
-        </p:txBody>
-      </p:sp>
-      <p:sp>
-        <p:nvSpPr>
-          <p:cNvPr id="12" name="Down Arrow 11">
-            <a:extLst>
-              <a:ext uri="{FF2B5EF4-FFF2-40B4-BE49-F238E27FC236}">
-                <a16:creationId xmlns:a16="http://schemas.microsoft.com/office/drawing/2014/main" id="{6CFDBBEA-1C60-B94C-BA5B-0530357207B3}"/>
+              <a:t>Capability</a:t>
+            </a:r>
+          </a:p>
+        </p:txBody>
+      </p:sp>
+      <p:sp>
+        <p:nvSpPr>
+          <p:cNvPr id="29" name="Down Arrow 28">
+            <a:extLst>
+              <a:ext uri="{FF2B5EF4-FFF2-40B4-BE49-F238E27FC236}">
+                <a16:creationId xmlns:a16="http://schemas.microsoft.com/office/drawing/2014/main" id="{CC76696C-EEF6-094E-8EBF-656B4960E1DF}"/>
               </a:ext>
             </a:extLst>
           </p:cNvPr>
@@ -6055,7 +5099,7 @@
         </p:nvSpPr>
         <p:spPr>
           <a:xfrm rot="21300000">
-            <a:off x="2216826" y="1778094"/>
+            <a:off x="5033362" y="4336082"/>
             <a:ext cx="161365" cy="672768"/>
           </a:xfrm>
           <a:prstGeom prst="downArrow">
@@ -6105,10 +5149,10 @@
       </p:sp>
       <p:sp>
         <p:nvSpPr>
-          <p:cNvPr id="2" name="Rectangle 1">
-            <a:extLst>
-              <a:ext uri="{FF2B5EF4-FFF2-40B4-BE49-F238E27FC236}">
-                <a16:creationId xmlns:a16="http://schemas.microsoft.com/office/drawing/2014/main" id="{9B7387F5-ACA9-7141-97D3-A62F3221BA74}"/>
+          <p:cNvPr id="7" name="Rectangle 6">
+            <a:extLst>
+              <a:ext uri="{FF2B5EF4-FFF2-40B4-BE49-F238E27FC236}">
+                <a16:creationId xmlns:a16="http://schemas.microsoft.com/office/drawing/2014/main" id="{084195EB-CEC7-3642-9E4F-07763E9EF4CC}"/>
               </a:ext>
             </a:extLst>
           </p:cNvPr>
@@ -6117,7 +5161,7 @@
         </p:nvSpPr>
         <p:spPr>
           <a:xfrm>
-            <a:off x="1510145" y="1122219"/>
+            <a:off x="4329965" y="4927117"/>
             <a:ext cx="1524001" cy="665018"/>
           </a:xfrm>
           <a:prstGeom prst="rect">
@@ -6167,17 +5211,17 @@
                   </a:schemeClr>
                 </a:solidFill>
               </a:rPr>
-              <a:t>User</a:t>
-            </a:r>
-          </a:p>
-        </p:txBody>
-      </p:sp>
-      <p:sp>
-        <p:nvSpPr>
-          <p:cNvPr id="5" name="Rectangle 4">
-            <a:extLst>
-              <a:ext uri="{FF2B5EF4-FFF2-40B4-BE49-F238E27FC236}">
-                <a16:creationId xmlns:a16="http://schemas.microsoft.com/office/drawing/2014/main" id="{D1CCEEB6-0FB9-4C4E-A7F2-C6729B9FC8EA}"/>
+              <a:t>Capability</a:t>
+            </a:r>
+          </a:p>
+        </p:txBody>
+      </p:sp>
+      <p:sp>
+        <p:nvSpPr>
+          <p:cNvPr id="17" name="Down Arrow 16">
+            <a:extLst>
+              <a:ext uri="{FF2B5EF4-FFF2-40B4-BE49-F238E27FC236}">
+                <a16:creationId xmlns:a16="http://schemas.microsoft.com/office/drawing/2014/main" id="{79138125-78FD-2843-9EDB-DB6D8C3820EA}"/>
               </a:ext>
             </a:extLst>
           </p:cNvPr>
@@ -6186,2402 +5230,7 @@
         </p:nvSpPr>
         <p:spPr>
           <a:xfrm>
-            <a:off x="1510145" y="2369129"/>
-            <a:ext cx="1524001" cy="665018"/>
-          </a:xfrm>
-          <a:prstGeom prst="rect">
-            <a:avLst/>
-          </a:prstGeom>
-          <a:solidFill>
-            <a:schemeClr val="bg1">
-              <a:lumMod val="95000"/>
-              <a:alpha val="79584"/>
-            </a:schemeClr>
-          </a:solidFill>
-          <a:ln w="38100">
-            <a:solidFill>
-              <a:schemeClr val="bg2">
-                <a:lumMod val="50000"/>
-              </a:schemeClr>
-            </a:solidFill>
-          </a:ln>
-        </p:spPr>
-        <p:style>
-          <a:lnRef idx="2">
-            <a:schemeClr val="accent1">
-              <a:shade val="50000"/>
-            </a:schemeClr>
-          </a:lnRef>
-          <a:fillRef idx="1">
-            <a:schemeClr val="accent1"/>
-          </a:fillRef>
-          <a:effectRef idx="0">
-            <a:schemeClr val="accent1"/>
-          </a:effectRef>
-          <a:fontRef idx="minor">
-            <a:schemeClr val="lt1"/>
-          </a:fontRef>
-        </p:style>
-        <p:txBody>
-          <a:bodyPr rtlCol="0" anchor="ctr"/>
-          <a:lstStyle/>
-          <a:p>
-            <a:pPr algn="ctr"/>
-            <a:r>
-              <a:rPr lang="en-US" sz="2000" dirty="0">
-                <a:solidFill>
-                  <a:schemeClr val="tx1">
-                    <a:lumMod val="85000"/>
-                    <a:lumOff val="15000"/>
-                  </a:schemeClr>
-                </a:solidFill>
-              </a:rPr>
-              <a:t>Role</a:t>
-            </a:r>
-          </a:p>
-        </p:txBody>
-      </p:sp>
-      <p:sp>
-        <p:nvSpPr>
-          <p:cNvPr id="15" name="Down Arrow 14">
-            <a:extLst>
-              <a:ext uri="{FF2B5EF4-FFF2-40B4-BE49-F238E27FC236}">
-                <a16:creationId xmlns:a16="http://schemas.microsoft.com/office/drawing/2014/main" id="{03FE2F9B-D768-9846-AF7E-C97F162AF435}"/>
-              </a:ext>
-            </a:extLst>
-          </p:cNvPr>
-          <p:cNvSpPr/>
-          <p:nvPr/>
-        </p:nvSpPr>
-        <p:spPr>
-          <a:xfrm>
-            <a:off x="2191459" y="1787237"/>
-            <a:ext cx="161365" cy="581892"/>
-          </a:xfrm>
-          <a:prstGeom prst="downArrow">
-            <a:avLst>
-              <a:gd name="adj1" fmla="val 50000"/>
-              <a:gd name="adj2" fmla="val 129998"/>
-            </a:avLst>
-          </a:prstGeom>
-          <a:solidFill>
-            <a:schemeClr val="bg1">
-              <a:lumMod val="95000"/>
-              <a:alpha val="79584"/>
-            </a:schemeClr>
-          </a:solidFill>
-          <a:ln>
-            <a:solidFill>
-              <a:schemeClr val="bg2">
-                <a:lumMod val="50000"/>
-              </a:schemeClr>
-            </a:solidFill>
-          </a:ln>
-        </p:spPr>
-        <p:style>
-          <a:lnRef idx="2">
-            <a:schemeClr val="accent1">
-              <a:shade val="50000"/>
-            </a:schemeClr>
-          </a:lnRef>
-          <a:fillRef idx="1">
-            <a:schemeClr val="accent1"/>
-          </a:fillRef>
-          <a:effectRef idx="0">
-            <a:schemeClr val="accent1"/>
-          </a:effectRef>
-          <a:fontRef idx="minor">
-            <a:schemeClr val="lt1"/>
-          </a:fontRef>
-        </p:style>
-        <p:txBody>
-          <a:bodyPr rtlCol="0" anchor="ctr"/>
-          <a:lstStyle/>
-          <a:p>
-            <a:pPr algn="ctr"/>
-            <a:endParaRPr lang="en-US"/>
-          </a:p>
-        </p:txBody>
-      </p:sp>
-      <p:sp>
-        <p:nvSpPr>
-          <p:cNvPr id="16" name="Rectangle 15">
-            <a:extLst>
-              <a:ext uri="{FF2B5EF4-FFF2-40B4-BE49-F238E27FC236}">
-                <a16:creationId xmlns:a16="http://schemas.microsoft.com/office/drawing/2014/main" id="{A5CA0DB8-57EB-C840-9FDD-2EBAFE84633F}"/>
-              </a:ext>
-            </a:extLst>
-          </p:cNvPr>
-          <p:cNvSpPr/>
-          <p:nvPr/>
-        </p:nvSpPr>
-        <p:spPr>
-          <a:xfrm>
-            <a:off x="1752173" y="3879857"/>
-            <a:ext cx="1524001" cy="665018"/>
-          </a:xfrm>
-          <a:prstGeom prst="rect">
-            <a:avLst/>
-          </a:prstGeom>
-          <a:solidFill>
-            <a:schemeClr val="bg1">
-              <a:lumMod val="95000"/>
-              <a:alpha val="79584"/>
-            </a:schemeClr>
-          </a:solidFill>
-          <a:ln w="38100">
-            <a:solidFill>
-              <a:schemeClr val="bg2">
-                <a:lumMod val="50000"/>
-              </a:schemeClr>
-            </a:solidFill>
-          </a:ln>
-        </p:spPr>
-        <p:style>
-          <a:lnRef idx="2">
-            <a:schemeClr val="accent1">
-              <a:shade val="50000"/>
-            </a:schemeClr>
-          </a:lnRef>
-          <a:fillRef idx="1">
-            <a:schemeClr val="accent1"/>
-          </a:fillRef>
-          <a:effectRef idx="0">
-            <a:schemeClr val="accent1"/>
-          </a:effectRef>
-          <a:fontRef idx="minor">
-            <a:schemeClr val="lt1"/>
-          </a:fontRef>
-        </p:style>
-        <p:txBody>
-          <a:bodyPr rtlCol="0" anchor="ctr"/>
-          <a:lstStyle/>
-          <a:p>
-            <a:pPr algn="ctr"/>
-            <a:r>
-              <a:rPr lang="en-US" sz="2000" dirty="0">
-                <a:solidFill>
-                  <a:schemeClr val="tx1">
-                    <a:lumMod val="85000"/>
-                    <a:lumOff val="15000"/>
-                  </a:schemeClr>
-                </a:solidFill>
-              </a:rPr>
-              <a:t>Permission</a:t>
-            </a:r>
-          </a:p>
-        </p:txBody>
-      </p:sp>
-      <p:sp>
-        <p:nvSpPr>
-          <p:cNvPr id="19" name="Down Arrow 18">
-            <a:extLst>
-              <a:ext uri="{FF2B5EF4-FFF2-40B4-BE49-F238E27FC236}">
-                <a16:creationId xmlns:a16="http://schemas.microsoft.com/office/drawing/2014/main" id="{F937787E-F591-AB4A-AA83-E0EA75AB4B38}"/>
-              </a:ext>
-            </a:extLst>
-          </p:cNvPr>
-          <p:cNvSpPr/>
-          <p:nvPr/>
-        </p:nvSpPr>
-        <p:spPr>
-          <a:xfrm rot="20675198">
-            <a:off x="2302959" y="3011075"/>
-            <a:ext cx="161365" cy="888316"/>
-          </a:xfrm>
-          <a:prstGeom prst="downArrow">
-            <a:avLst>
-              <a:gd name="adj1" fmla="val 50000"/>
-              <a:gd name="adj2" fmla="val 129998"/>
-            </a:avLst>
-          </a:prstGeom>
-          <a:solidFill>
-            <a:schemeClr val="bg1">
-              <a:lumMod val="95000"/>
-              <a:alpha val="79584"/>
-            </a:schemeClr>
-          </a:solidFill>
-          <a:ln>
-            <a:solidFill>
-              <a:schemeClr val="bg2">
-                <a:lumMod val="50000"/>
-              </a:schemeClr>
-            </a:solidFill>
-          </a:ln>
-        </p:spPr>
-        <p:style>
-          <a:lnRef idx="2">
-            <a:schemeClr val="accent1">
-              <a:shade val="50000"/>
-            </a:schemeClr>
-          </a:lnRef>
-          <a:fillRef idx="1">
-            <a:schemeClr val="accent1"/>
-          </a:fillRef>
-          <a:effectRef idx="0">
-            <a:schemeClr val="accent1"/>
-          </a:effectRef>
-          <a:fontRef idx="minor">
-            <a:schemeClr val="lt1"/>
-          </a:fontRef>
-        </p:style>
-        <p:txBody>
-          <a:bodyPr rtlCol="0" anchor="ctr"/>
-          <a:lstStyle/>
-          <a:p>
-            <a:pPr algn="ctr"/>
-            <a:endParaRPr lang="en-US"/>
-          </a:p>
-        </p:txBody>
-      </p:sp>
-      <p:sp>
-        <p:nvSpPr>
-          <p:cNvPr id="20" name="Rectangle 19">
-            <a:extLst>
-              <a:ext uri="{FF2B5EF4-FFF2-40B4-BE49-F238E27FC236}">
-                <a16:creationId xmlns:a16="http://schemas.microsoft.com/office/drawing/2014/main" id="{6BAE310D-B37C-A241-920E-315A7306B033}"/>
-              </a:ext>
-            </a:extLst>
-          </p:cNvPr>
-          <p:cNvSpPr/>
-          <p:nvPr/>
-        </p:nvSpPr>
-        <p:spPr>
-          <a:xfrm>
-            <a:off x="1671496" y="3791917"/>
-            <a:ext cx="1524001" cy="665018"/>
-          </a:xfrm>
-          <a:prstGeom prst="rect">
-            <a:avLst/>
-          </a:prstGeom>
-          <a:solidFill>
-            <a:schemeClr val="bg1">
-              <a:lumMod val="95000"/>
-              <a:alpha val="79584"/>
-            </a:schemeClr>
-          </a:solidFill>
-          <a:ln w="38100">
-            <a:solidFill>
-              <a:schemeClr val="bg2">
-                <a:lumMod val="50000"/>
-              </a:schemeClr>
-            </a:solidFill>
-          </a:ln>
-        </p:spPr>
-        <p:style>
-          <a:lnRef idx="2">
-            <a:schemeClr val="accent1">
-              <a:shade val="50000"/>
-            </a:schemeClr>
-          </a:lnRef>
-          <a:fillRef idx="1">
-            <a:schemeClr val="accent1"/>
-          </a:fillRef>
-          <a:effectRef idx="0">
-            <a:schemeClr val="accent1"/>
-          </a:effectRef>
-          <a:fontRef idx="minor">
-            <a:schemeClr val="lt1"/>
-          </a:fontRef>
-        </p:style>
-        <p:txBody>
-          <a:bodyPr rtlCol="0" anchor="ctr"/>
-          <a:lstStyle/>
-          <a:p>
-            <a:pPr algn="ctr"/>
-            <a:r>
-              <a:rPr lang="en-US" sz="2000" dirty="0">
-                <a:solidFill>
-                  <a:schemeClr val="tx1">
-                    <a:lumMod val="85000"/>
-                    <a:lumOff val="15000"/>
-                  </a:schemeClr>
-                </a:solidFill>
-              </a:rPr>
-              <a:t>Permission</a:t>
-            </a:r>
-          </a:p>
-        </p:txBody>
-      </p:sp>
-      <p:sp>
-        <p:nvSpPr>
-          <p:cNvPr id="21" name="Down Arrow 20">
-            <a:extLst>
-              <a:ext uri="{FF2B5EF4-FFF2-40B4-BE49-F238E27FC236}">
-                <a16:creationId xmlns:a16="http://schemas.microsoft.com/office/drawing/2014/main" id="{675138C8-4353-E442-A21C-738EAB141FBE}"/>
-              </a:ext>
-            </a:extLst>
-          </p:cNvPr>
-          <p:cNvSpPr/>
-          <p:nvPr/>
-        </p:nvSpPr>
-        <p:spPr>
-          <a:xfrm rot="21000000">
-            <a:off x="2264267" y="3019065"/>
-            <a:ext cx="161365" cy="772627"/>
-          </a:xfrm>
-          <a:prstGeom prst="downArrow">
-            <a:avLst>
-              <a:gd name="adj1" fmla="val 50000"/>
-              <a:gd name="adj2" fmla="val 129998"/>
-            </a:avLst>
-          </a:prstGeom>
-          <a:solidFill>
-            <a:schemeClr val="bg1">
-              <a:lumMod val="95000"/>
-              <a:alpha val="79584"/>
-            </a:schemeClr>
-          </a:solidFill>
-          <a:ln>
-            <a:solidFill>
-              <a:schemeClr val="bg2">
-                <a:lumMod val="50000"/>
-              </a:schemeClr>
-            </a:solidFill>
-          </a:ln>
-        </p:spPr>
-        <p:style>
-          <a:lnRef idx="2">
-            <a:schemeClr val="accent1">
-              <a:shade val="50000"/>
-            </a:schemeClr>
-          </a:lnRef>
-          <a:fillRef idx="1">
-            <a:schemeClr val="accent1"/>
-          </a:fillRef>
-          <a:effectRef idx="0">
-            <a:schemeClr val="accent1"/>
-          </a:effectRef>
-          <a:fontRef idx="minor">
-            <a:schemeClr val="lt1"/>
-          </a:fontRef>
-        </p:style>
-        <p:txBody>
-          <a:bodyPr rtlCol="0" anchor="ctr"/>
-          <a:lstStyle/>
-          <a:p>
-            <a:pPr algn="ctr"/>
-            <a:endParaRPr lang="en-US"/>
-          </a:p>
-        </p:txBody>
-      </p:sp>
-      <p:sp>
-        <p:nvSpPr>
-          <p:cNvPr id="22" name="Rectangle 21">
-            <a:extLst>
-              <a:ext uri="{FF2B5EF4-FFF2-40B4-BE49-F238E27FC236}">
-                <a16:creationId xmlns:a16="http://schemas.microsoft.com/office/drawing/2014/main" id="{90B2ED0E-B620-C64A-8FFB-6879542442F6}"/>
-              </a:ext>
-            </a:extLst>
-          </p:cNvPr>
-          <p:cNvSpPr/>
-          <p:nvPr/>
-        </p:nvSpPr>
-        <p:spPr>
-          <a:xfrm>
-            <a:off x="1590819" y="3703978"/>
-            <a:ext cx="1524001" cy="665018"/>
-          </a:xfrm>
-          <a:prstGeom prst="rect">
-            <a:avLst/>
-          </a:prstGeom>
-          <a:solidFill>
-            <a:schemeClr val="bg1">
-              <a:lumMod val="95000"/>
-              <a:alpha val="79584"/>
-            </a:schemeClr>
-          </a:solidFill>
-          <a:ln w="38100">
-            <a:solidFill>
-              <a:schemeClr val="bg2">
-                <a:lumMod val="50000"/>
-              </a:schemeClr>
-            </a:solidFill>
-          </a:ln>
-        </p:spPr>
-        <p:style>
-          <a:lnRef idx="2">
-            <a:schemeClr val="accent1">
-              <a:shade val="50000"/>
-            </a:schemeClr>
-          </a:lnRef>
-          <a:fillRef idx="1">
-            <a:schemeClr val="accent1"/>
-          </a:fillRef>
-          <a:effectRef idx="0">
-            <a:schemeClr val="accent1"/>
-          </a:effectRef>
-          <a:fontRef idx="minor">
-            <a:schemeClr val="lt1"/>
-          </a:fontRef>
-        </p:style>
-        <p:txBody>
-          <a:bodyPr rtlCol="0" anchor="ctr"/>
-          <a:lstStyle/>
-          <a:p>
-            <a:pPr algn="ctr"/>
-            <a:r>
-              <a:rPr lang="en-US" sz="2000" dirty="0">
-                <a:solidFill>
-                  <a:schemeClr val="tx1">
-                    <a:lumMod val="85000"/>
-                    <a:lumOff val="15000"/>
-                  </a:schemeClr>
-                </a:solidFill>
-              </a:rPr>
-              <a:t>Permission</a:t>
-            </a:r>
-          </a:p>
-        </p:txBody>
-      </p:sp>
-      <p:sp>
-        <p:nvSpPr>
-          <p:cNvPr id="23" name="Down Arrow 22">
-            <a:extLst>
-              <a:ext uri="{FF2B5EF4-FFF2-40B4-BE49-F238E27FC236}">
-                <a16:creationId xmlns:a16="http://schemas.microsoft.com/office/drawing/2014/main" id="{09C43943-FB10-2F4E-A6DD-A0608F650847}"/>
-              </a:ext>
-            </a:extLst>
-          </p:cNvPr>
-          <p:cNvSpPr/>
-          <p:nvPr/>
-        </p:nvSpPr>
-        <p:spPr>
-          <a:xfrm rot="21300000">
-            <a:off x="2216823" y="3025004"/>
-            <a:ext cx="161365" cy="672768"/>
-          </a:xfrm>
-          <a:prstGeom prst="downArrow">
-            <a:avLst>
-              <a:gd name="adj1" fmla="val 50000"/>
-              <a:gd name="adj2" fmla="val 129998"/>
-            </a:avLst>
-          </a:prstGeom>
-          <a:solidFill>
-            <a:schemeClr val="bg1">
-              <a:lumMod val="95000"/>
-              <a:alpha val="79584"/>
-            </a:schemeClr>
-          </a:solidFill>
-          <a:ln>
-            <a:solidFill>
-              <a:schemeClr val="bg2">
-                <a:lumMod val="50000"/>
-              </a:schemeClr>
-            </a:solidFill>
-          </a:ln>
-        </p:spPr>
-        <p:style>
-          <a:lnRef idx="2">
-            <a:schemeClr val="accent1">
-              <a:shade val="50000"/>
-            </a:schemeClr>
-          </a:lnRef>
-          <a:fillRef idx="1">
-            <a:schemeClr val="accent1"/>
-          </a:fillRef>
-          <a:effectRef idx="0">
-            <a:schemeClr val="accent1"/>
-          </a:effectRef>
-          <a:fontRef idx="minor">
-            <a:schemeClr val="lt1"/>
-          </a:fontRef>
-        </p:style>
-        <p:txBody>
-          <a:bodyPr rtlCol="0" anchor="ctr"/>
-          <a:lstStyle/>
-          <a:p>
-            <a:pPr algn="ctr"/>
-            <a:endParaRPr lang="en-US"/>
-          </a:p>
-        </p:txBody>
-      </p:sp>
-      <p:sp>
-        <p:nvSpPr>
-          <p:cNvPr id="6" name="Rectangle 5">
-            <a:extLst>
-              <a:ext uri="{FF2B5EF4-FFF2-40B4-BE49-F238E27FC236}">
-                <a16:creationId xmlns:a16="http://schemas.microsoft.com/office/drawing/2014/main" id="{292A8187-D086-6241-BD43-8F4A54EACBD1}"/>
-              </a:ext>
-            </a:extLst>
-          </p:cNvPr>
-          <p:cNvSpPr/>
-          <p:nvPr/>
-        </p:nvSpPr>
-        <p:spPr>
-          <a:xfrm>
-            <a:off x="1510142" y="3616039"/>
-            <a:ext cx="1524001" cy="665018"/>
-          </a:xfrm>
-          <a:prstGeom prst="rect">
-            <a:avLst/>
-          </a:prstGeom>
-          <a:solidFill>
-            <a:schemeClr val="bg1">
-              <a:lumMod val="95000"/>
-              <a:alpha val="79584"/>
-            </a:schemeClr>
-          </a:solidFill>
-          <a:ln w="38100">
-            <a:solidFill>
-              <a:schemeClr val="bg2">
-                <a:lumMod val="50000"/>
-              </a:schemeClr>
-            </a:solidFill>
-          </a:ln>
-        </p:spPr>
-        <p:style>
-          <a:lnRef idx="2">
-            <a:schemeClr val="accent1">
-              <a:shade val="50000"/>
-            </a:schemeClr>
-          </a:lnRef>
-          <a:fillRef idx="1">
-            <a:schemeClr val="accent1"/>
-          </a:fillRef>
-          <a:effectRef idx="0">
-            <a:schemeClr val="accent1"/>
-          </a:effectRef>
-          <a:fontRef idx="minor">
-            <a:schemeClr val="lt1"/>
-          </a:fontRef>
-        </p:style>
-        <p:txBody>
-          <a:bodyPr rtlCol="0" anchor="ctr"/>
-          <a:lstStyle/>
-          <a:p>
-            <a:pPr algn="ctr"/>
-            <a:r>
-              <a:rPr lang="en-US" sz="2000" dirty="0">
-                <a:solidFill>
-                  <a:schemeClr val="tx1">
-                    <a:lumMod val="85000"/>
-                    <a:lumOff val="15000"/>
-                  </a:schemeClr>
-                </a:solidFill>
-              </a:rPr>
-              <a:t>Permission</a:t>
-            </a:r>
-          </a:p>
-        </p:txBody>
-      </p:sp>
-      <p:sp>
-        <p:nvSpPr>
-          <p:cNvPr id="18" name="Down Arrow 17">
-            <a:extLst>
-              <a:ext uri="{FF2B5EF4-FFF2-40B4-BE49-F238E27FC236}">
-                <a16:creationId xmlns:a16="http://schemas.microsoft.com/office/drawing/2014/main" id="{A8DAD2EC-3E9B-E942-96A2-159C54469EE2}"/>
-              </a:ext>
-            </a:extLst>
-          </p:cNvPr>
-          <p:cNvSpPr/>
-          <p:nvPr/>
-        </p:nvSpPr>
-        <p:spPr>
-          <a:xfrm>
-            <a:off x="2191459" y="3029199"/>
-            <a:ext cx="161365" cy="581892"/>
-          </a:xfrm>
-          <a:prstGeom prst="downArrow">
-            <a:avLst>
-              <a:gd name="adj1" fmla="val 50000"/>
-              <a:gd name="adj2" fmla="val 129998"/>
-            </a:avLst>
-          </a:prstGeom>
-          <a:solidFill>
-            <a:schemeClr val="bg1">
-              <a:lumMod val="95000"/>
-              <a:alpha val="79584"/>
-            </a:schemeClr>
-          </a:solidFill>
-          <a:ln>
-            <a:solidFill>
-              <a:schemeClr val="bg2">
-                <a:lumMod val="50000"/>
-              </a:schemeClr>
-            </a:solidFill>
-          </a:ln>
-        </p:spPr>
-        <p:style>
-          <a:lnRef idx="2">
-            <a:schemeClr val="accent1">
-              <a:shade val="50000"/>
-            </a:schemeClr>
-          </a:lnRef>
-          <a:fillRef idx="1">
-            <a:schemeClr val="accent1"/>
-          </a:fillRef>
-          <a:effectRef idx="0">
-            <a:schemeClr val="accent1"/>
-          </a:effectRef>
-          <a:fontRef idx="minor">
-            <a:schemeClr val="lt1"/>
-          </a:fontRef>
-        </p:style>
-        <p:txBody>
-          <a:bodyPr rtlCol="0" anchor="ctr"/>
-          <a:lstStyle/>
-          <a:p>
-            <a:pPr algn="ctr"/>
-            <a:endParaRPr lang="en-US"/>
-          </a:p>
-        </p:txBody>
-      </p:sp>
-      <p:sp>
-        <p:nvSpPr>
-          <p:cNvPr id="7" name="Rectangle 6">
-            <a:extLst>
-              <a:ext uri="{FF2B5EF4-FFF2-40B4-BE49-F238E27FC236}">
-                <a16:creationId xmlns:a16="http://schemas.microsoft.com/office/drawing/2014/main" id="{084195EB-CEC7-3642-9E4F-07763E9EF4CC}"/>
-              </a:ext>
-            </a:extLst>
-          </p:cNvPr>
-          <p:cNvSpPr/>
-          <p:nvPr/>
-        </p:nvSpPr>
-        <p:spPr>
-          <a:xfrm>
-            <a:off x="1510142" y="4862949"/>
-            <a:ext cx="1524001" cy="665018"/>
-          </a:xfrm>
-          <a:prstGeom prst="rect">
-            <a:avLst/>
-          </a:prstGeom>
-          <a:solidFill>
-            <a:schemeClr val="bg1">
-              <a:lumMod val="95000"/>
-              <a:alpha val="79584"/>
-            </a:schemeClr>
-          </a:solidFill>
-          <a:ln w="38100">
-            <a:solidFill>
-              <a:schemeClr val="bg2">
-                <a:lumMod val="50000"/>
-              </a:schemeClr>
-            </a:solidFill>
-          </a:ln>
-        </p:spPr>
-        <p:style>
-          <a:lnRef idx="2">
-            <a:schemeClr val="accent1">
-              <a:shade val="50000"/>
-            </a:schemeClr>
-          </a:lnRef>
-          <a:fillRef idx="1">
-            <a:schemeClr val="accent1"/>
-          </a:fillRef>
-          <a:effectRef idx="0">
-            <a:schemeClr val="accent1"/>
-          </a:effectRef>
-          <a:fontRef idx="minor">
-            <a:schemeClr val="lt1"/>
-          </a:fontRef>
-        </p:style>
-        <p:txBody>
-          <a:bodyPr rtlCol="0" anchor="ctr"/>
-          <a:lstStyle/>
-          <a:p>
-            <a:pPr algn="ctr"/>
-            <a:r>
-              <a:rPr lang="en-US" sz="2000" dirty="0">
-                <a:solidFill>
-                  <a:schemeClr val="tx1">
-                    <a:lumMod val="85000"/>
-                    <a:lumOff val="15000"/>
-                  </a:schemeClr>
-                </a:solidFill>
-              </a:rPr>
-              <a:t>Capability</a:t>
-            </a:r>
-          </a:p>
-        </p:txBody>
-      </p:sp>
-      <p:sp>
-        <p:nvSpPr>
-          <p:cNvPr id="17" name="Down Arrow 16">
-            <a:extLst>
-              <a:ext uri="{FF2B5EF4-FFF2-40B4-BE49-F238E27FC236}">
-                <a16:creationId xmlns:a16="http://schemas.microsoft.com/office/drawing/2014/main" id="{79138125-78FD-2843-9EDB-DB6D8C3820EA}"/>
-              </a:ext>
-            </a:extLst>
-          </p:cNvPr>
-          <p:cNvSpPr/>
-          <p:nvPr/>
-        </p:nvSpPr>
-        <p:spPr>
-          <a:xfrm>
-            <a:off x="2191458" y="4281057"/>
-            <a:ext cx="161365" cy="581892"/>
-          </a:xfrm>
-          <a:prstGeom prst="downArrow">
-            <a:avLst>
-              <a:gd name="adj1" fmla="val 50000"/>
-              <a:gd name="adj2" fmla="val 129998"/>
-            </a:avLst>
-          </a:prstGeom>
-          <a:solidFill>
-            <a:schemeClr val="bg1">
-              <a:lumMod val="95000"/>
-              <a:alpha val="79584"/>
-            </a:schemeClr>
-          </a:solidFill>
-          <a:ln>
-            <a:solidFill>
-              <a:schemeClr val="bg2">
-                <a:lumMod val="50000"/>
-              </a:schemeClr>
-            </a:solidFill>
-          </a:ln>
-        </p:spPr>
-        <p:style>
-          <a:lnRef idx="2">
-            <a:schemeClr val="accent1">
-              <a:shade val="50000"/>
-            </a:schemeClr>
-          </a:lnRef>
-          <a:fillRef idx="1">
-            <a:schemeClr val="accent1"/>
-          </a:fillRef>
-          <a:effectRef idx="0">
-            <a:schemeClr val="accent1"/>
-          </a:effectRef>
-          <a:fontRef idx="minor">
-            <a:schemeClr val="lt1"/>
-          </a:fontRef>
-        </p:style>
-        <p:txBody>
-          <a:bodyPr rtlCol="0" anchor="ctr"/>
-          <a:lstStyle/>
-          <a:p>
-            <a:pPr algn="ctr"/>
-            <a:endParaRPr lang="en-US"/>
-          </a:p>
-        </p:txBody>
-      </p:sp>
-    </p:spTree>
-    <p:extLst>
-      <p:ext uri="{BB962C8B-B14F-4D97-AF65-F5344CB8AC3E}">
-        <p14:creationId xmlns:p14="http://schemas.microsoft.com/office/powerpoint/2010/main" val="1793701406"/>
-      </p:ext>
-    </p:extLst>
-  </p:cSld>
-  <p:clrMapOvr>
-    <a:masterClrMapping/>
-  </p:clrMapOvr>
-</p:sld>
-</file>
-
-<file path=ppt/slides/slide8.xml><?xml version="1.0" encoding="utf-8"?>
-<p:sld xmlns:a="http://schemas.openxmlformats.org/drawingml/2006/main" xmlns:r="http://schemas.openxmlformats.org/officeDocument/2006/relationships" xmlns:p="http://schemas.openxmlformats.org/presentationml/2006/main">
-  <p:cSld>
-    <p:spTree>
-      <p:nvGrpSpPr>
-        <p:cNvPr id="1" name=""/>
-        <p:cNvGrpSpPr/>
-        <p:nvPr/>
-      </p:nvGrpSpPr>
-      <p:grpSpPr>
-        <a:xfrm>
-          <a:off x="0" y="0"/>
-          <a:ext cx="0" cy="0"/>
-          <a:chOff x="0" y="0"/>
-          <a:chExt cx="0" cy="0"/>
-        </a:xfrm>
-      </p:grpSpPr>
-      <p:sp>
-        <p:nvSpPr>
-          <p:cNvPr id="11" name="Rectangle 10">
-            <a:extLst>
-              <a:ext uri="{FF2B5EF4-FFF2-40B4-BE49-F238E27FC236}">
-                <a16:creationId xmlns:a16="http://schemas.microsoft.com/office/drawing/2014/main" id="{F5DFF4CB-98E1-FF48-A069-97B4154B328B}"/>
-              </a:ext>
-            </a:extLst>
-          </p:cNvPr>
-          <p:cNvSpPr/>
-          <p:nvPr/>
-        </p:nvSpPr>
-        <p:spPr>
-          <a:xfrm>
-            <a:off x="1752176" y="2632947"/>
-            <a:ext cx="1524001" cy="665018"/>
-          </a:xfrm>
-          <a:prstGeom prst="rect">
-            <a:avLst/>
-          </a:prstGeom>
-          <a:solidFill>
-            <a:schemeClr val="bg1">
-              <a:lumMod val="95000"/>
-              <a:alpha val="79584"/>
-            </a:schemeClr>
-          </a:solidFill>
-          <a:ln w="38100">
-            <a:solidFill>
-              <a:schemeClr val="bg2">
-                <a:lumMod val="50000"/>
-              </a:schemeClr>
-            </a:solidFill>
-          </a:ln>
-        </p:spPr>
-        <p:style>
-          <a:lnRef idx="2">
-            <a:schemeClr val="accent1">
-              <a:shade val="50000"/>
-            </a:schemeClr>
-          </a:lnRef>
-          <a:fillRef idx="1">
-            <a:schemeClr val="accent1"/>
-          </a:fillRef>
-          <a:effectRef idx="0">
-            <a:schemeClr val="accent1"/>
-          </a:effectRef>
-          <a:fontRef idx="minor">
-            <a:schemeClr val="lt1"/>
-          </a:fontRef>
-        </p:style>
-        <p:txBody>
-          <a:bodyPr rtlCol="0" anchor="ctr"/>
-          <a:lstStyle/>
-          <a:p>
-            <a:pPr algn="ctr"/>
-            <a:r>
-              <a:rPr lang="en-US" sz="2000" dirty="0">
-                <a:solidFill>
-                  <a:schemeClr val="tx1">
-                    <a:lumMod val="85000"/>
-                    <a:lumOff val="15000"/>
-                  </a:schemeClr>
-                </a:solidFill>
-              </a:rPr>
-              <a:t>Role</a:t>
-            </a:r>
-          </a:p>
-        </p:txBody>
-      </p:sp>
-      <p:sp>
-        <p:nvSpPr>
-          <p:cNvPr id="14" name="Down Arrow 13">
-            <a:extLst>
-              <a:ext uri="{FF2B5EF4-FFF2-40B4-BE49-F238E27FC236}">
-                <a16:creationId xmlns:a16="http://schemas.microsoft.com/office/drawing/2014/main" id="{7401979E-EFD4-3B4A-B5AE-34BF68CA615C}"/>
-              </a:ext>
-            </a:extLst>
-          </p:cNvPr>
-          <p:cNvSpPr/>
-          <p:nvPr/>
-        </p:nvSpPr>
-        <p:spPr>
-          <a:xfrm rot="20675198">
-            <a:off x="2302962" y="1764165"/>
-            <a:ext cx="161365" cy="888316"/>
-          </a:xfrm>
-          <a:prstGeom prst="downArrow">
-            <a:avLst>
-              <a:gd name="adj1" fmla="val 50000"/>
-              <a:gd name="adj2" fmla="val 129998"/>
-            </a:avLst>
-          </a:prstGeom>
-          <a:solidFill>
-            <a:schemeClr val="bg1">
-              <a:lumMod val="95000"/>
-              <a:alpha val="79584"/>
-            </a:schemeClr>
-          </a:solidFill>
-          <a:ln>
-            <a:solidFill>
-              <a:schemeClr val="bg2">
-                <a:lumMod val="50000"/>
-              </a:schemeClr>
-            </a:solidFill>
-          </a:ln>
-        </p:spPr>
-        <p:style>
-          <a:lnRef idx="2">
-            <a:schemeClr val="accent1">
-              <a:shade val="50000"/>
-            </a:schemeClr>
-          </a:lnRef>
-          <a:fillRef idx="1">
-            <a:schemeClr val="accent1"/>
-          </a:fillRef>
-          <a:effectRef idx="0">
-            <a:schemeClr val="accent1"/>
-          </a:effectRef>
-          <a:fontRef idx="minor">
-            <a:schemeClr val="lt1"/>
-          </a:fontRef>
-        </p:style>
-        <p:txBody>
-          <a:bodyPr rtlCol="0" anchor="ctr"/>
-          <a:lstStyle/>
-          <a:p>
-            <a:pPr algn="ctr"/>
-            <a:endParaRPr lang="en-US"/>
-          </a:p>
-        </p:txBody>
-      </p:sp>
-      <p:sp>
-        <p:nvSpPr>
-          <p:cNvPr id="10" name="Rectangle 9">
-            <a:extLst>
-              <a:ext uri="{FF2B5EF4-FFF2-40B4-BE49-F238E27FC236}">
-                <a16:creationId xmlns:a16="http://schemas.microsoft.com/office/drawing/2014/main" id="{B7F1EEC2-724B-1848-91A6-1DFD50EBDEE6}"/>
-              </a:ext>
-            </a:extLst>
-          </p:cNvPr>
-          <p:cNvSpPr/>
-          <p:nvPr/>
-        </p:nvSpPr>
-        <p:spPr>
-          <a:xfrm>
-            <a:off x="1671499" y="2545007"/>
-            <a:ext cx="1524001" cy="665018"/>
-          </a:xfrm>
-          <a:prstGeom prst="rect">
-            <a:avLst/>
-          </a:prstGeom>
-          <a:solidFill>
-            <a:schemeClr val="bg1">
-              <a:lumMod val="95000"/>
-              <a:alpha val="79584"/>
-            </a:schemeClr>
-          </a:solidFill>
-          <a:ln w="38100">
-            <a:solidFill>
-              <a:schemeClr val="bg2">
-                <a:lumMod val="50000"/>
-              </a:schemeClr>
-            </a:solidFill>
-          </a:ln>
-        </p:spPr>
-        <p:style>
-          <a:lnRef idx="2">
-            <a:schemeClr val="accent1">
-              <a:shade val="50000"/>
-            </a:schemeClr>
-          </a:lnRef>
-          <a:fillRef idx="1">
-            <a:schemeClr val="accent1"/>
-          </a:fillRef>
-          <a:effectRef idx="0">
-            <a:schemeClr val="accent1"/>
-          </a:effectRef>
-          <a:fontRef idx="minor">
-            <a:schemeClr val="lt1"/>
-          </a:fontRef>
-        </p:style>
-        <p:txBody>
-          <a:bodyPr rtlCol="0" anchor="ctr"/>
-          <a:lstStyle/>
-          <a:p>
-            <a:pPr algn="ctr"/>
-            <a:r>
-              <a:rPr lang="en-US" sz="2000" dirty="0">
-                <a:solidFill>
-                  <a:schemeClr val="tx1">
-                    <a:lumMod val="85000"/>
-                    <a:lumOff val="15000"/>
-                  </a:schemeClr>
-                </a:solidFill>
-              </a:rPr>
-              <a:t>Role</a:t>
-            </a:r>
-          </a:p>
-        </p:txBody>
-      </p:sp>
-      <p:sp>
-        <p:nvSpPr>
-          <p:cNvPr id="13" name="Down Arrow 12">
-            <a:extLst>
-              <a:ext uri="{FF2B5EF4-FFF2-40B4-BE49-F238E27FC236}">
-                <a16:creationId xmlns:a16="http://schemas.microsoft.com/office/drawing/2014/main" id="{B4CDB232-AE9B-3D4F-B146-8B666553560E}"/>
-              </a:ext>
-            </a:extLst>
-          </p:cNvPr>
-          <p:cNvSpPr/>
-          <p:nvPr/>
-        </p:nvSpPr>
-        <p:spPr>
-          <a:xfrm rot="21000000">
-            <a:off x="2264270" y="1772155"/>
-            <a:ext cx="161365" cy="772627"/>
-          </a:xfrm>
-          <a:prstGeom prst="downArrow">
-            <a:avLst>
-              <a:gd name="adj1" fmla="val 50000"/>
-              <a:gd name="adj2" fmla="val 129998"/>
-            </a:avLst>
-          </a:prstGeom>
-          <a:solidFill>
-            <a:schemeClr val="bg1">
-              <a:lumMod val="95000"/>
-              <a:alpha val="79584"/>
-            </a:schemeClr>
-          </a:solidFill>
-          <a:ln>
-            <a:solidFill>
-              <a:schemeClr val="bg2">
-                <a:lumMod val="50000"/>
-              </a:schemeClr>
-            </a:solidFill>
-          </a:ln>
-        </p:spPr>
-        <p:style>
-          <a:lnRef idx="2">
-            <a:schemeClr val="accent1">
-              <a:shade val="50000"/>
-            </a:schemeClr>
-          </a:lnRef>
-          <a:fillRef idx="1">
-            <a:schemeClr val="accent1"/>
-          </a:fillRef>
-          <a:effectRef idx="0">
-            <a:schemeClr val="accent1"/>
-          </a:effectRef>
-          <a:fontRef idx="minor">
-            <a:schemeClr val="lt1"/>
-          </a:fontRef>
-        </p:style>
-        <p:txBody>
-          <a:bodyPr rtlCol="0" anchor="ctr"/>
-          <a:lstStyle/>
-          <a:p>
-            <a:pPr algn="ctr"/>
-            <a:endParaRPr lang="en-US"/>
-          </a:p>
-        </p:txBody>
-      </p:sp>
-      <p:sp>
-        <p:nvSpPr>
-          <p:cNvPr id="9" name="Rectangle 8">
-            <a:extLst>
-              <a:ext uri="{FF2B5EF4-FFF2-40B4-BE49-F238E27FC236}">
-                <a16:creationId xmlns:a16="http://schemas.microsoft.com/office/drawing/2014/main" id="{6F7D0253-8737-834F-8F03-1696179FCA7C}"/>
-              </a:ext>
-            </a:extLst>
-          </p:cNvPr>
-          <p:cNvSpPr/>
-          <p:nvPr/>
-        </p:nvSpPr>
-        <p:spPr>
-          <a:xfrm>
-            <a:off x="1590822" y="2457068"/>
-            <a:ext cx="1524001" cy="665018"/>
-          </a:xfrm>
-          <a:prstGeom prst="rect">
-            <a:avLst/>
-          </a:prstGeom>
-          <a:solidFill>
-            <a:schemeClr val="bg1">
-              <a:lumMod val="95000"/>
-              <a:alpha val="79584"/>
-            </a:schemeClr>
-          </a:solidFill>
-          <a:ln w="38100">
-            <a:solidFill>
-              <a:schemeClr val="bg2">
-                <a:lumMod val="50000"/>
-              </a:schemeClr>
-            </a:solidFill>
-          </a:ln>
-        </p:spPr>
-        <p:style>
-          <a:lnRef idx="2">
-            <a:schemeClr val="accent1">
-              <a:shade val="50000"/>
-            </a:schemeClr>
-          </a:lnRef>
-          <a:fillRef idx="1">
-            <a:schemeClr val="accent1"/>
-          </a:fillRef>
-          <a:effectRef idx="0">
-            <a:schemeClr val="accent1"/>
-          </a:effectRef>
-          <a:fontRef idx="minor">
-            <a:schemeClr val="lt1"/>
-          </a:fontRef>
-        </p:style>
-        <p:txBody>
-          <a:bodyPr rtlCol="0" anchor="ctr"/>
-          <a:lstStyle/>
-          <a:p>
-            <a:pPr algn="ctr"/>
-            <a:r>
-              <a:rPr lang="en-US" sz="2000" dirty="0">
-                <a:solidFill>
-                  <a:schemeClr val="tx1">
-                    <a:lumMod val="85000"/>
-                    <a:lumOff val="15000"/>
-                  </a:schemeClr>
-                </a:solidFill>
-              </a:rPr>
-              <a:t>Role</a:t>
-            </a:r>
-          </a:p>
-        </p:txBody>
-      </p:sp>
-      <p:sp>
-        <p:nvSpPr>
-          <p:cNvPr id="12" name="Down Arrow 11">
-            <a:extLst>
-              <a:ext uri="{FF2B5EF4-FFF2-40B4-BE49-F238E27FC236}">
-                <a16:creationId xmlns:a16="http://schemas.microsoft.com/office/drawing/2014/main" id="{6CFDBBEA-1C60-B94C-BA5B-0530357207B3}"/>
-              </a:ext>
-            </a:extLst>
-          </p:cNvPr>
-          <p:cNvSpPr/>
-          <p:nvPr/>
-        </p:nvSpPr>
-        <p:spPr>
-          <a:xfrm rot="21300000">
-            <a:off x="2216826" y="1778094"/>
-            <a:ext cx="161365" cy="672768"/>
-          </a:xfrm>
-          <a:prstGeom prst="downArrow">
-            <a:avLst>
-              <a:gd name="adj1" fmla="val 50000"/>
-              <a:gd name="adj2" fmla="val 129998"/>
-            </a:avLst>
-          </a:prstGeom>
-          <a:solidFill>
-            <a:schemeClr val="bg1">
-              <a:lumMod val="95000"/>
-              <a:alpha val="79584"/>
-            </a:schemeClr>
-          </a:solidFill>
-          <a:ln>
-            <a:solidFill>
-              <a:schemeClr val="bg2">
-                <a:lumMod val="50000"/>
-              </a:schemeClr>
-            </a:solidFill>
-          </a:ln>
-        </p:spPr>
-        <p:style>
-          <a:lnRef idx="2">
-            <a:schemeClr val="accent1">
-              <a:shade val="50000"/>
-            </a:schemeClr>
-          </a:lnRef>
-          <a:fillRef idx="1">
-            <a:schemeClr val="accent1"/>
-          </a:fillRef>
-          <a:effectRef idx="0">
-            <a:schemeClr val="accent1"/>
-          </a:effectRef>
-          <a:fontRef idx="minor">
-            <a:schemeClr val="lt1"/>
-          </a:fontRef>
-        </p:style>
-        <p:txBody>
-          <a:bodyPr rtlCol="0" anchor="ctr"/>
-          <a:lstStyle/>
-          <a:p>
-            <a:pPr algn="ctr"/>
-            <a:endParaRPr lang="en-US"/>
-          </a:p>
-        </p:txBody>
-      </p:sp>
-      <p:sp>
-        <p:nvSpPr>
-          <p:cNvPr id="2" name="Rectangle 1">
-            <a:extLst>
-              <a:ext uri="{FF2B5EF4-FFF2-40B4-BE49-F238E27FC236}">
-                <a16:creationId xmlns:a16="http://schemas.microsoft.com/office/drawing/2014/main" id="{9B7387F5-ACA9-7141-97D3-A62F3221BA74}"/>
-              </a:ext>
-            </a:extLst>
-          </p:cNvPr>
-          <p:cNvSpPr/>
-          <p:nvPr/>
-        </p:nvSpPr>
-        <p:spPr>
-          <a:xfrm>
-            <a:off x="1510145" y="1122219"/>
-            <a:ext cx="1524001" cy="665018"/>
-          </a:xfrm>
-          <a:prstGeom prst="rect">
-            <a:avLst/>
-          </a:prstGeom>
-          <a:solidFill>
-            <a:schemeClr val="bg1">
-              <a:lumMod val="95000"/>
-              <a:alpha val="79584"/>
-            </a:schemeClr>
-          </a:solidFill>
-          <a:ln w="38100">
-            <a:solidFill>
-              <a:schemeClr val="bg2">
-                <a:lumMod val="50000"/>
-              </a:schemeClr>
-            </a:solidFill>
-          </a:ln>
-        </p:spPr>
-        <p:style>
-          <a:lnRef idx="2">
-            <a:schemeClr val="accent1">
-              <a:shade val="50000"/>
-            </a:schemeClr>
-          </a:lnRef>
-          <a:fillRef idx="1">
-            <a:schemeClr val="accent1"/>
-          </a:fillRef>
-          <a:effectRef idx="0">
-            <a:schemeClr val="accent1"/>
-          </a:effectRef>
-          <a:fontRef idx="minor">
-            <a:schemeClr val="lt1"/>
-          </a:fontRef>
-        </p:style>
-        <p:txBody>
-          <a:bodyPr rtlCol="0" anchor="ctr"/>
-          <a:lstStyle/>
-          <a:p>
-            <a:pPr algn="ctr"/>
-            <a:r>
-              <a:rPr lang="en-US" sz="2000" dirty="0">
-                <a:solidFill>
-                  <a:schemeClr val="tx1">
-                    <a:lumMod val="85000"/>
-                    <a:lumOff val="15000"/>
-                  </a:schemeClr>
-                </a:solidFill>
-              </a:rPr>
-              <a:t>User</a:t>
-            </a:r>
-          </a:p>
-        </p:txBody>
-      </p:sp>
-      <p:sp>
-        <p:nvSpPr>
-          <p:cNvPr id="5" name="Rectangle 4">
-            <a:extLst>
-              <a:ext uri="{FF2B5EF4-FFF2-40B4-BE49-F238E27FC236}">
-                <a16:creationId xmlns:a16="http://schemas.microsoft.com/office/drawing/2014/main" id="{D1CCEEB6-0FB9-4C4E-A7F2-C6729B9FC8EA}"/>
-              </a:ext>
-            </a:extLst>
-          </p:cNvPr>
-          <p:cNvSpPr/>
-          <p:nvPr/>
-        </p:nvSpPr>
-        <p:spPr>
-          <a:xfrm>
-            <a:off x="1510145" y="2369129"/>
-            <a:ext cx="1524001" cy="665018"/>
-          </a:xfrm>
-          <a:prstGeom prst="rect">
-            <a:avLst/>
-          </a:prstGeom>
-          <a:solidFill>
-            <a:schemeClr val="bg1">
-              <a:lumMod val="95000"/>
-              <a:alpha val="79584"/>
-            </a:schemeClr>
-          </a:solidFill>
-          <a:ln w="38100">
-            <a:solidFill>
-              <a:schemeClr val="bg2">
-                <a:lumMod val="50000"/>
-              </a:schemeClr>
-            </a:solidFill>
-          </a:ln>
-        </p:spPr>
-        <p:style>
-          <a:lnRef idx="2">
-            <a:schemeClr val="accent1">
-              <a:shade val="50000"/>
-            </a:schemeClr>
-          </a:lnRef>
-          <a:fillRef idx="1">
-            <a:schemeClr val="accent1"/>
-          </a:fillRef>
-          <a:effectRef idx="0">
-            <a:schemeClr val="accent1"/>
-          </a:effectRef>
-          <a:fontRef idx="minor">
-            <a:schemeClr val="lt1"/>
-          </a:fontRef>
-        </p:style>
-        <p:txBody>
-          <a:bodyPr rtlCol="0" anchor="ctr"/>
-          <a:lstStyle/>
-          <a:p>
-            <a:pPr algn="ctr"/>
-            <a:r>
-              <a:rPr lang="en-US" sz="2000" dirty="0">
-                <a:solidFill>
-                  <a:schemeClr val="tx1">
-                    <a:lumMod val="85000"/>
-                    <a:lumOff val="15000"/>
-                  </a:schemeClr>
-                </a:solidFill>
-              </a:rPr>
-              <a:t>Role</a:t>
-            </a:r>
-          </a:p>
-        </p:txBody>
-      </p:sp>
-      <p:sp>
-        <p:nvSpPr>
-          <p:cNvPr id="15" name="Down Arrow 14">
-            <a:extLst>
-              <a:ext uri="{FF2B5EF4-FFF2-40B4-BE49-F238E27FC236}">
-                <a16:creationId xmlns:a16="http://schemas.microsoft.com/office/drawing/2014/main" id="{03FE2F9B-D768-9846-AF7E-C97F162AF435}"/>
-              </a:ext>
-            </a:extLst>
-          </p:cNvPr>
-          <p:cNvSpPr/>
-          <p:nvPr/>
-        </p:nvSpPr>
-        <p:spPr>
-          <a:xfrm>
-            <a:off x="2191459" y="1787237"/>
-            <a:ext cx="161365" cy="581892"/>
-          </a:xfrm>
-          <a:prstGeom prst="downArrow">
-            <a:avLst>
-              <a:gd name="adj1" fmla="val 50000"/>
-              <a:gd name="adj2" fmla="val 129998"/>
-            </a:avLst>
-          </a:prstGeom>
-          <a:solidFill>
-            <a:schemeClr val="bg1">
-              <a:lumMod val="95000"/>
-              <a:alpha val="79584"/>
-            </a:schemeClr>
-          </a:solidFill>
-          <a:ln>
-            <a:solidFill>
-              <a:schemeClr val="bg2">
-                <a:lumMod val="50000"/>
-              </a:schemeClr>
-            </a:solidFill>
-          </a:ln>
-        </p:spPr>
-        <p:style>
-          <a:lnRef idx="2">
-            <a:schemeClr val="accent1">
-              <a:shade val="50000"/>
-            </a:schemeClr>
-          </a:lnRef>
-          <a:fillRef idx="1">
-            <a:schemeClr val="accent1"/>
-          </a:fillRef>
-          <a:effectRef idx="0">
-            <a:schemeClr val="accent1"/>
-          </a:effectRef>
-          <a:fontRef idx="minor">
-            <a:schemeClr val="lt1"/>
-          </a:fontRef>
-        </p:style>
-        <p:txBody>
-          <a:bodyPr rtlCol="0" anchor="ctr"/>
-          <a:lstStyle/>
-          <a:p>
-            <a:pPr algn="ctr"/>
-            <a:endParaRPr lang="en-US"/>
-          </a:p>
-        </p:txBody>
-      </p:sp>
-      <p:sp>
-        <p:nvSpPr>
-          <p:cNvPr id="16" name="Rectangle 15">
-            <a:extLst>
-              <a:ext uri="{FF2B5EF4-FFF2-40B4-BE49-F238E27FC236}">
-                <a16:creationId xmlns:a16="http://schemas.microsoft.com/office/drawing/2014/main" id="{A5CA0DB8-57EB-C840-9FDD-2EBAFE84633F}"/>
-              </a:ext>
-            </a:extLst>
-          </p:cNvPr>
-          <p:cNvSpPr/>
-          <p:nvPr/>
-        </p:nvSpPr>
-        <p:spPr>
-          <a:xfrm>
-            <a:off x="1752173" y="3879857"/>
-            <a:ext cx="1524001" cy="665018"/>
-          </a:xfrm>
-          <a:prstGeom prst="rect">
-            <a:avLst/>
-          </a:prstGeom>
-          <a:solidFill>
-            <a:schemeClr val="bg1">
-              <a:lumMod val="95000"/>
-              <a:alpha val="79584"/>
-            </a:schemeClr>
-          </a:solidFill>
-          <a:ln w="38100">
-            <a:solidFill>
-              <a:schemeClr val="bg2">
-                <a:lumMod val="50000"/>
-              </a:schemeClr>
-            </a:solidFill>
-          </a:ln>
-        </p:spPr>
-        <p:style>
-          <a:lnRef idx="2">
-            <a:schemeClr val="accent1">
-              <a:shade val="50000"/>
-            </a:schemeClr>
-          </a:lnRef>
-          <a:fillRef idx="1">
-            <a:schemeClr val="accent1"/>
-          </a:fillRef>
-          <a:effectRef idx="0">
-            <a:schemeClr val="accent1"/>
-          </a:effectRef>
-          <a:fontRef idx="minor">
-            <a:schemeClr val="lt1"/>
-          </a:fontRef>
-        </p:style>
-        <p:txBody>
-          <a:bodyPr rtlCol="0" anchor="ctr"/>
-          <a:lstStyle/>
-          <a:p>
-            <a:pPr algn="ctr"/>
-            <a:r>
-              <a:rPr lang="en-US" sz="2000" dirty="0">
-                <a:solidFill>
-                  <a:schemeClr val="tx1">
-                    <a:lumMod val="85000"/>
-                    <a:lumOff val="15000"/>
-                  </a:schemeClr>
-                </a:solidFill>
-              </a:rPr>
-              <a:t>Permission</a:t>
-            </a:r>
-          </a:p>
-        </p:txBody>
-      </p:sp>
-      <p:sp>
-        <p:nvSpPr>
-          <p:cNvPr id="19" name="Down Arrow 18">
-            <a:extLst>
-              <a:ext uri="{FF2B5EF4-FFF2-40B4-BE49-F238E27FC236}">
-                <a16:creationId xmlns:a16="http://schemas.microsoft.com/office/drawing/2014/main" id="{F937787E-F591-AB4A-AA83-E0EA75AB4B38}"/>
-              </a:ext>
-            </a:extLst>
-          </p:cNvPr>
-          <p:cNvSpPr/>
-          <p:nvPr/>
-        </p:nvSpPr>
-        <p:spPr>
-          <a:xfrm rot="20675198">
-            <a:off x="2302959" y="3011075"/>
-            <a:ext cx="161365" cy="888316"/>
-          </a:xfrm>
-          <a:prstGeom prst="downArrow">
-            <a:avLst>
-              <a:gd name="adj1" fmla="val 50000"/>
-              <a:gd name="adj2" fmla="val 129998"/>
-            </a:avLst>
-          </a:prstGeom>
-          <a:solidFill>
-            <a:schemeClr val="bg1">
-              <a:lumMod val="95000"/>
-              <a:alpha val="79584"/>
-            </a:schemeClr>
-          </a:solidFill>
-          <a:ln>
-            <a:solidFill>
-              <a:schemeClr val="bg2">
-                <a:lumMod val="50000"/>
-              </a:schemeClr>
-            </a:solidFill>
-          </a:ln>
-        </p:spPr>
-        <p:style>
-          <a:lnRef idx="2">
-            <a:schemeClr val="accent1">
-              <a:shade val="50000"/>
-            </a:schemeClr>
-          </a:lnRef>
-          <a:fillRef idx="1">
-            <a:schemeClr val="accent1"/>
-          </a:fillRef>
-          <a:effectRef idx="0">
-            <a:schemeClr val="accent1"/>
-          </a:effectRef>
-          <a:fontRef idx="minor">
-            <a:schemeClr val="lt1"/>
-          </a:fontRef>
-        </p:style>
-        <p:txBody>
-          <a:bodyPr rtlCol="0" anchor="ctr"/>
-          <a:lstStyle/>
-          <a:p>
-            <a:pPr algn="ctr"/>
-            <a:endParaRPr lang="en-US"/>
-          </a:p>
-        </p:txBody>
-      </p:sp>
-      <p:sp>
-        <p:nvSpPr>
-          <p:cNvPr id="20" name="Rectangle 19">
-            <a:extLst>
-              <a:ext uri="{FF2B5EF4-FFF2-40B4-BE49-F238E27FC236}">
-                <a16:creationId xmlns:a16="http://schemas.microsoft.com/office/drawing/2014/main" id="{6BAE310D-B37C-A241-920E-315A7306B033}"/>
-              </a:ext>
-            </a:extLst>
-          </p:cNvPr>
-          <p:cNvSpPr/>
-          <p:nvPr/>
-        </p:nvSpPr>
-        <p:spPr>
-          <a:xfrm>
-            <a:off x="1671496" y="3791917"/>
-            <a:ext cx="1524001" cy="665018"/>
-          </a:xfrm>
-          <a:prstGeom prst="rect">
-            <a:avLst/>
-          </a:prstGeom>
-          <a:solidFill>
-            <a:schemeClr val="bg1">
-              <a:lumMod val="95000"/>
-              <a:alpha val="79584"/>
-            </a:schemeClr>
-          </a:solidFill>
-          <a:ln w="38100">
-            <a:solidFill>
-              <a:schemeClr val="bg2">
-                <a:lumMod val="50000"/>
-              </a:schemeClr>
-            </a:solidFill>
-          </a:ln>
-        </p:spPr>
-        <p:style>
-          <a:lnRef idx="2">
-            <a:schemeClr val="accent1">
-              <a:shade val="50000"/>
-            </a:schemeClr>
-          </a:lnRef>
-          <a:fillRef idx="1">
-            <a:schemeClr val="accent1"/>
-          </a:fillRef>
-          <a:effectRef idx="0">
-            <a:schemeClr val="accent1"/>
-          </a:effectRef>
-          <a:fontRef idx="minor">
-            <a:schemeClr val="lt1"/>
-          </a:fontRef>
-        </p:style>
-        <p:txBody>
-          <a:bodyPr rtlCol="0" anchor="ctr"/>
-          <a:lstStyle/>
-          <a:p>
-            <a:pPr algn="ctr"/>
-            <a:r>
-              <a:rPr lang="en-US" sz="2000" dirty="0">
-                <a:solidFill>
-                  <a:schemeClr val="tx1">
-                    <a:lumMod val="85000"/>
-                    <a:lumOff val="15000"/>
-                  </a:schemeClr>
-                </a:solidFill>
-              </a:rPr>
-              <a:t>Permission</a:t>
-            </a:r>
-          </a:p>
-        </p:txBody>
-      </p:sp>
-      <p:sp>
-        <p:nvSpPr>
-          <p:cNvPr id="21" name="Down Arrow 20">
-            <a:extLst>
-              <a:ext uri="{FF2B5EF4-FFF2-40B4-BE49-F238E27FC236}">
-                <a16:creationId xmlns:a16="http://schemas.microsoft.com/office/drawing/2014/main" id="{675138C8-4353-E442-A21C-738EAB141FBE}"/>
-              </a:ext>
-            </a:extLst>
-          </p:cNvPr>
-          <p:cNvSpPr/>
-          <p:nvPr/>
-        </p:nvSpPr>
-        <p:spPr>
-          <a:xfrm rot="21000000">
-            <a:off x="2264267" y="3019065"/>
-            <a:ext cx="161365" cy="772627"/>
-          </a:xfrm>
-          <a:prstGeom prst="downArrow">
-            <a:avLst>
-              <a:gd name="adj1" fmla="val 50000"/>
-              <a:gd name="adj2" fmla="val 129998"/>
-            </a:avLst>
-          </a:prstGeom>
-          <a:solidFill>
-            <a:schemeClr val="bg1">
-              <a:lumMod val="95000"/>
-              <a:alpha val="79584"/>
-            </a:schemeClr>
-          </a:solidFill>
-          <a:ln>
-            <a:solidFill>
-              <a:schemeClr val="bg2">
-                <a:lumMod val="50000"/>
-              </a:schemeClr>
-            </a:solidFill>
-          </a:ln>
-        </p:spPr>
-        <p:style>
-          <a:lnRef idx="2">
-            <a:schemeClr val="accent1">
-              <a:shade val="50000"/>
-            </a:schemeClr>
-          </a:lnRef>
-          <a:fillRef idx="1">
-            <a:schemeClr val="accent1"/>
-          </a:fillRef>
-          <a:effectRef idx="0">
-            <a:schemeClr val="accent1"/>
-          </a:effectRef>
-          <a:fontRef idx="minor">
-            <a:schemeClr val="lt1"/>
-          </a:fontRef>
-        </p:style>
-        <p:txBody>
-          <a:bodyPr rtlCol="0" anchor="ctr"/>
-          <a:lstStyle/>
-          <a:p>
-            <a:pPr algn="ctr"/>
-            <a:endParaRPr lang="en-US"/>
-          </a:p>
-        </p:txBody>
-      </p:sp>
-      <p:sp>
-        <p:nvSpPr>
-          <p:cNvPr id="22" name="Rectangle 21">
-            <a:extLst>
-              <a:ext uri="{FF2B5EF4-FFF2-40B4-BE49-F238E27FC236}">
-                <a16:creationId xmlns:a16="http://schemas.microsoft.com/office/drawing/2014/main" id="{90B2ED0E-B620-C64A-8FFB-6879542442F6}"/>
-              </a:ext>
-            </a:extLst>
-          </p:cNvPr>
-          <p:cNvSpPr/>
-          <p:nvPr/>
-        </p:nvSpPr>
-        <p:spPr>
-          <a:xfrm>
-            <a:off x="1590819" y="3703978"/>
-            <a:ext cx="1524001" cy="665018"/>
-          </a:xfrm>
-          <a:prstGeom prst="rect">
-            <a:avLst/>
-          </a:prstGeom>
-          <a:solidFill>
-            <a:schemeClr val="bg1">
-              <a:lumMod val="95000"/>
-              <a:alpha val="79584"/>
-            </a:schemeClr>
-          </a:solidFill>
-          <a:ln w="38100">
-            <a:solidFill>
-              <a:schemeClr val="bg2">
-                <a:lumMod val="50000"/>
-              </a:schemeClr>
-            </a:solidFill>
-          </a:ln>
-        </p:spPr>
-        <p:style>
-          <a:lnRef idx="2">
-            <a:schemeClr val="accent1">
-              <a:shade val="50000"/>
-            </a:schemeClr>
-          </a:lnRef>
-          <a:fillRef idx="1">
-            <a:schemeClr val="accent1"/>
-          </a:fillRef>
-          <a:effectRef idx="0">
-            <a:schemeClr val="accent1"/>
-          </a:effectRef>
-          <a:fontRef idx="minor">
-            <a:schemeClr val="lt1"/>
-          </a:fontRef>
-        </p:style>
-        <p:txBody>
-          <a:bodyPr rtlCol="0" anchor="ctr"/>
-          <a:lstStyle/>
-          <a:p>
-            <a:pPr algn="ctr"/>
-            <a:r>
-              <a:rPr lang="en-US" sz="2000" dirty="0">
-                <a:solidFill>
-                  <a:schemeClr val="tx1">
-                    <a:lumMod val="85000"/>
-                    <a:lumOff val="15000"/>
-                  </a:schemeClr>
-                </a:solidFill>
-              </a:rPr>
-              <a:t>Permission</a:t>
-            </a:r>
-          </a:p>
-        </p:txBody>
-      </p:sp>
-      <p:sp>
-        <p:nvSpPr>
-          <p:cNvPr id="23" name="Down Arrow 22">
-            <a:extLst>
-              <a:ext uri="{FF2B5EF4-FFF2-40B4-BE49-F238E27FC236}">
-                <a16:creationId xmlns:a16="http://schemas.microsoft.com/office/drawing/2014/main" id="{09C43943-FB10-2F4E-A6DD-A0608F650847}"/>
-              </a:ext>
-            </a:extLst>
-          </p:cNvPr>
-          <p:cNvSpPr/>
-          <p:nvPr/>
-        </p:nvSpPr>
-        <p:spPr>
-          <a:xfrm rot="21300000">
-            <a:off x="2216823" y="3025004"/>
-            <a:ext cx="161365" cy="672768"/>
-          </a:xfrm>
-          <a:prstGeom prst="downArrow">
-            <a:avLst>
-              <a:gd name="adj1" fmla="val 50000"/>
-              <a:gd name="adj2" fmla="val 129998"/>
-            </a:avLst>
-          </a:prstGeom>
-          <a:solidFill>
-            <a:schemeClr val="bg1">
-              <a:lumMod val="95000"/>
-              <a:alpha val="79584"/>
-            </a:schemeClr>
-          </a:solidFill>
-          <a:ln>
-            <a:solidFill>
-              <a:schemeClr val="bg2">
-                <a:lumMod val="50000"/>
-              </a:schemeClr>
-            </a:solidFill>
-          </a:ln>
-        </p:spPr>
-        <p:style>
-          <a:lnRef idx="2">
-            <a:schemeClr val="accent1">
-              <a:shade val="50000"/>
-            </a:schemeClr>
-          </a:lnRef>
-          <a:fillRef idx="1">
-            <a:schemeClr val="accent1"/>
-          </a:fillRef>
-          <a:effectRef idx="0">
-            <a:schemeClr val="accent1"/>
-          </a:effectRef>
-          <a:fontRef idx="minor">
-            <a:schemeClr val="lt1"/>
-          </a:fontRef>
-        </p:style>
-        <p:txBody>
-          <a:bodyPr rtlCol="0" anchor="ctr"/>
-          <a:lstStyle/>
-          <a:p>
-            <a:pPr algn="ctr"/>
-            <a:endParaRPr lang="en-US"/>
-          </a:p>
-        </p:txBody>
-      </p:sp>
-      <p:sp>
-        <p:nvSpPr>
-          <p:cNvPr id="6" name="Rectangle 5">
-            <a:extLst>
-              <a:ext uri="{FF2B5EF4-FFF2-40B4-BE49-F238E27FC236}">
-                <a16:creationId xmlns:a16="http://schemas.microsoft.com/office/drawing/2014/main" id="{292A8187-D086-6241-BD43-8F4A54EACBD1}"/>
-              </a:ext>
-            </a:extLst>
-          </p:cNvPr>
-          <p:cNvSpPr/>
-          <p:nvPr/>
-        </p:nvSpPr>
-        <p:spPr>
-          <a:xfrm>
-            <a:off x="1510142" y="3616039"/>
-            <a:ext cx="1524001" cy="665018"/>
-          </a:xfrm>
-          <a:prstGeom prst="rect">
-            <a:avLst/>
-          </a:prstGeom>
-          <a:solidFill>
-            <a:schemeClr val="bg1">
-              <a:lumMod val="95000"/>
-              <a:alpha val="79584"/>
-            </a:schemeClr>
-          </a:solidFill>
-          <a:ln w="38100">
-            <a:solidFill>
-              <a:schemeClr val="bg2">
-                <a:lumMod val="50000"/>
-              </a:schemeClr>
-            </a:solidFill>
-          </a:ln>
-        </p:spPr>
-        <p:style>
-          <a:lnRef idx="2">
-            <a:schemeClr val="accent1">
-              <a:shade val="50000"/>
-            </a:schemeClr>
-          </a:lnRef>
-          <a:fillRef idx="1">
-            <a:schemeClr val="accent1"/>
-          </a:fillRef>
-          <a:effectRef idx="0">
-            <a:schemeClr val="accent1"/>
-          </a:effectRef>
-          <a:fontRef idx="minor">
-            <a:schemeClr val="lt1"/>
-          </a:fontRef>
-        </p:style>
-        <p:txBody>
-          <a:bodyPr rtlCol="0" anchor="ctr"/>
-          <a:lstStyle/>
-          <a:p>
-            <a:pPr algn="ctr"/>
-            <a:r>
-              <a:rPr lang="en-US" sz="2000" dirty="0">
-                <a:solidFill>
-                  <a:schemeClr val="tx1">
-                    <a:lumMod val="85000"/>
-                    <a:lumOff val="15000"/>
-                  </a:schemeClr>
-                </a:solidFill>
-              </a:rPr>
-              <a:t>Permission</a:t>
-            </a:r>
-          </a:p>
-        </p:txBody>
-      </p:sp>
-      <p:sp>
-        <p:nvSpPr>
-          <p:cNvPr id="18" name="Down Arrow 17">
-            <a:extLst>
-              <a:ext uri="{FF2B5EF4-FFF2-40B4-BE49-F238E27FC236}">
-                <a16:creationId xmlns:a16="http://schemas.microsoft.com/office/drawing/2014/main" id="{A8DAD2EC-3E9B-E942-96A2-159C54469EE2}"/>
-              </a:ext>
-            </a:extLst>
-          </p:cNvPr>
-          <p:cNvSpPr/>
-          <p:nvPr/>
-        </p:nvSpPr>
-        <p:spPr>
-          <a:xfrm>
-            <a:off x="2191459" y="3029199"/>
-            <a:ext cx="161365" cy="581892"/>
-          </a:xfrm>
-          <a:prstGeom prst="downArrow">
-            <a:avLst>
-              <a:gd name="adj1" fmla="val 50000"/>
-              <a:gd name="adj2" fmla="val 129998"/>
-            </a:avLst>
-          </a:prstGeom>
-          <a:solidFill>
-            <a:schemeClr val="bg1">
-              <a:lumMod val="95000"/>
-              <a:alpha val="79584"/>
-            </a:schemeClr>
-          </a:solidFill>
-          <a:ln>
-            <a:solidFill>
-              <a:schemeClr val="bg2">
-                <a:lumMod val="50000"/>
-              </a:schemeClr>
-            </a:solidFill>
-          </a:ln>
-        </p:spPr>
-        <p:style>
-          <a:lnRef idx="2">
-            <a:schemeClr val="accent1">
-              <a:shade val="50000"/>
-            </a:schemeClr>
-          </a:lnRef>
-          <a:fillRef idx="1">
-            <a:schemeClr val="accent1"/>
-          </a:fillRef>
-          <a:effectRef idx="0">
-            <a:schemeClr val="accent1"/>
-          </a:effectRef>
-          <a:fontRef idx="minor">
-            <a:schemeClr val="lt1"/>
-          </a:fontRef>
-        </p:style>
-        <p:txBody>
-          <a:bodyPr rtlCol="0" anchor="ctr"/>
-          <a:lstStyle/>
-          <a:p>
-            <a:pPr algn="ctr"/>
-            <a:endParaRPr lang="en-US"/>
-          </a:p>
-        </p:txBody>
-      </p:sp>
-      <p:sp>
-        <p:nvSpPr>
-          <p:cNvPr id="24" name="Rectangle 23">
-            <a:extLst>
-              <a:ext uri="{FF2B5EF4-FFF2-40B4-BE49-F238E27FC236}">
-                <a16:creationId xmlns:a16="http://schemas.microsoft.com/office/drawing/2014/main" id="{4D48405B-FC50-FE48-9864-E65F44D6BEA9}"/>
-              </a:ext>
-            </a:extLst>
-          </p:cNvPr>
-          <p:cNvSpPr/>
-          <p:nvPr/>
-        </p:nvSpPr>
-        <p:spPr>
-          <a:xfrm>
-            <a:off x="1748889" y="5126767"/>
-            <a:ext cx="1524001" cy="665018"/>
-          </a:xfrm>
-          <a:prstGeom prst="rect">
-            <a:avLst/>
-          </a:prstGeom>
-          <a:solidFill>
-            <a:schemeClr val="bg1">
-              <a:lumMod val="95000"/>
-              <a:alpha val="79584"/>
-            </a:schemeClr>
-          </a:solidFill>
-          <a:ln w="38100">
-            <a:solidFill>
-              <a:schemeClr val="bg2">
-                <a:lumMod val="50000"/>
-              </a:schemeClr>
-            </a:solidFill>
-          </a:ln>
-        </p:spPr>
-        <p:style>
-          <a:lnRef idx="2">
-            <a:schemeClr val="accent1">
-              <a:shade val="50000"/>
-            </a:schemeClr>
-          </a:lnRef>
-          <a:fillRef idx="1">
-            <a:schemeClr val="accent1"/>
-          </a:fillRef>
-          <a:effectRef idx="0">
-            <a:schemeClr val="accent1"/>
-          </a:effectRef>
-          <a:fontRef idx="minor">
-            <a:schemeClr val="lt1"/>
-          </a:fontRef>
-        </p:style>
-        <p:txBody>
-          <a:bodyPr rtlCol="0" anchor="ctr"/>
-          <a:lstStyle/>
-          <a:p>
-            <a:pPr algn="ctr"/>
-            <a:r>
-              <a:rPr lang="en-US" sz="2000" dirty="0">
-                <a:solidFill>
-                  <a:schemeClr val="tx1">
-                    <a:lumMod val="85000"/>
-                    <a:lumOff val="15000"/>
-                  </a:schemeClr>
-                </a:solidFill>
-              </a:rPr>
-              <a:t>Capability</a:t>
-            </a:r>
-          </a:p>
-        </p:txBody>
-      </p:sp>
-      <p:sp>
-        <p:nvSpPr>
-          <p:cNvPr id="25" name="Down Arrow 24">
-            <a:extLst>
-              <a:ext uri="{FF2B5EF4-FFF2-40B4-BE49-F238E27FC236}">
-                <a16:creationId xmlns:a16="http://schemas.microsoft.com/office/drawing/2014/main" id="{C38E727F-4FE9-4943-9A29-A68D7FE9CB45}"/>
-              </a:ext>
-            </a:extLst>
-          </p:cNvPr>
-          <p:cNvSpPr/>
-          <p:nvPr/>
-        </p:nvSpPr>
-        <p:spPr>
-          <a:xfrm rot="20675198">
-            <a:off x="2299675" y="4257985"/>
-            <a:ext cx="161365" cy="888316"/>
-          </a:xfrm>
-          <a:prstGeom prst="downArrow">
-            <a:avLst>
-              <a:gd name="adj1" fmla="val 50000"/>
-              <a:gd name="adj2" fmla="val 129998"/>
-            </a:avLst>
-          </a:prstGeom>
-          <a:solidFill>
-            <a:schemeClr val="bg1">
-              <a:lumMod val="95000"/>
-              <a:alpha val="79584"/>
-            </a:schemeClr>
-          </a:solidFill>
-          <a:ln>
-            <a:solidFill>
-              <a:schemeClr val="bg2">
-                <a:lumMod val="50000"/>
-              </a:schemeClr>
-            </a:solidFill>
-          </a:ln>
-        </p:spPr>
-        <p:style>
-          <a:lnRef idx="2">
-            <a:schemeClr val="accent1">
-              <a:shade val="50000"/>
-            </a:schemeClr>
-          </a:lnRef>
-          <a:fillRef idx="1">
-            <a:schemeClr val="accent1"/>
-          </a:fillRef>
-          <a:effectRef idx="0">
-            <a:schemeClr val="accent1"/>
-          </a:effectRef>
-          <a:fontRef idx="minor">
-            <a:schemeClr val="lt1"/>
-          </a:fontRef>
-        </p:style>
-        <p:txBody>
-          <a:bodyPr rtlCol="0" anchor="ctr"/>
-          <a:lstStyle/>
-          <a:p>
-            <a:pPr algn="ctr"/>
-            <a:endParaRPr lang="en-US"/>
-          </a:p>
-        </p:txBody>
-      </p:sp>
-      <p:sp>
-        <p:nvSpPr>
-          <p:cNvPr id="26" name="Rectangle 25">
-            <a:extLst>
-              <a:ext uri="{FF2B5EF4-FFF2-40B4-BE49-F238E27FC236}">
-                <a16:creationId xmlns:a16="http://schemas.microsoft.com/office/drawing/2014/main" id="{6A8C3861-7AA5-7B4D-8171-C7F0BA70A786}"/>
-              </a:ext>
-            </a:extLst>
-          </p:cNvPr>
-          <p:cNvSpPr/>
-          <p:nvPr/>
-        </p:nvSpPr>
-        <p:spPr>
-          <a:xfrm>
-            <a:off x="1669306" y="5038827"/>
-            <a:ext cx="1524001" cy="665018"/>
-          </a:xfrm>
-          <a:prstGeom prst="rect">
-            <a:avLst/>
-          </a:prstGeom>
-          <a:solidFill>
-            <a:schemeClr val="bg1">
-              <a:lumMod val="95000"/>
-              <a:alpha val="79584"/>
-            </a:schemeClr>
-          </a:solidFill>
-          <a:ln w="38100">
-            <a:solidFill>
-              <a:schemeClr val="bg2">
-                <a:lumMod val="50000"/>
-              </a:schemeClr>
-            </a:solidFill>
-          </a:ln>
-        </p:spPr>
-        <p:style>
-          <a:lnRef idx="2">
-            <a:schemeClr val="accent1">
-              <a:shade val="50000"/>
-            </a:schemeClr>
-          </a:lnRef>
-          <a:fillRef idx="1">
-            <a:schemeClr val="accent1"/>
-          </a:fillRef>
-          <a:effectRef idx="0">
-            <a:schemeClr val="accent1"/>
-          </a:effectRef>
-          <a:fontRef idx="minor">
-            <a:schemeClr val="lt1"/>
-          </a:fontRef>
-        </p:style>
-        <p:txBody>
-          <a:bodyPr rtlCol="0" anchor="ctr"/>
-          <a:lstStyle/>
-          <a:p>
-            <a:pPr algn="ctr"/>
-            <a:r>
-              <a:rPr lang="en-US" sz="2000" dirty="0">
-                <a:solidFill>
-                  <a:schemeClr val="tx1">
-                    <a:lumMod val="85000"/>
-                    <a:lumOff val="15000"/>
-                  </a:schemeClr>
-                </a:solidFill>
-              </a:rPr>
-              <a:t>Capability</a:t>
-            </a:r>
-          </a:p>
-        </p:txBody>
-      </p:sp>
-      <p:sp>
-        <p:nvSpPr>
-          <p:cNvPr id="27" name="Down Arrow 26">
-            <a:extLst>
-              <a:ext uri="{FF2B5EF4-FFF2-40B4-BE49-F238E27FC236}">
-                <a16:creationId xmlns:a16="http://schemas.microsoft.com/office/drawing/2014/main" id="{68F6EEB0-BC58-E14D-8679-11B822C5F9D6}"/>
-              </a:ext>
-            </a:extLst>
-          </p:cNvPr>
-          <p:cNvSpPr/>
-          <p:nvPr/>
-        </p:nvSpPr>
-        <p:spPr>
-          <a:xfrm rot="21000000">
-            <a:off x="2260983" y="4265975"/>
-            <a:ext cx="161365" cy="772627"/>
-          </a:xfrm>
-          <a:prstGeom prst="downArrow">
-            <a:avLst>
-              <a:gd name="adj1" fmla="val 50000"/>
-              <a:gd name="adj2" fmla="val 129998"/>
-            </a:avLst>
-          </a:prstGeom>
-          <a:solidFill>
-            <a:schemeClr val="bg1">
-              <a:lumMod val="95000"/>
-              <a:alpha val="79584"/>
-            </a:schemeClr>
-          </a:solidFill>
-          <a:ln>
-            <a:solidFill>
-              <a:schemeClr val="bg2">
-                <a:lumMod val="50000"/>
-              </a:schemeClr>
-            </a:solidFill>
-          </a:ln>
-        </p:spPr>
-        <p:style>
-          <a:lnRef idx="2">
-            <a:schemeClr val="accent1">
-              <a:shade val="50000"/>
-            </a:schemeClr>
-          </a:lnRef>
-          <a:fillRef idx="1">
-            <a:schemeClr val="accent1"/>
-          </a:fillRef>
-          <a:effectRef idx="0">
-            <a:schemeClr val="accent1"/>
-          </a:effectRef>
-          <a:fontRef idx="minor">
-            <a:schemeClr val="lt1"/>
-          </a:fontRef>
-        </p:style>
-        <p:txBody>
-          <a:bodyPr rtlCol="0" anchor="ctr"/>
-          <a:lstStyle/>
-          <a:p>
-            <a:pPr algn="ctr"/>
-            <a:endParaRPr lang="en-US"/>
-          </a:p>
-        </p:txBody>
-      </p:sp>
-      <p:sp>
-        <p:nvSpPr>
-          <p:cNvPr id="28" name="Rectangle 27">
-            <a:extLst>
-              <a:ext uri="{FF2B5EF4-FFF2-40B4-BE49-F238E27FC236}">
-                <a16:creationId xmlns:a16="http://schemas.microsoft.com/office/drawing/2014/main" id="{EDF4912B-F808-8F44-B8BF-FFF885A64E0C}"/>
-              </a:ext>
-            </a:extLst>
-          </p:cNvPr>
-          <p:cNvSpPr/>
-          <p:nvPr/>
-        </p:nvSpPr>
-        <p:spPr>
-          <a:xfrm>
-            <a:off x="1589724" y="4950888"/>
-            <a:ext cx="1524001" cy="665018"/>
-          </a:xfrm>
-          <a:prstGeom prst="rect">
-            <a:avLst/>
-          </a:prstGeom>
-          <a:solidFill>
-            <a:schemeClr val="bg1">
-              <a:lumMod val="95000"/>
-              <a:alpha val="79584"/>
-            </a:schemeClr>
-          </a:solidFill>
-          <a:ln w="38100">
-            <a:solidFill>
-              <a:schemeClr val="bg2">
-                <a:lumMod val="50000"/>
-              </a:schemeClr>
-            </a:solidFill>
-          </a:ln>
-        </p:spPr>
-        <p:style>
-          <a:lnRef idx="2">
-            <a:schemeClr val="accent1">
-              <a:shade val="50000"/>
-            </a:schemeClr>
-          </a:lnRef>
-          <a:fillRef idx="1">
-            <a:schemeClr val="accent1"/>
-          </a:fillRef>
-          <a:effectRef idx="0">
-            <a:schemeClr val="accent1"/>
-          </a:effectRef>
-          <a:fontRef idx="minor">
-            <a:schemeClr val="lt1"/>
-          </a:fontRef>
-        </p:style>
-        <p:txBody>
-          <a:bodyPr rtlCol="0" anchor="ctr"/>
-          <a:lstStyle/>
-          <a:p>
-            <a:pPr algn="ctr"/>
-            <a:r>
-              <a:rPr lang="en-US" sz="2000" dirty="0">
-                <a:solidFill>
-                  <a:schemeClr val="tx1">
-                    <a:lumMod val="85000"/>
-                    <a:lumOff val="15000"/>
-                  </a:schemeClr>
-                </a:solidFill>
-              </a:rPr>
-              <a:t>Capability</a:t>
-            </a:r>
-          </a:p>
-        </p:txBody>
-      </p:sp>
-      <p:sp>
-        <p:nvSpPr>
-          <p:cNvPr id="29" name="Down Arrow 28">
-            <a:extLst>
-              <a:ext uri="{FF2B5EF4-FFF2-40B4-BE49-F238E27FC236}">
-                <a16:creationId xmlns:a16="http://schemas.microsoft.com/office/drawing/2014/main" id="{CC76696C-EEF6-094E-8EBF-656B4960E1DF}"/>
-              </a:ext>
-            </a:extLst>
-          </p:cNvPr>
-          <p:cNvSpPr/>
-          <p:nvPr/>
-        </p:nvSpPr>
-        <p:spPr>
-          <a:xfrm rot="21300000">
-            <a:off x="2213539" y="4271914"/>
-            <a:ext cx="161365" cy="672768"/>
-          </a:xfrm>
-          <a:prstGeom prst="downArrow">
-            <a:avLst>
-              <a:gd name="adj1" fmla="val 50000"/>
-              <a:gd name="adj2" fmla="val 129998"/>
-            </a:avLst>
-          </a:prstGeom>
-          <a:solidFill>
-            <a:schemeClr val="bg1">
-              <a:lumMod val="95000"/>
-              <a:alpha val="79584"/>
-            </a:schemeClr>
-          </a:solidFill>
-          <a:ln>
-            <a:solidFill>
-              <a:schemeClr val="bg2">
-                <a:lumMod val="50000"/>
-              </a:schemeClr>
-            </a:solidFill>
-          </a:ln>
-        </p:spPr>
-        <p:style>
-          <a:lnRef idx="2">
-            <a:schemeClr val="accent1">
-              <a:shade val="50000"/>
-            </a:schemeClr>
-          </a:lnRef>
-          <a:fillRef idx="1">
-            <a:schemeClr val="accent1"/>
-          </a:fillRef>
-          <a:effectRef idx="0">
-            <a:schemeClr val="accent1"/>
-          </a:effectRef>
-          <a:fontRef idx="minor">
-            <a:schemeClr val="lt1"/>
-          </a:fontRef>
-        </p:style>
-        <p:txBody>
-          <a:bodyPr rtlCol="0" anchor="ctr"/>
-          <a:lstStyle/>
-          <a:p>
-            <a:pPr algn="ctr"/>
-            <a:endParaRPr lang="en-US"/>
-          </a:p>
-        </p:txBody>
-      </p:sp>
-      <p:sp>
-        <p:nvSpPr>
-          <p:cNvPr id="7" name="Rectangle 6">
-            <a:extLst>
-              <a:ext uri="{FF2B5EF4-FFF2-40B4-BE49-F238E27FC236}">
-                <a16:creationId xmlns:a16="http://schemas.microsoft.com/office/drawing/2014/main" id="{084195EB-CEC7-3642-9E4F-07763E9EF4CC}"/>
-              </a:ext>
-            </a:extLst>
-          </p:cNvPr>
-          <p:cNvSpPr/>
-          <p:nvPr/>
-        </p:nvSpPr>
-        <p:spPr>
-          <a:xfrm>
-            <a:off x="1510142" y="4862949"/>
-            <a:ext cx="1524001" cy="665018"/>
-          </a:xfrm>
-          <a:prstGeom prst="rect">
-            <a:avLst/>
-          </a:prstGeom>
-          <a:solidFill>
-            <a:schemeClr val="bg1">
-              <a:lumMod val="95000"/>
-              <a:alpha val="79584"/>
-            </a:schemeClr>
-          </a:solidFill>
-          <a:ln w="38100">
-            <a:solidFill>
-              <a:schemeClr val="bg2">
-                <a:lumMod val="50000"/>
-              </a:schemeClr>
-            </a:solidFill>
-          </a:ln>
-        </p:spPr>
-        <p:style>
-          <a:lnRef idx="2">
-            <a:schemeClr val="accent1">
-              <a:shade val="50000"/>
-            </a:schemeClr>
-          </a:lnRef>
-          <a:fillRef idx="1">
-            <a:schemeClr val="accent1"/>
-          </a:fillRef>
-          <a:effectRef idx="0">
-            <a:schemeClr val="accent1"/>
-          </a:effectRef>
-          <a:fontRef idx="minor">
-            <a:schemeClr val="lt1"/>
-          </a:fontRef>
-        </p:style>
-        <p:txBody>
-          <a:bodyPr rtlCol="0" anchor="ctr"/>
-          <a:lstStyle/>
-          <a:p>
-            <a:pPr algn="ctr"/>
-            <a:r>
-              <a:rPr lang="en-US" sz="2000" dirty="0">
-                <a:solidFill>
-                  <a:schemeClr val="tx1">
-                    <a:lumMod val="85000"/>
-                    <a:lumOff val="15000"/>
-                  </a:schemeClr>
-                </a:solidFill>
-              </a:rPr>
-              <a:t>Capability</a:t>
-            </a:r>
-          </a:p>
-        </p:txBody>
-      </p:sp>
-      <p:sp>
-        <p:nvSpPr>
-          <p:cNvPr id="17" name="Down Arrow 16">
-            <a:extLst>
-              <a:ext uri="{FF2B5EF4-FFF2-40B4-BE49-F238E27FC236}">
-                <a16:creationId xmlns:a16="http://schemas.microsoft.com/office/drawing/2014/main" id="{79138125-78FD-2843-9EDB-DB6D8C3820EA}"/>
-              </a:ext>
-            </a:extLst>
-          </p:cNvPr>
-          <p:cNvSpPr/>
-          <p:nvPr/>
-        </p:nvSpPr>
-        <p:spPr>
-          <a:xfrm>
-            <a:off x="2191458" y="4281057"/>
+            <a:off x="5011281" y="4345225"/>
             <a:ext cx="161365" cy="581892"/>
           </a:xfrm>
           <a:prstGeom prst="downArrow">

</xml_diff>